<commit_message>
Review Comments by Eumar
Review Comments by Eumar
</commit_message>
<xml_diff>
--- a/Content/Starter Kit - Intelligent Apps & Analytics/0 - Starter Kit - Intelligent Apps & Analytics.pptx
+++ b/Content/Starter Kit - Intelligent Apps & Analytics/0 - Starter Kit - Intelligent Apps & Analytics.pptx
@@ -129,7 +129,127 @@
       </p:ext>
     </p:extLst>
   </p:cmAuthor>
+  <p:cmAuthor id="2" name="Eumar Assis" initials="EA" lastIdx="10" clrIdx="1">
+    <p:extLst>
+      <p:ext uri="{19B8F6BF-5375-455C-9EA6-DF929625EA0E}">
+        <p15:presenceInfo xmlns:p15="http://schemas.microsoft.com/office/powerpoint/2012/main" userId="S-1-5-21-124525095-708259637-1543119021-1495550" providerId="AD"/>
+      </p:ext>
+    </p:extLst>
+  </p:cmAuthor>
 </p:cmAuthorLst>
+</file>
+
+<file path=ppt/comments/comment1.xml><?xml version="1.0" encoding="utf-8"?>
+<p:cmLst xmlns:a="http://schemas.openxmlformats.org/drawingml/2006/main" xmlns:r="http://schemas.openxmlformats.org/officeDocument/2006/relationships" xmlns:p="http://schemas.openxmlformats.org/presentationml/2006/main">
+  <p:cm authorId="2" dt="2016-08-23T11:55:25.527" idx="1">
+    <p:pos x="1789" y="1360"/>
+    <p:text>Mention Power BI and AZURE (e.g. Azure SQL Data warehouse)</p:text>
+    <p:extLst>
+      <p:ext uri="{C676402C-5697-4E1C-873F-D02D1690AC5C}">
+        <p15:threadingInfo xmlns:p15="http://schemas.microsoft.com/office/powerpoint/2012/main" timeZoneBias="240"/>
+      </p:ext>
+    </p:extLst>
+  </p:cm>
+  <p:cm authorId="2" dt="2016-08-23T11:57:01.334" idx="2">
+    <p:pos x="5124" y="1212"/>
+    <p:text>Is this correct? Include  How Many HD Insight Nodes.</p:text>
+    <p:extLst>
+      <p:ext uri="{C676402C-5697-4E1C-873F-D02D1690AC5C}">
+        <p15:threadingInfo xmlns:p15="http://schemas.microsoft.com/office/powerpoint/2012/main" timeZoneBias="240"/>
+      </p:ext>
+    </p:extLst>
+  </p:cm>
+  <p:cm authorId="2" dt="2016-08-23T11:57:25.117" idx="3">
+    <p:pos x="5271" y="1587"/>
+    <p:text>Is this correct? Is 1Tb enough?</p:text>
+    <p:extLst>
+      <p:ext uri="{C676402C-5697-4E1C-873F-D02D1690AC5C}">
+        <p15:threadingInfo xmlns:p15="http://schemas.microsoft.com/office/powerpoint/2012/main" timeZoneBias="240"/>
+      </p:ext>
+    </p:extLst>
+  </p:cm>
+  <p:cm authorId="2" dt="2016-08-23T12:02:49.666" idx="7">
+    <p:pos x="2237" y="248"/>
+    <p:text>Can we add a sub title to reflect the business scenario we are helping to solve or example? E.g. Twitter Sentiment Analysis with  AZURE SQL DW and Power BI</p:text>
+    <p:extLst>
+      <p:ext uri="{C676402C-5697-4E1C-873F-D02D1690AC5C}">
+        <p15:threadingInfo xmlns:p15="http://schemas.microsoft.com/office/powerpoint/2012/main" timeZoneBias="240"/>
+      </p:ext>
+    </p:extLst>
+  </p:cm>
+</p:cmLst>
+</file>
+
+<file path=ppt/comments/comment2.xml><?xml version="1.0" encoding="utf-8"?>
+<p:cmLst xmlns:a="http://schemas.openxmlformats.org/drawingml/2006/main" xmlns:r="http://schemas.openxmlformats.org/officeDocument/2006/relationships" xmlns:p="http://schemas.openxmlformats.org/presentationml/2006/main">
+  <p:cm authorId="2" dt="2016-08-23T11:58:59.542" idx="4">
+    <p:pos x="5362" y="392"/>
+    <p:text>Why do we need HDInsight in this scenario?</p:text>
+    <p:extLst>
+      <p:ext uri="{C676402C-5697-4E1C-873F-D02D1690AC5C}">
+        <p15:threadingInfo xmlns:p15="http://schemas.microsoft.com/office/powerpoint/2012/main" timeZoneBias="240"/>
+      </p:ext>
+    </p:extLst>
+  </p:cm>
+  <p:cm authorId="2" dt="2016-08-23T12:00:16.339" idx="5">
+    <p:pos x="5362" y="488"/>
+    <p:text>My suggestions: Option 1: Power BI with Enterprise Connector
+Option 2: Azure Data Factory with Connector + Azure SQl Datawarehouse + Power BI Direct Query</p:text>
+    <p:extLst>
+      <p:ext uri="{C676402C-5697-4E1C-873F-D02D1690AC5C}">
+        <p15:threadingInfo xmlns:p15="http://schemas.microsoft.com/office/powerpoint/2012/main" timeZoneBias="240">
+          <p15:parentCm authorId="2" idx="4"/>
+        </p15:threadingInfo>
+      </p:ext>
+    </p:extLst>
+  </p:cm>
+  <p:cm authorId="2" dt="2016-08-23T12:00:40.213" idx="6">
+    <p:pos x="2873" y="1159"/>
+    <p:text>Recommend mentioning the benefits of Data factory</p:text>
+    <p:extLst>
+      <p:ext uri="{C676402C-5697-4E1C-873F-D02D1690AC5C}">
+        <p15:threadingInfo xmlns:p15="http://schemas.microsoft.com/office/powerpoint/2012/main" timeZoneBias="240"/>
+      </p:ext>
+    </p:extLst>
+  </p:cm>
+  <p:cm authorId="2" dt="2016-08-23T12:19:03.669" idx="8">
+    <p:pos x="2947" y="60"/>
+    <p:text>Can we add a sub title to reflect the business scenario we are helping to solve or example? E.g. Cloud Big Data for  Customer Churn Analysis with On-Premises Data</p:text>
+    <p:extLst>
+      <p:ext uri="{C676402C-5697-4E1C-873F-D02D1690AC5C}">
+        <p15:threadingInfo xmlns:p15="http://schemas.microsoft.com/office/powerpoint/2012/main" timeZoneBias="240"/>
+      </p:ext>
+    </p:extLst>
+  </p:cm>
+</p:cmLst>
+</file>
+
+<file path=ppt/comments/comment3.xml><?xml version="1.0" encoding="utf-8"?>
+<p:cmLst xmlns:a="http://schemas.openxmlformats.org/drawingml/2006/main" xmlns:r="http://schemas.openxmlformats.org/officeDocument/2006/relationships" xmlns:p="http://schemas.openxmlformats.org/presentationml/2006/main">
+  <p:cm authorId="2" dt="2016-08-23T12:21:33.070" idx="9">
+    <p:pos x="2786" y="33"/>
+    <p:text>Can we add a sub title to reflect the business scenario we are helping to solve or mention a practical example? E.g. Monitoring Elevator for Predictive Maintanence</p:text>
+    <p:extLst>
+      <p:ext uri="{C676402C-5697-4E1C-873F-D02D1690AC5C}">
+        <p15:threadingInfo xmlns:p15="http://schemas.microsoft.com/office/powerpoint/2012/main" timeZoneBias="240"/>
+      </p:ext>
+    </p:extLst>
+  </p:cm>
+</p:cmLst>
+</file>
+
+<file path=ppt/comments/comment4.xml><?xml version="1.0" encoding="utf-8"?>
+<p:cmLst xmlns:a="http://schemas.openxmlformats.org/drawingml/2006/main" xmlns:r="http://schemas.openxmlformats.org/officeDocument/2006/relationships" xmlns:p="http://schemas.openxmlformats.org/presentationml/2006/main">
+  <p:cm authorId="2" dt="2016-08-23T12:22:25.434" idx="10">
+    <p:pos x="3865" y="20"/>
+    <p:text>Can we add a sub title to reflect the business scenario we are helping to solve or mention a practical example? E.g. Call Center Sentiment Analysis with Cortana Intelligence Suite</p:text>
+    <p:extLst>
+      <p:ext uri="{C676402C-5697-4E1C-873F-D02D1690AC5C}">
+        <p15:threadingInfo xmlns:p15="http://schemas.microsoft.com/office/powerpoint/2012/main" timeZoneBias="240"/>
+      </p:ext>
+    </p:extLst>
+  </p:cm>
+</p:cmLst>
 </file>
 
 <file path=ppt/notesMasters/notesMaster1.xml><?xml version="1.0" encoding="utf-8"?>
@@ -214,7 +334,7 @@
           <a:p>
             <a:fld id="{386A5666-4B6A-423A-AB1B-8D7E7E0D4931}" type="datetimeFigureOut">
               <a:rPr lang="en-US" smtClean="0"/>
-              <a:t>8/23/2016</a:t>
+              <a:t>23-Aug-16</a:t>
             </a:fld>
             <a:endParaRPr lang="en-US"/>
           </a:p>
@@ -1774,7 +1894,7 @@
           <a:p>
             <a:fld id="{DD6EF947-8D9F-492B-9CF5-9DCF2EF799ED}" type="datetimeFigureOut">
               <a:rPr lang="en-US" smtClean="0"/>
-              <a:t>8/23/2016</a:t>
+              <a:t>23-Aug-16</a:t>
             </a:fld>
             <a:endParaRPr lang="en-US"/>
           </a:p>
@@ -1942,7 +2062,7 @@
           <a:p>
             <a:fld id="{DD6EF947-8D9F-492B-9CF5-9DCF2EF799ED}" type="datetimeFigureOut">
               <a:rPr lang="en-US" smtClean="0"/>
-              <a:t>8/23/2016</a:t>
+              <a:t>23-Aug-16</a:t>
             </a:fld>
             <a:endParaRPr lang="en-US"/>
           </a:p>
@@ -2120,7 +2240,7 @@
           <a:p>
             <a:fld id="{DD6EF947-8D9F-492B-9CF5-9DCF2EF799ED}" type="datetimeFigureOut">
               <a:rPr lang="en-US" smtClean="0"/>
-              <a:t>8/23/2016</a:t>
+              <a:t>23-Aug-16</a:t>
             </a:fld>
             <a:endParaRPr lang="en-US"/>
           </a:p>
@@ -2472,7 +2592,7 @@
           <a:p>
             <a:fld id="{DD6EF947-8D9F-492B-9CF5-9DCF2EF799ED}" type="datetimeFigureOut">
               <a:rPr lang="en-US" smtClean="0"/>
-              <a:t>8/23/2016</a:t>
+              <a:t>23-Aug-16</a:t>
             </a:fld>
             <a:endParaRPr lang="en-US"/>
           </a:p>
@@ -2717,7 +2837,7 @@
           <a:p>
             <a:fld id="{DD6EF947-8D9F-492B-9CF5-9DCF2EF799ED}" type="datetimeFigureOut">
               <a:rPr lang="en-US" smtClean="0"/>
-              <a:t>8/23/2016</a:t>
+              <a:t>23-Aug-16</a:t>
             </a:fld>
             <a:endParaRPr lang="en-US"/>
           </a:p>
@@ -2946,7 +3066,7 @@
           <a:p>
             <a:fld id="{DD6EF947-8D9F-492B-9CF5-9DCF2EF799ED}" type="datetimeFigureOut">
               <a:rPr lang="en-US" smtClean="0"/>
-              <a:t>8/23/2016</a:t>
+              <a:t>23-Aug-16</a:t>
             </a:fld>
             <a:endParaRPr lang="en-US"/>
           </a:p>
@@ -3310,7 +3430,7 @@
           <a:p>
             <a:fld id="{DD6EF947-8D9F-492B-9CF5-9DCF2EF799ED}" type="datetimeFigureOut">
               <a:rPr lang="en-US" smtClean="0"/>
-              <a:t>8/23/2016</a:t>
+              <a:t>23-Aug-16</a:t>
             </a:fld>
             <a:endParaRPr lang="en-US"/>
           </a:p>
@@ -3427,7 +3547,7 @@
           <a:p>
             <a:fld id="{DD6EF947-8D9F-492B-9CF5-9DCF2EF799ED}" type="datetimeFigureOut">
               <a:rPr lang="en-US" smtClean="0"/>
-              <a:t>8/23/2016</a:t>
+              <a:t>23-Aug-16</a:t>
             </a:fld>
             <a:endParaRPr lang="en-US"/>
           </a:p>
@@ -3522,7 +3642,7 @@
           <a:p>
             <a:fld id="{DD6EF947-8D9F-492B-9CF5-9DCF2EF799ED}" type="datetimeFigureOut">
               <a:rPr lang="en-US" smtClean="0"/>
-              <a:t>8/23/2016</a:t>
+              <a:t>23-Aug-16</a:t>
             </a:fld>
             <a:endParaRPr lang="en-US"/>
           </a:p>
@@ -3797,7 +3917,7 @@
           <a:p>
             <a:fld id="{DD6EF947-8D9F-492B-9CF5-9DCF2EF799ED}" type="datetimeFigureOut">
               <a:rPr lang="en-US" smtClean="0"/>
-              <a:t>8/23/2016</a:t>
+              <a:t>23-Aug-16</a:t>
             </a:fld>
             <a:endParaRPr lang="en-US"/>
           </a:p>
@@ -4049,7 +4169,7 @@
           <a:p>
             <a:fld id="{DD6EF947-8D9F-492B-9CF5-9DCF2EF799ED}" type="datetimeFigureOut">
               <a:rPr lang="en-US" smtClean="0"/>
-              <a:t>8/23/2016</a:t>
+              <a:t>23-Aug-16</a:t>
             </a:fld>
             <a:endParaRPr lang="en-US"/>
           </a:p>
@@ -4260,7 +4380,7 @@
           <a:p>
             <a:fld id="{DD6EF947-8D9F-492B-9CF5-9DCF2EF799ED}" type="datetimeFigureOut">
               <a:rPr lang="en-US" smtClean="0"/>
-              <a:t>8/23/2016</a:t>
+              <a:t>23-Aug-16</a:t>
             </a:fld>
             <a:endParaRPr lang="en-US"/>
           </a:p>
@@ -16100,12 +16220,9 @@
 </file>
 
 <file path=customXml/item1.xml><?xml version="1.0" encoding="utf-8"?>
-<?mso-contentType ?>
-<FormTemplates xmlns="http://schemas.microsoft.com/sharepoint/v3/contenttype/forms">
-  <Display>DocumentLibraryForm</Display>
-  <Edit>DocumentLibraryForm</Edit>
-  <New>DocumentLibraryForm</New>
-</FormTemplates>
+<p:properties xmlns:p="http://schemas.microsoft.com/office/2006/metadata/properties" xmlns:xsi="http://www.w3.org/2001/XMLSchema-instance" xmlns:pc="http://schemas.microsoft.com/office/infopath/2007/PartnerControls">
+  <documentManagement/>
+</p:properties>
 </file>
 
 <file path=customXml/item2.xml><?xml version="1.0" encoding="utf-8"?>
@@ -16223,15 +16340,25 @@
 </file>
 
 <file path=customXml/item3.xml><?xml version="1.0" encoding="utf-8"?>
-<p:properties xmlns:p="http://schemas.microsoft.com/office/2006/metadata/properties" xmlns:xsi="http://www.w3.org/2001/XMLSchema-instance" xmlns:pc="http://schemas.microsoft.com/office/infopath/2007/PartnerControls">
-  <documentManagement/>
-</p:properties>
+<?mso-contentType ?>
+<FormTemplates xmlns="http://schemas.microsoft.com/sharepoint/v3/contenttype/forms">
+  <Display>DocumentLibraryForm</Display>
+  <Edit>DocumentLibraryForm</Edit>
+  <New>DocumentLibraryForm</New>
+</FormTemplates>
 </file>
 
 <file path=customXml/itemProps1.xml><?xml version="1.0" encoding="utf-8"?>
-<ds:datastoreItem xmlns:ds="http://schemas.openxmlformats.org/officeDocument/2006/customXml" ds:itemID="{1547E796-3336-4CA3-A039-C51122E80770}">
+<ds:datastoreItem xmlns:ds="http://schemas.openxmlformats.org/officeDocument/2006/customXml" ds:itemID="{2A7D4CEE-4A6E-444C-9F48-154C694282ED}">
   <ds:schemaRefs>
-    <ds:schemaRef ds:uri="http://schemas.microsoft.com/sharepoint/v3/contenttype/forms"/>
+    <ds:schemaRef ds:uri="http://purl.org/dc/elements/1.1/"/>
+    <ds:schemaRef ds:uri="http://schemas.microsoft.com/office/2006/metadata/properties"/>
+    <ds:schemaRef ds:uri="http://purl.org/dc/terms/"/>
+    <ds:schemaRef ds:uri="http://schemas.openxmlformats.org/package/2006/metadata/core-properties"/>
+    <ds:schemaRef ds:uri="http://schemas.microsoft.com/office/2006/documentManagement/types"/>
+    <ds:schemaRef ds:uri="http://purl.org/dc/dcmitype/"/>
+    <ds:schemaRef ds:uri="http://schemas.microsoft.com/office/infopath/2007/PartnerControls"/>
+    <ds:schemaRef ds:uri="http://www.w3.org/XML/1998/namespace"/>
   </ds:schemaRefs>
 </ds:datastoreItem>
 </file>
@@ -16253,16 +16380,9 @@
 </file>
 
 <file path=customXml/itemProps3.xml><?xml version="1.0" encoding="utf-8"?>
-<ds:datastoreItem xmlns:ds="http://schemas.openxmlformats.org/officeDocument/2006/customXml" ds:itemID="{2A7D4CEE-4A6E-444C-9F48-154C694282ED}">
+<ds:datastoreItem xmlns:ds="http://schemas.openxmlformats.org/officeDocument/2006/customXml" ds:itemID="{1547E796-3336-4CA3-A039-C51122E80770}">
   <ds:schemaRefs>
-    <ds:schemaRef ds:uri="http://purl.org/dc/elements/1.1/"/>
-    <ds:schemaRef ds:uri="http://schemas.microsoft.com/office/2006/metadata/properties"/>
-    <ds:schemaRef ds:uri="http://purl.org/dc/terms/"/>
-    <ds:schemaRef ds:uri="http://schemas.openxmlformats.org/package/2006/metadata/core-properties"/>
-    <ds:schemaRef ds:uri="http://schemas.microsoft.com/office/2006/documentManagement/types"/>
-    <ds:schemaRef ds:uri="http://purl.org/dc/dcmitype/"/>
-    <ds:schemaRef ds:uri="http://schemas.microsoft.com/office/infopath/2007/PartnerControls"/>
-    <ds:schemaRef ds:uri="http://www.w3.org/XML/1998/namespace"/>
+    <ds:schemaRef ds:uri="http://schemas.microsoft.com/sharepoint/v3/contenttype/forms"/>
   </ds:schemaRefs>
 </ds:datastoreItem>
 </file>
</xml_diff>

<commit_message>
Modification according to Eumar's comments
</commit_message>
<xml_diff>
--- a/Content/Starter Kit - Intelligent Apps & Analytics/0 - Starter Kit - Intelligent Apps & Analytics.pptx
+++ b/Content/Starter Kit - Intelligent Apps & Analytics/0 - Starter Kit - Intelligent Apps & Analytics.pptx
@@ -129,7 +129,127 @@
       </p:ext>
     </p:extLst>
   </p:cmAuthor>
+  <p:cmAuthor id="2" name="Eumar Assis" initials="EA" lastIdx="21" clrIdx="1">
+    <p:extLst>
+      <p:ext uri="{19B8F6BF-5375-455C-9EA6-DF929625EA0E}">
+        <p15:presenceInfo xmlns:p15="http://schemas.microsoft.com/office/powerpoint/2012/main" userId="S-1-5-21-124525095-708259637-1543119021-1495550" providerId="AD"/>
+      </p:ext>
+    </p:extLst>
+  </p:cmAuthor>
 </p:cmAuthorLst>
+</file>
+
+<file path=ppt/comments/comment1.xml><?xml version="1.0" encoding="utf-8"?>
+<p:cmLst xmlns:a="http://schemas.openxmlformats.org/drawingml/2006/main" xmlns:r="http://schemas.openxmlformats.org/officeDocument/2006/relationships" xmlns:p="http://schemas.openxmlformats.org/presentationml/2006/main">
+  <p:cm authorId="2" dt="2016-08-23T11:55:25.527" idx="14">
+    <p:pos x="2541" y="1378"/>
+    <p:text>Mention Power BI and AZURE (e.g. Azure SQL Data warehouse)</p:text>
+    <p:extLst mod="1">
+      <p:ext uri="{C676402C-5697-4E1C-873F-D02D1690AC5C}">
+        <p15:threadingInfo xmlns:p15="http://schemas.microsoft.com/office/powerpoint/2012/main" timeZoneBias="240"/>
+      </p:ext>
+    </p:extLst>
+  </p:cm>
+  <p:cm authorId="2" dt="2016-08-23T11:57:01.334" idx="2">
+    <p:pos x="5124" y="1212"/>
+    <p:text>Is this correct? Include  How Many HD Insight Nodes.</p:text>
+    <p:extLst>
+      <p:ext uri="{C676402C-5697-4E1C-873F-D02D1690AC5C}">
+        <p15:threadingInfo xmlns:p15="http://schemas.microsoft.com/office/powerpoint/2012/main" timeZoneBias="240"/>
+      </p:ext>
+    </p:extLst>
+  </p:cm>
+  <p:cm authorId="2" dt="2016-08-23T11:57:25.117" idx="13">
+    <p:pos x="5271" y="1587"/>
+    <p:text>Is this correct? Is 1Tb enough?</p:text>
+    <p:extLst>
+      <p:ext uri="{C676402C-5697-4E1C-873F-D02D1690AC5C}">
+        <p15:threadingInfo xmlns:p15="http://schemas.microsoft.com/office/powerpoint/2012/main" timeZoneBias="240"/>
+      </p:ext>
+    </p:extLst>
+  </p:cm>
+  <p:cm authorId="2" dt="2016-08-23T12:02:49.666" idx="7">
+    <p:pos x="2237" y="248"/>
+    <p:text>Can we add a sub title to reflect the business scenario we are helping to solve or example? E.g. Twitter Sentiment Analysis with  AZURE SQL DW and Power BI</p:text>
+    <p:extLst>
+      <p:ext uri="{C676402C-5697-4E1C-873F-D02D1690AC5C}">
+        <p15:threadingInfo xmlns:p15="http://schemas.microsoft.com/office/powerpoint/2012/main" timeZoneBias="240"/>
+      </p:ext>
+    </p:extLst>
+  </p:cm>
+</p:cmLst>
+</file>
+
+<file path=ppt/comments/comment2.xml><?xml version="1.0" encoding="utf-8"?>
+<p:cmLst xmlns:a="http://schemas.openxmlformats.org/drawingml/2006/main" xmlns:r="http://schemas.openxmlformats.org/officeDocument/2006/relationships" xmlns:p="http://schemas.openxmlformats.org/presentationml/2006/main">
+  <p:cm authorId="2" dt="2016-08-23T11:58:59.542" idx="17">
+    <p:pos x="5362" y="392"/>
+    <p:text>Why do we need HDInsight in this scenario?</p:text>
+    <p:extLst>
+      <p:ext uri="{C676402C-5697-4E1C-873F-D02D1690AC5C}">
+        <p15:threadingInfo xmlns:p15="http://schemas.microsoft.com/office/powerpoint/2012/main" timeZoneBias="240"/>
+      </p:ext>
+    </p:extLst>
+  </p:cm>
+  <p:cm authorId="2" dt="2016-08-23T12:00:16.339" idx="18">
+    <p:pos x="5362" y="488"/>
+    <p:text>My suggestions: Option 1: Power BI with Enterprise Connector
+Option 2: Azure Data Factory with Connector + Azure SQl Datawarehouse + Power BI Direct Query</p:text>
+    <p:extLst>
+      <p:ext uri="{C676402C-5697-4E1C-873F-D02D1690AC5C}">
+        <p15:threadingInfo xmlns:p15="http://schemas.microsoft.com/office/powerpoint/2012/main" timeZoneBias="240">
+          <p15:parentCm authorId="2" idx="17"/>
+        </p15:threadingInfo>
+      </p:ext>
+    </p:extLst>
+  </p:cm>
+  <p:cm authorId="2" dt="2016-08-23T12:00:40.213" idx="6">
+    <p:pos x="2873" y="1159"/>
+    <p:text>Recommend mentioning the benefits of Data factory</p:text>
+    <p:extLst>
+      <p:ext uri="{C676402C-5697-4E1C-873F-D02D1690AC5C}">
+        <p15:threadingInfo xmlns:p15="http://schemas.microsoft.com/office/powerpoint/2012/main" timeZoneBias="240"/>
+      </p:ext>
+    </p:extLst>
+  </p:cm>
+  <p:cm authorId="2" dt="2016-08-23T12:19:03.669" idx="8">
+    <p:pos x="2947" y="60"/>
+    <p:text>Can we add a sub title to reflect the business scenario we are helping to solve or example? E.g. Cloud Big Data for  Customer Churn Analysis with On-Premises Data</p:text>
+    <p:extLst>
+      <p:ext uri="{C676402C-5697-4E1C-873F-D02D1690AC5C}">
+        <p15:threadingInfo xmlns:p15="http://schemas.microsoft.com/office/powerpoint/2012/main" timeZoneBias="240"/>
+      </p:ext>
+    </p:extLst>
+  </p:cm>
+</p:cmLst>
+</file>
+
+<file path=ppt/comments/comment3.xml><?xml version="1.0" encoding="utf-8"?>
+<p:cmLst xmlns:a="http://schemas.openxmlformats.org/drawingml/2006/main" xmlns:r="http://schemas.openxmlformats.org/officeDocument/2006/relationships" xmlns:p="http://schemas.openxmlformats.org/presentationml/2006/main">
+  <p:cm authorId="2" dt="2016-08-23T12:21:33.070" idx="9">
+    <p:pos x="2786" y="33"/>
+    <p:text>Can we add a sub title to reflect the business scenario we are helping to solve or mention a practical example? E.g. Monitoring Elevator for Predictive Maintanence</p:text>
+    <p:extLst>
+      <p:ext uri="{C676402C-5697-4E1C-873F-D02D1690AC5C}">
+        <p15:threadingInfo xmlns:p15="http://schemas.microsoft.com/office/powerpoint/2012/main" timeZoneBias="240"/>
+      </p:ext>
+    </p:extLst>
+  </p:cm>
+</p:cmLst>
+</file>
+
+<file path=ppt/comments/comment4.xml><?xml version="1.0" encoding="utf-8"?>
+<p:cmLst xmlns:a="http://schemas.openxmlformats.org/drawingml/2006/main" xmlns:r="http://schemas.openxmlformats.org/officeDocument/2006/relationships" xmlns:p="http://schemas.openxmlformats.org/presentationml/2006/main">
+  <p:cm authorId="2" dt="2016-08-23T12:22:25.434" idx="10">
+    <p:pos x="3865" y="20"/>
+    <p:text>Can we add a sub title to reflect the business scenario we are helping to solve or mention a practical example? E.g. Call Center Sentiment Analysis with Cortana Intelligence Suite</p:text>
+    <p:extLst>
+      <p:ext uri="{C676402C-5697-4E1C-873F-D02D1690AC5C}">
+        <p15:threadingInfo xmlns:p15="http://schemas.microsoft.com/office/powerpoint/2012/main" timeZoneBias="240"/>
+      </p:ext>
+    </p:extLst>
+  </p:cm>
+</p:cmLst>
 </file>
 
 <file path=ppt/notesMasters/notesMaster1.xml><?xml version="1.0" encoding="utf-8"?>
@@ -214,7 +334,7 @@
           <a:p>
             <a:fld id="{386A5666-4B6A-423A-AB1B-8D7E7E0D4931}" type="datetimeFigureOut">
               <a:rPr lang="en-US" smtClean="0"/>
-              <a:t>8/23/2016</a:t>
+              <a:t>8/26/2016</a:t>
             </a:fld>
             <a:endParaRPr lang="en-US"/>
           </a:p>
@@ -1774,7 +1894,7 @@
           <a:p>
             <a:fld id="{DD6EF947-8D9F-492B-9CF5-9DCF2EF799ED}" type="datetimeFigureOut">
               <a:rPr lang="en-US" smtClean="0"/>
-              <a:t>8/23/2016</a:t>
+              <a:t>8/26/2016</a:t>
             </a:fld>
             <a:endParaRPr lang="en-US"/>
           </a:p>
@@ -1942,7 +2062,7 @@
           <a:p>
             <a:fld id="{DD6EF947-8D9F-492B-9CF5-9DCF2EF799ED}" type="datetimeFigureOut">
               <a:rPr lang="en-US" smtClean="0"/>
-              <a:t>8/23/2016</a:t>
+              <a:t>8/26/2016</a:t>
             </a:fld>
             <a:endParaRPr lang="en-US"/>
           </a:p>
@@ -2120,7 +2240,7 @@
           <a:p>
             <a:fld id="{DD6EF947-8D9F-492B-9CF5-9DCF2EF799ED}" type="datetimeFigureOut">
               <a:rPr lang="en-US" smtClean="0"/>
-              <a:t>8/23/2016</a:t>
+              <a:t>8/26/2016</a:t>
             </a:fld>
             <a:endParaRPr lang="en-US"/>
           </a:p>
@@ -2472,7 +2592,7 @@
           <a:p>
             <a:fld id="{DD6EF947-8D9F-492B-9CF5-9DCF2EF799ED}" type="datetimeFigureOut">
               <a:rPr lang="en-US" smtClean="0"/>
-              <a:t>8/23/2016</a:t>
+              <a:t>8/26/2016</a:t>
             </a:fld>
             <a:endParaRPr lang="en-US"/>
           </a:p>
@@ -2717,7 +2837,7 @@
           <a:p>
             <a:fld id="{DD6EF947-8D9F-492B-9CF5-9DCF2EF799ED}" type="datetimeFigureOut">
               <a:rPr lang="en-US" smtClean="0"/>
-              <a:t>8/23/2016</a:t>
+              <a:t>8/26/2016</a:t>
             </a:fld>
             <a:endParaRPr lang="en-US"/>
           </a:p>
@@ -2946,7 +3066,7 @@
           <a:p>
             <a:fld id="{DD6EF947-8D9F-492B-9CF5-9DCF2EF799ED}" type="datetimeFigureOut">
               <a:rPr lang="en-US" smtClean="0"/>
-              <a:t>8/23/2016</a:t>
+              <a:t>8/26/2016</a:t>
             </a:fld>
             <a:endParaRPr lang="en-US"/>
           </a:p>
@@ -3310,7 +3430,7 @@
           <a:p>
             <a:fld id="{DD6EF947-8D9F-492B-9CF5-9DCF2EF799ED}" type="datetimeFigureOut">
               <a:rPr lang="en-US" smtClean="0"/>
-              <a:t>8/23/2016</a:t>
+              <a:t>8/26/2016</a:t>
             </a:fld>
             <a:endParaRPr lang="en-US"/>
           </a:p>
@@ -3427,7 +3547,7 @@
           <a:p>
             <a:fld id="{DD6EF947-8D9F-492B-9CF5-9DCF2EF799ED}" type="datetimeFigureOut">
               <a:rPr lang="en-US" smtClean="0"/>
-              <a:t>8/23/2016</a:t>
+              <a:t>8/26/2016</a:t>
             </a:fld>
             <a:endParaRPr lang="en-US"/>
           </a:p>
@@ -3522,7 +3642,7 @@
           <a:p>
             <a:fld id="{DD6EF947-8D9F-492B-9CF5-9DCF2EF799ED}" type="datetimeFigureOut">
               <a:rPr lang="en-US" smtClean="0"/>
-              <a:t>8/23/2016</a:t>
+              <a:t>8/26/2016</a:t>
             </a:fld>
             <a:endParaRPr lang="en-US"/>
           </a:p>
@@ -3797,7 +3917,7 @@
           <a:p>
             <a:fld id="{DD6EF947-8D9F-492B-9CF5-9DCF2EF799ED}" type="datetimeFigureOut">
               <a:rPr lang="en-US" smtClean="0"/>
-              <a:t>8/23/2016</a:t>
+              <a:t>8/26/2016</a:t>
             </a:fld>
             <a:endParaRPr lang="en-US"/>
           </a:p>
@@ -4049,7 +4169,7 @@
           <a:p>
             <a:fld id="{DD6EF947-8D9F-492B-9CF5-9DCF2EF799ED}" type="datetimeFigureOut">
               <a:rPr lang="en-US" smtClean="0"/>
-              <a:t>8/23/2016</a:t>
+              <a:t>8/26/2016</a:t>
             </a:fld>
             <a:endParaRPr lang="en-US"/>
           </a:p>
@@ -4260,7 +4380,7 @@
           <a:p>
             <a:fld id="{DD6EF947-8D9F-492B-9CF5-9DCF2EF799ED}" type="datetimeFigureOut">
               <a:rPr lang="en-US" smtClean="0"/>
-              <a:t>8/23/2016</a:t>
+              <a:t>8/26/2016</a:t>
             </a:fld>
             <a:endParaRPr lang="en-US"/>
           </a:p>
@@ -4894,39 +5014,6 @@
       </p:sp>
       <p:sp>
         <p:nvSpPr>
-          <p:cNvPr id="2" name="Title 1"/>
-          <p:cNvSpPr>
-            <a:spLocks noGrp="1"/>
-          </p:cNvSpPr>
-          <p:nvPr>
-            <p:ph type="title"/>
-          </p:nvPr>
-        </p:nvSpPr>
-        <p:spPr>
-          <a:xfrm>
-            <a:off x="0" y="16794"/>
-            <a:ext cx="12087225" cy="744033"/>
-          </a:xfrm>
-        </p:spPr>
-        <p:txBody>
-          <a:bodyPr>
-            <a:noAutofit/>
-          </a:bodyPr>
-          <a:lstStyle/>
-          <a:p>
-            <a:r>
-              <a:rPr lang="EN-US" sz="2800" dirty="0">
-                <a:solidFill>
-                  <a:srgbClr val="0072C6"/>
-                </a:solidFill>
-              </a:rPr>
-              <a:t>Starter Kit: Advanced Analytics(SQL Azure DW with Power BI)</a:t>
-            </a:r>
-          </a:p>
-        </p:txBody>
-      </p:sp>
-      <p:sp>
-        <p:nvSpPr>
           <p:cNvPr id="32" name="TextBox 31"/>
           <p:cNvSpPr txBox="1"/>
           <p:nvPr/>
@@ -5352,7 +5439,7 @@
         <p:spPr>
           <a:xfrm>
             <a:off x="5825481" y="942678"/>
-            <a:ext cx="2789996" cy="3461295"/>
+            <a:ext cx="2789996" cy="3156596"/>
           </a:xfrm>
           <a:prstGeom prst="rect">
             <a:avLst/>
@@ -5415,50 +5502,14 @@
                   <a:schemeClr val="bg1"/>
                 </a:solidFill>
               </a:rPr>
-              <a:t>Scenario: Power BI with SQL Azure DW</a:t>
-            </a:r>
-          </a:p>
-          <a:p>
-            <a:pPr marL="285750" indent="-285750">
+              <a:t>Scenario: Power BI with SQL Azure Data Warehouse</a:t>
+            </a:r>
+          </a:p>
+          <a:p>
+            <a:pPr>
               <a:lnSpc>
                 <a:spcPct val="90000"/>
               </a:lnSpc>
-              <a:buFont typeface="Arial" panose="020B0604020202020204" pitchFamily="34" charset="0"/>
-              <a:buChar char="•"/>
-            </a:pPr>
-            <a:r>
-              <a:rPr lang="en-US" sz="1100" i="1" dirty="0">
-                <a:solidFill>
-                  <a:schemeClr val="bg1"/>
-                </a:solidFill>
-              </a:rPr>
-              <a:t>Analytics:</a:t>
-            </a:r>
-          </a:p>
-          <a:p>
-            <a:pPr marL="742950" lvl="1" indent="-285750">
-              <a:lnSpc>
-                <a:spcPct val="90000"/>
-              </a:lnSpc>
-              <a:buFont typeface="Arial" panose="020B0604020202020204" pitchFamily="34" charset="0"/>
-              <a:buChar char="•"/>
-            </a:pPr>
-            <a:r>
-              <a:rPr lang="en-US" sz="1100" i="1" dirty="0">
-                <a:solidFill>
-                  <a:schemeClr val="bg1"/>
-                </a:solidFill>
-              </a:rPr>
-              <a:t>HDInsight A4 Windows= $476.16</a:t>
-            </a:r>
-          </a:p>
-          <a:p>
-            <a:pPr marL="285750" indent="-285750">
-              <a:lnSpc>
-                <a:spcPct val="90000"/>
-              </a:lnSpc>
-              <a:buFont typeface="Arial" panose="020B0604020202020204" pitchFamily="34" charset="0"/>
-              <a:buChar char="•"/>
             </a:pPr>
             <a:endParaRPr lang="en-US" sz="1100" i="1" dirty="0">
               <a:solidFill>
@@ -5514,7 +5565,7 @@
                   <a:schemeClr val="bg1"/>
                 </a:solidFill>
               </a:rPr>
-              <a:t>1TB Block Blob Locally Redundant = $24.58</a:t>
+              <a:t>50TB Block Blob Locally Redundant = $1208.73</a:t>
             </a:r>
           </a:p>
           <a:p>
@@ -5531,7 +5582,7 @@
                   <a:schemeClr val="bg1"/>
                 </a:solidFill>
               </a:rPr>
-              <a:t>300 DWUs SQL Data Warehouse = $2700.05</a:t>
+              <a:t>300 DWUs SQL Data Warehouse = $900.24</a:t>
             </a:r>
           </a:p>
           <a:p>
@@ -5591,7 +5642,7 @@
                   <a:schemeClr val="bg1"/>
                 </a:solidFill>
               </a:rPr>
-              <a:t>Total : U$43,073.28 / Year</a:t>
+              <a:t>Total : U$ 29,971.44/ Year</a:t>
             </a:r>
             <a:endParaRPr lang="en-US" sz="1200" b="1" dirty="0">
               <a:solidFill>
@@ -6488,7 +6539,11 @@
           <a:lstStyle/>
           <a:p>
             <a:r>
-              <a:rPr lang="en-US" sz="900" dirty="0"/>
+              <a:rPr lang="en-US" sz="900" dirty="0">
+                <a:solidFill>
+                  <a:schemeClr val="accent1"/>
+                </a:solidFill>
+              </a:rPr>
               <a:t>Power BI Desktop</a:t>
             </a:r>
           </a:p>
@@ -6510,7 +6565,7 @@
         </p:blipFill>
         <p:spPr>
           <a:xfrm>
-            <a:off x="9090628" y="3093117"/>
+            <a:off x="9534889" y="3289149"/>
             <a:ext cx="607502" cy="606195"/>
           </a:xfrm>
           <a:prstGeom prst="rect">
@@ -6582,7 +6637,7 @@
         </p:blipFill>
         <p:spPr>
           <a:xfrm>
-            <a:off x="9797378" y="3408137"/>
+            <a:off x="10664923" y="3272121"/>
             <a:ext cx="640828" cy="461100"/>
           </a:xfrm>
           <a:prstGeom prst="rect">
@@ -6590,134 +6645,6 @@
           </a:prstGeom>
         </p:spPr>
       </p:pic>
-      <p:pic>
-        <p:nvPicPr>
-          <p:cNvPr id="21" name="Picture 20"/>
-          <p:cNvPicPr>
-            <a:picLocks noChangeAspect="1"/>
-          </p:cNvPicPr>
-          <p:nvPr/>
-        </p:nvPicPr>
-        <p:blipFill>
-          <a:blip r:embed="rId13"/>
-          <a:stretch>
-            <a:fillRect/>
-          </a:stretch>
-        </p:blipFill>
-        <p:spPr>
-          <a:xfrm>
-            <a:off x="10560599" y="3386308"/>
-            <a:ext cx="745453" cy="474150"/>
-          </a:xfrm>
-          <a:prstGeom prst="rect">
-            <a:avLst/>
-          </a:prstGeom>
-        </p:spPr>
-      </p:pic>
-      <p:pic>
-        <p:nvPicPr>
-          <p:cNvPr id="22" name="Picture 21"/>
-          <p:cNvPicPr>
-            <a:picLocks noChangeAspect="1"/>
-          </p:cNvPicPr>
-          <p:nvPr/>
-        </p:nvPicPr>
-        <p:blipFill>
-          <a:blip r:embed="rId14"/>
-          <a:stretch>
-            <a:fillRect/>
-          </a:stretch>
-        </p:blipFill>
-        <p:spPr>
-          <a:xfrm>
-            <a:off x="10819217" y="2820856"/>
-            <a:ext cx="566719" cy="421950"/>
-          </a:xfrm>
-          <a:prstGeom prst="rect">
-            <a:avLst/>
-          </a:prstGeom>
-        </p:spPr>
-      </p:pic>
-      <p:cxnSp>
-        <p:nvCxnSpPr>
-          <p:cNvPr id="24" name="Straight Arrow Connector 23"/>
-          <p:cNvCxnSpPr>
-            <a:stCxn id="22" idx="1"/>
-            <a:endCxn id="21" idx="0"/>
-          </p:cNvCxnSpPr>
-          <p:nvPr/>
-        </p:nvCxnSpPr>
-        <p:spPr>
-          <a:xfrm rot="10800000" flipH="1" flipV="1">
-            <a:off x="10819216" y="3031830"/>
-            <a:ext cx="114109" cy="354477"/>
-          </a:xfrm>
-          <a:prstGeom prst="curvedConnector4">
-            <a:avLst>
-              <a:gd name="adj1" fmla="val -200335"/>
-              <a:gd name="adj2" fmla="val 79759"/>
-            </a:avLst>
-          </a:prstGeom>
-          <a:ln>
-            <a:solidFill>
-              <a:schemeClr val="accent1"/>
-            </a:solidFill>
-            <a:prstDash val="sysDash"/>
-            <a:tailEnd type="triangle"/>
-          </a:ln>
-        </p:spPr>
-        <p:style>
-          <a:lnRef idx="1">
-            <a:schemeClr val="accent1"/>
-          </a:lnRef>
-          <a:fillRef idx="0">
-            <a:schemeClr val="accent1"/>
-          </a:fillRef>
-          <a:effectRef idx="0">
-            <a:schemeClr val="accent1"/>
-          </a:effectRef>
-          <a:fontRef idx="minor">
-            <a:schemeClr val="tx1"/>
-          </a:fontRef>
-        </p:style>
-      </p:cxnSp>
-      <p:cxnSp>
-        <p:nvCxnSpPr>
-          <p:cNvPr id="30" name="Curved Connector 29"/>
-          <p:cNvCxnSpPr>
-            <a:stCxn id="21" idx="1"/>
-            <a:endCxn id="20" idx="3"/>
-          </p:cNvCxnSpPr>
-          <p:nvPr/>
-        </p:nvCxnSpPr>
-        <p:spPr>
-          <a:xfrm rot="10800000" flipV="1">
-            <a:off x="10438207" y="3623383"/>
-            <a:ext cx="122393" cy="15304"/>
-          </a:xfrm>
-          <a:prstGeom prst="curvedConnector3">
-            <a:avLst/>
-          </a:prstGeom>
-          <a:ln>
-            <a:prstDash val="sysDash"/>
-            <a:tailEnd type="triangle"/>
-          </a:ln>
-        </p:spPr>
-        <p:style>
-          <a:lnRef idx="1">
-            <a:schemeClr val="accent1"/>
-          </a:lnRef>
-          <a:fillRef idx="0">
-            <a:schemeClr val="accent1"/>
-          </a:fillRef>
-          <a:effectRef idx="0">
-            <a:schemeClr val="accent1"/>
-          </a:effectRef>
-          <a:fontRef idx="minor">
-            <a:schemeClr val="tx1"/>
-          </a:fontRef>
-        </p:style>
-      </p:cxnSp>
       <p:cxnSp>
         <p:nvCxnSpPr>
           <p:cNvPr id="34" name="Curved Connector 33"/>
@@ -6728,9 +6655,9 @@
           <p:nvPr/>
         </p:nvCxnSpPr>
         <p:spPr>
-          <a:xfrm rot="10800000">
-            <a:off x="9698130" y="3396215"/>
-            <a:ext cx="99248" cy="242472"/>
+          <a:xfrm rot="10800000" flipV="1">
+            <a:off x="10142391" y="3502671"/>
+            <a:ext cx="522532" cy="89576"/>
           </a:xfrm>
           <a:prstGeom prst="curvedConnector3">
             <a:avLst/>
@@ -6766,12 +6693,12 @@
         </p:nvCxnSpPr>
         <p:spPr>
           <a:xfrm rot="5400000" flipH="1" flipV="1">
-            <a:off x="9775166" y="2679046"/>
-            <a:ext cx="33284" cy="794858"/>
+            <a:off x="9899280" y="2999193"/>
+            <a:ext cx="229316" cy="350597"/>
           </a:xfrm>
           <a:prstGeom prst="curvedConnector3">
             <a:avLst>
-              <a:gd name="adj1" fmla="val -149396"/>
+              <a:gd name="adj1" fmla="val 50000"/>
             </a:avLst>
           </a:prstGeom>
           <a:ln>
@@ -6803,7 +6730,7 @@
           <p:nvPr/>
         </p:nvPicPr>
         <p:blipFill>
-          <a:blip r:embed="rId15"/>
+          <a:blip r:embed="rId13"/>
           <a:stretch>
             <a:fillRect/>
           </a:stretch>
@@ -6827,7 +6754,7 @@
           <p:nvPr/>
         </p:nvPicPr>
         <p:blipFill>
-          <a:blip r:embed="rId16"/>
+          <a:blip r:embed="rId14"/>
           <a:stretch>
             <a:fillRect/>
           </a:stretch>
@@ -6851,7 +6778,7 @@
           <p:nvPr/>
         </p:nvPicPr>
         <p:blipFill>
-          <a:blip r:embed="rId17"/>
+          <a:blip r:embed="rId15"/>
           <a:stretch>
             <a:fillRect/>
           </a:stretch>
@@ -6889,7 +6816,11 @@
           <a:lstStyle/>
           <a:p>
             <a:r>
-              <a:rPr lang="en-US" sz="900" dirty="0"/>
+              <a:rPr lang="en-US" sz="900" dirty="0">
+                <a:solidFill>
+                  <a:schemeClr val="accent1"/>
+                </a:solidFill>
+              </a:rPr>
               <a:t>Power BI Mobile App</a:t>
             </a:r>
           </a:p>
@@ -6998,6 +6929,64 @@
           </a:fontRef>
         </p:style>
       </p:cxnSp>
+      <p:sp>
+        <p:nvSpPr>
+          <p:cNvPr id="41" name="Title 1"/>
+          <p:cNvSpPr>
+            <a:spLocks noGrp="1"/>
+          </p:cNvSpPr>
+          <p:nvPr>
+            <p:ph type="title"/>
+          </p:nvPr>
+        </p:nvSpPr>
+        <p:spPr>
+          <a:xfrm>
+            <a:off x="-2440" y="-12644"/>
+            <a:ext cx="12194439" cy="744138"/>
+          </a:xfrm>
+        </p:spPr>
+        <p:txBody>
+          <a:bodyPr anchor="t">
+            <a:noAutofit/>
+          </a:bodyPr>
+          <a:lstStyle/>
+          <a:p>
+            <a:pPr>
+              <a:lnSpc>
+                <a:spcPts val="3000"/>
+              </a:lnSpc>
+            </a:pPr>
+            <a:r>
+              <a:rPr lang="en-US" sz="2800" dirty="0">
+                <a:solidFill>
+                  <a:srgbClr val="0072C6"/>
+                </a:solidFill>
+              </a:rPr>
+              <a:t>Starter Kit: Advanced Analytics(SQL Azure Data Warehouse with Power BI)</a:t>
+            </a:r>
+            <a:br>
+              <a:rPr lang="EN-US" sz="2800" dirty="0">
+                <a:solidFill>
+                  <a:srgbClr val="0072C6"/>
+                </a:solidFill>
+              </a:rPr>
+            </a:br>
+            <a:r>
+              <a:rPr lang="en-US" sz="1800" dirty="0">
+                <a:solidFill>
+                  <a:schemeClr val="accent3"/>
+                </a:solidFill>
+              </a:rPr>
+              <a:t>Twitter Sentiment Analysis AZURE DW and Power BI</a:t>
+            </a:r>
+            <a:endParaRPr lang="EN-US" sz="2800" dirty="0">
+              <a:solidFill>
+                <a:srgbClr val="0072C6"/>
+              </a:solidFill>
+            </a:endParaRPr>
+          </a:p>
+        </p:txBody>
+      </p:sp>
     </p:spTree>
     <p:extLst>
       <p:ext uri="{BB962C8B-B14F-4D97-AF65-F5344CB8AC3E}">
@@ -7320,44 +7309,6 @@
       </p:sp>
       <p:sp>
         <p:nvSpPr>
-          <p:cNvPr id="2" name="Title 1"/>
-          <p:cNvSpPr>
-            <a:spLocks noGrp="1"/>
-          </p:cNvSpPr>
-          <p:nvPr>
-            <p:ph type="title"/>
-          </p:nvPr>
-        </p:nvSpPr>
-        <p:spPr>
-          <a:xfrm>
-            <a:off x="49821" y="49954"/>
-            <a:ext cx="11536084" cy="744033"/>
-          </a:xfrm>
-        </p:spPr>
-        <p:txBody>
-          <a:bodyPr>
-            <a:noAutofit/>
-          </a:bodyPr>
-          <a:lstStyle/>
-          <a:p>
-            <a:r>
-              <a:rPr lang="EN-US" sz="2800" dirty="0">
-                <a:solidFill>
-                  <a:srgbClr val="0072C6"/>
-                </a:solidFill>
-              </a:rPr>
-              <a:t>Starter Kit: Advanced Analytics (On-Premises Data Sources)</a:t>
-            </a:r>
-            <a:endParaRPr lang="EN-US" sz="2800" dirty="0">
-              <a:solidFill>
-                <a:schemeClr val="tx2"/>
-              </a:solidFill>
-            </a:endParaRPr>
-          </a:p>
-        </p:txBody>
-      </p:sp>
-      <p:sp>
-        <p:nvSpPr>
           <p:cNvPr id="32" name="TextBox 31"/>
           <p:cNvSpPr txBox="1"/>
           <p:nvPr/>
@@ -7687,7 +7638,7 @@
         <p:spPr>
           <a:xfrm>
             <a:off x="3107639" y="850884"/>
-            <a:ext cx="2579950" cy="5372587"/>
+            <a:ext cx="2579950" cy="5995835"/>
           </a:xfrm>
           <a:prstGeom prst="rect">
             <a:avLst/>
@@ -7748,7 +7699,7 @@
                   <a:schemeClr val="bg1"/>
                 </a:solidFill>
               </a:rPr>
-              <a:t>Microsoft provide Power BI service to quickly create self-service online reports. You pay for what you use and no more:</a:t>
+              <a:t>Microsoft provide Power BI service to quickly create self-service online reports. Also, Azure Data Factory is a  globally deployed data movement service in the cloud. Use it to ingest data from multiple on-premises and cloud sources easily. You pay for what you use and no more:</a:t>
             </a:r>
           </a:p>
           <a:p>
@@ -7837,57 +7788,12 @@
               </a:rPr>
               <a:t>refreshed </a:t>
             </a:r>
-          </a:p>
-          <a:p>
-            <a:pPr marL="285750" lvl="0" indent="-285750">
-              <a:lnSpc>
-                <a:spcPct val="90000"/>
-              </a:lnSpc>
-              <a:buFont typeface="Arial" panose="020B0604020202020204" pitchFamily="34" charset="0"/>
-              <a:buChar char="•"/>
-            </a:pPr>
-            <a:r>
-              <a:rPr lang="en-US" sz="1400" dirty="0">
-                <a:solidFill>
-                  <a:schemeClr val="bg1"/>
-                </a:solidFill>
-              </a:rPr>
-              <a:t> </a:t>
-            </a:r>
-          </a:p>
-          <a:p>
-            <a:pPr marL="285750" lvl="0" indent="-285750">
-              <a:lnSpc>
-                <a:spcPct val="90000"/>
-              </a:lnSpc>
-              <a:buFont typeface="Arial" panose="020B0604020202020204" pitchFamily="34" charset="0"/>
-              <a:buChar char="•"/>
-            </a:pPr>
             <a:endParaRPr lang="en-US" sz="1300" b="1" dirty="0">
               <a:solidFill>
                 <a:schemeClr val="bg1"/>
               </a:solidFill>
             </a:endParaRPr>
           </a:p>
-          <a:p>
-            <a:pPr>
-              <a:lnSpc>
-                <a:spcPct val="90000"/>
-              </a:lnSpc>
-            </a:pPr>
-            <a:br>
-              <a:rPr lang="en-US" sz="1300" b="1" dirty="0">
-                <a:solidFill>
-                  <a:schemeClr val="bg1"/>
-                </a:solidFill>
-              </a:rPr>
-            </a:br>
-            <a:endParaRPr lang="en-US" sz="1300" b="1" dirty="0">
-              <a:solidFill>
-                <a:schemeClr val="bg1"/>
-              </a:solidFill>
-            </a:endParaRPr>
-          </a:p>
         </p:txBody>
       </p:sp>
       <p:sp>
@@ -7899,7 +7805,7 @@
         <p:spPr>
           <a:xfrm>
             <a:off x="5817863" y="845996"/>
-            <a:ext cx="2818824" cy="3295095"/>
+            <a:ext cx="2818824" cy="2685698"/>
           </a:xfrm>
           <a:prstGeom prst="rect">
             <a:avLst/>
@@ -7964,49 +7870,6 @@
               </a:rPr>
               <a:t>Scenario: Power BI with On-premises Data Sources</a:t>
             </a:r>
-          </a:p>
-          <a:p>
-            <a:pPr marL="285750" indent="-285750">
-              <a:lnSpc>
-                <a:spcPct val="90000"/>
-              </a:lnSpc>
-              <a:buFont typeface="Arial" panose="020B0604020202020204" pitchFamily="34" charset="0"/>
-              <a:buChar char="•"/>
-            </a:pPr>
-            <a:r>
-              <a:rPr lang="en-US" sz="1100" i="1" dirty="0">
-                <a:solidFill>
-                  <a:schemeClr val="bg1"/>
-                </a:solidFill>
-              </a:rPr>
-              <a:t>Analytics:</a:t>
-            </a:r>
-          </a:p>
-          <a:p>
-            <a:pPr marL="742950" lvl="1" indent="-285750">
-              <a:lnSpc>
-                <a:spcPct val="90000"/>
-              </a:lnSpc>
-              <a:buFont typeface="Arial" panose="020B0604020202020204" pitchFamily="34" charset="0"/>
-              <a:buChar char="•"/>
-            </a:pPr>
-            <a:r>
-              <a:rPr lang="en-US" sz="1100" i="1" dirty="0">
-                <a:solidFill>
-                  <a:schemeClr val="bg1"/>
-                </a:solidFill>
-              </a:rPr>
-              <a:t>HDInsight A2 Windows= $238.08</a:t>
-            </a:r>
-          </a:p>
-          <a:p>
-            <a:pPr marL="285750" indent="-285750">
-              <a:lnSpc>
-                <a:spcPct val="90000"/>
-              </a:lnSpc>
-              <a:buFont typeface="Arial" panose="020B0604020202020204" pitchFamily="34" charset="0"/>
-              <a:buChar char="•"/>
-            </a:pPr>
             <a:endParaRPr lang="en-US" sz="1100" i="1" dirty="0">
               <a:solidFill>
                 <a:schemeClr val="bg1"/>
@@ -8061,7 +7924,7 @@
                   <a:schemeClr val="bg1"/>
                 </a:solidFill>
               </a:rPr>
-              <a:t>1TB Block Blob Locally Redundant = $24.58</a:t>
+              <a:t>50TB Block Blob Locally Redundant = $1208.73</a:t>
             </a:r>
           </a:p>
           <a:p>
@@ -8123,7 +7986,7 @@
                   <a:prstClr val="white"/>
                 </a:solidFill>
               </a:rPr>
-              <a:t>Total : U$7815.72/ Year</a:t>
+              <a:t>Total : U$ 19,168.56/ Year</a:t>
             </a:r>
             <a:endParaRPr lang="en-US" sz="1200" b="1" dirty="0">
               <a:solidFill>
@@ -9053,7 +8916,7 @@
         </p:nvSpPr>
         <p:spPr>
           <a:xfrm>
-            <a:off x="8692272" y="1293990"/>
+            <a:off x="8671227" y="1293990"/>
             <a:ext cx="3224749" cy="3122294"/>
           </a:xfrm>
           <a:prstGeom prst="cloud">
@@ -9163,7 +9026,11 @@
           <a:lstStyle/>
           <a:p>
             <a:r>
-              <a:rPr lang="en-US" sz="900" dirty="0"/>
+              <a:rPr lang="en-US" sz="900" dirty="0">
+                <a:solidFill>
+                  <a:schemeClr val="accent1"/>
+                </a:solidFill>
+              </a:rPr>
               <a:t>Power BI Desktop</a:t>
             </a:r>
           </a:p>
@@ -9233,7 +9100,7 @@
         </p:blipFill>
         <p:spPr>
           <a:xfrm>
-            <a:off x="9786047" y="3408137"/>
+            <a:off x="10639275" y="3296163"/>
             <a:ext cx="640828" cy="461100"/>
           </a:xfrm>
           <a:prstGeom prst="rect">
@@ -9241,146 +9108,19 @@
           </a:prstGeom>
         </p:spPr>
       </p:pic>
-      <p:pic>
-        <p:nvPicPr>
-          <p:cNvPr id="33" name="Picture 32"/>
-          <p:cNvPicPr>
-            <a:picLocks noChangeAspect="1"/>
-          </p:cNvPicPr>
-          <p:nvPr/>
-        </p:nvPicPr>
-        <p:blipFill>
-          <a:blip r:embed="rId12"/>
-          <a:stretch>
-            <a:fillRect/>
-          </a:stretch>
-        </p:blipFill>
-        <p:spPr>
-          <a:xfrm>
-            <a:off x="10549268" y="3386308"/>
-            <a:ext cx="745453" cy="474150"/>
-          </a:xfrm>
-          <a:prstGeom prst="rect">
-            <a:avLst/>
-          </a:prstGeom>
-        </p:spPr>
-      </p:pic>
-      <p:pic>
-        <p:nvPicPr>
-          <p:cNvPr id="34" name="Picture 33"/>
-          <p:cNvPicPr>
-            <a:picLocks noChangeAspect="1"/>
-          </p:cNvPicPr>
-          <p:nvPr/>
-        </p:nvPicPr>
-        <p:blipFill>
-          <a:blip r:embed="rId13"/>
-          <a:stretch>
-            <a:fillRect/>
-          </a:stretch>
-        </p:blipFill>
-        <p:spPr>
-          <a:xfrm>
-            <a:off x="10807886" y="2820856"/>
-            <a:ext cx="566719" cy="421950"/>
-          </a:xfrm>
-          <a:prstGeom prst="rect">
-            <a:avLst/>
-          </a:prstGeom>
-        </p:spPr>
-      </p:pic>
-      <p:cxnSp>
-        <p:nvCxnSpPr>
-          <p:cNvPr id="37" name="Straight Arrow Connector 23"/>
-          <p:cNvCxnSpPr>
-            <a:stCxn id="34" idx="1"/>
-            <a:endCxn id="33" idx="0"/>
-          </p:cNvCxnSpPr>
-          <p:nvPr/>
-        </p:nvCxnSpPr>
-        <p:spPr>
-          <a:xfrm rot="10800000" flipH="1" flipV="1">
-            <a:off x="10807885" y="3031830"/>
-            <a:ext cx="114109" cy="354477"/>
-          </a:xfrm>
-          <a:prstGeom prst="curvedConnector4">
-            <a:avLst>
-              <a:gd name="adj1" fmla="val -200335"/>
-              <a:gd name="adj2" fmla="val 79759"/>
-            </a:avLst>
-          </a:prstGeom>
-          <a:ln>
-            <a:solidFill>
-              <a:schemeClr val="accent1"/>
-            </a:solidFill>
-            <a:prstDash val="sysDash"/>
-            <a:tailEnd type="triangle"/>
-          </a:ln>
-        </p:spPr>
-        <p:style>
-          <a:lnRef idx="1">
-            <a:schemeClr val="accent1"/>
-          </a:lnRef>
-          <a:fillRef idx="0">
-            <a:schemeClr val="accent1"/>
-          </a:fillRef>
-          <a:effectRef idx="0">
-            <a:schemeClr val="accent1"/>
-          </a:effectRef>
-          <a:fontRef idx="minor">
-            <a:schemeClr val="tx1"/>
-          </a:fontRef>
-        </p:style>
-      </p:cxnSp>
-      <p:cxnSp>
-        <p:nvCxnSpPr>
-          <p:cNvPr id="38" name="Curved Connector 37"/>
-          <p:cNvCxnSpPr>
-            <a:stCxn id="33" idx="1"/>
-            <a:endCxn id="30" idx="3"/>
-          </p:cNvCxnSpPr>
-          <p:nvPr/>
-        </p:nvCxnSpPr>
-        <p:spPr>
-          <a:xfrm rot="10800000" flipV="1">
-            <a:off x="10426876" y="3623383"/>
-            <a:ext cx="122393" cy="15304"/>
-          </a:xfrm>
-          <a:prstGeom prst="curvedConnector3">
-            <a:avLst/>
-          </a:prstGeom>
-          <a:ln>
-            <a:prstDash val="sysDash"/>
-            <a:tailEnd type="triangle"/>
-          </a:ln>
-        </p:spPr>
-        <p:style>
-          <a:lnRef idx="1">
-            <a:schemeClr val="accent1"/>
-          </a:lnRef>
-          <a:fillRef idx="0">
-            <a:schemeClr val="accent1"/>
-          </a:fillRef>
-          <a:effectRef idx="0">
-            <a:schemeClr val="accent1"/>
-          </a:effectRef>
-          <a:fontRef idx="minor">
-            <a:schemeClr val="tx1"/>
-          </a:fontRef>
-        </p:style>
-      </p:cxnSp>
       <p:cxnSp>
         <p:nvCxnSpPr>
           <p:cNvPr id="40" name="Curved Connector 39"/>
           <p:cNvCxnSpPr>
             <a:stCxn id="30" idx="1"/>
+            <a:endCxn id="3" idx="3"/>
           </p:cNvCxnSpPr>
           <p:nvPr/>
         </p:nvCxnSpPr>
         <p:spPr>
           <a:xfrm rot="10800000">
-            <a:off x="9686799" y="3396215"/>
-            <a:ext cx="99248" cy="242472"/>
+            <a:off x="9925751" y="3516643"/>
+            <a:ext cx="713524" cy="10071"/>
           </a:xfrm>
           <a:prstGeom prst="curvedConnector3">
             <a:avLst/>
@@ -9416,8 +9156,8 @@
         </p:nvCxnSpPr>
         <p:spPr>
           <a:xfrm rot="5400000" flipH="1" flipV="1">
-            <a:off x="9763365" y="2775503"/>
-            <a:ext cx="130210" cy="698871"/>
+            <a:off x="9626467" y="2829311"/>
+            <a:ext cx="320917" cy="781962"/>
           </a:xfrm>
           <a:prstGeom prst="curvedConnector3">
             <a:avLst>
@@ -9453,6 +9193,54 @@
           <p:nvPr/>
         </p:nvPicPr>
         <p:blipFill>
+          <a:blip r:embed="rId12"/>
+          <a:stretch>
+            <a:fillRect/>
+          </a:stretch>
+        </p:blipFill>
+        <p:spPr>
+          <a:xfrm>
+            <a:off x="10334619" y="1789981"/>
+            <a:ext cx="537093" cy="483828"/>
+          </a:xfrm>
+          <a:prstGeom prst="rect">
+            <a:avLst/>
+          </a:prstGeom>
+        </p:spPr>
+      </p:pic>
+      <p:pic>
+        <p:nvPicPr>
+          <p:cNvPr id="43" name="Picture 42"/>
+          <p:cNvPicPr>
+            <a:picLocks noChangeAspect="1"/>
+          </p:cNvPicPr>
+          <p:nvPr/>
+        </p:nvPicPr>
+        <p:blipFill>
+          <a:blip r:embed="rId13"/>
+          <a:stretch>
+            <a:fillRect/>
+          </a:stretch>
+        </p:blipFill>
+        <p:spPr>
+          <a:xfrm>
+            <a:off x="10866119" y="1732067"/>
+            <a:ext cx="374906" cy="639450"/>
+          </a:xfrm>
+          <a:prstGeom prst="rect">
+            <a:avLst/>
+          </a:prstGeom>
+        </p:spPr>
+      </p:pic>
+      <p:pic>
+        <p:nvPicPr>
+          <p:cNvPr id="45" name="Picture 44"/>
+          <p:cNvPicPr>
+            <a:picLocks noChangeAspect="1"/>
+          </p:cNvPicPr>
+          <p:nvPr/>
+        </p:nvPicPr>
+        <p:blipFill>
           <a:blip r:embed="rId14"/>
           <a:stretch>
             <a:fillRect/>
@@ -9460,17 +9248,79 @@
         </p:blipFill>
         <p:spPr>
           <a:xfrm>
-            <a:off x="10334619" y="1789981"/>
-            <a:ext cx="537093" cy="483828"/>
+            <a:off x="11280103" y="1769761"/>
+            <a:ext cx="357469" cy="513300"/>
           </a:xfrm>
           <a:prstGeom prst="rect">
             <a:avLst/>
           </a:prstGeom>
         </p:spPr>
       </p:pic>
+      <p:sp>
+        <p:nvSpPr>
+          <p:cNvPr id="46" name="TextBox 45"/>
+          <p:cNvSpPr txBox="1"/>
+          <p:nvPr/>
+        </p:nvSpPr>
+        <p:spPr>
+          <a:xfrm>
+            <a:off x="10523930" y="2304124"/>
+            <a:ext cx="1168351" cy="230832"/>
+          </a:xfrm>
+          <a:prstGeom prst="rect">
+            <a:avLst/>
+          </a:prstGeom>
+          <a:noFill/>
+        </p:spPr>
+        <p:txBody>
+          <a:bodyPr wrap="square" rtlCol="0">
+            <a:spAutoFit/>
+          </a:bodyPr>
+          <a:lstStyle/>
+          <a:p>
+            <a:r>
+              <a:rPr lang="en-US" sz="900" dirty="0">
+                <a:solidFill>
+                  <a:schemeClr val="accent1"/>
+                </a:solidFill>
+              </a:rPr>
+              <a:t>Power BI Mobile App</a:t>
+            </a:r>
+          </a:p>
+        </p:txBody>
+      </p:sp>
+      <p:sp>
+        <p:nvSpPr>
+          <p:cNvPr id="47" name="TextBox 46"/>
+          <p:cNvSpPr txBox="1"/>
+          <p:nvPr/>
+        </p:nvSpPr>
+        <p:spPr>
+          <a:xfrm>
+            <a:off x="10365030" y="2650144"/>
+            <a:ext cx="1176130" cy="230832"/>
+          </a:xfrm>
+          <a:prstGeom prst="rect">
+            <a:avLst/>
+          </a:prstGeom>
+          <a:noFill/>
+        </p:spPr>
+        <p:txBody>
+          <a:bodyPr wrap="square" rtlCol="0">
+            <a:spAutoFit/>
+          </a:bodyPr>
+          <a:lstStyle/>
+          <a:p>
+            <a:r>
+              <a:rPr lang="en-US" sz="900" b="1" dirty="0"/>
+              <a:t>Power BI</a:t>
+            </a:r>
+          </a:p>
+        </p:txBody>
+      </p:sp>
       <p:pic>
         <p:nvPicPr>
-          <p:cNvPr id="43" name="Picture 42"/>
+          <p:cNvPr id="3" name="Picture 2"/>
           <p:cNvPicPr>
             <a:picLocks noChangeAspect="1"/>
           </p:cNvPicPr>
@@ -9484,113 +9334,7 @@
         </p:blipFill>
         <p:spPr>
           <a:xfrm>
-            <a:off x="10866119" y="1732067"/>
-            <a:ext cx="374906" cy="639450"/>
-          </a:xfrm>
-          <a:prstGeom prst="rect">
-            <a:avLst/>
-          </a:prstGeom>
-        </p:spPr>
-      </p:pic>
-      <p:pic>
-        <p:nvPicPr>
-          <p:cNvPr id="45" name="Picture 44"/>
-          <p:cNvPicPr>
-            <a:picLocks noChangeAspect="1"/>
-          </p:cNvPicPr>
-          <p:nvPr/>
-        </p:nvPicPr>
-        <p:blipFill>
-          <a:blip r:embed="rId16"/>
-          <a:stretch>
-            <a:fillRect/>
-          </a:stretch>
-        </p:blipFill>
-        <p:spPr>
-          <a:xfrm>
-            <a:off x="11280103" y="1769761"/>
-            <a:ext cx="357469" cy="513300"/>
-          </a:xfrm>
-          <a:prstGeom prst="rect">
-            <a:avLst/>
-          </a:prstGeom>
-        </p:spPr>
-      </p:pic>
-      <p:sp>
-        <p:nvSpPr>
-          <p:cNvPr id="46" name="TextBox 45"/>
-          <p:cNvSpPr txBox="1"/>
-          <p:nvPr/>
-        </p:nvSpPr>
-        <p:spPr>
-          <a:xfrm>
-            <a:off x="10523930" y="2304124"/>
-            <a:ext cx="1168351" cy="230832"/>
-          </a:xfrm>
-          <a:prstGeom prst="rect">
-            <a:avLst/>
-          </a:prstGeom>
-          <a:noFill/>
-        </p:spPr>
-        <p:txBody>
-          <a:bodyPr wrap="square" rtlCol="0">
-            <a:spAutoFit/>
-          </a:bodyPr>
-          <a:lstStyle/>
-          <a:p>
-            <a:r>
-              <a:rPr lang="en-US" sz="900" dirty="0"/>
-              <a:t>Power BI Mobile App</a:t>
-            </a:r>
-          </a:p>
-        </p:txBody>
-      </p:sp>
-      <p:sp>
-        <p:nvSpPr>
-          <p:cNvPr id="47" name="TextBox 46"/>
-          <p:cNvSpPr txBox="1"/>
-          <p:nvPr/>
-        </p:nvSpPr>
-        <p:spPr>
-          <a:xfrm>
-            <a:off x="10365030" y="2650144"/>
-            <a:ext cx="1176130" cy="230832"/>
-          </a:xfrm>
-          <a:prstGeom prst="rect">
-            <a:avLst/>
-          </a:prstGeom>
-          <a:noFill/>
-        </p:spPr>
-        <p:txBody>
-          <a:bodyPr wrap="square" rtlCol="0">
-            <a:spAutoFit/>
-          </a:bodyPr>
-          <a:lstStyle/>
-          <a:p>
-            <a:r>
-              <a:rPr lang="en-US" sz="900" b="1" dirty="0"/>
-              <a:t>Power BI</a:t>
-            </a:r>
-          </a:p>
-        </p:txBody>
-      </p:sp>
-      <p:pic>
-        <p:nvPicPr>
-          <p:cNvPr id="3" name="Picture 2"/>
-          <p:cNvPicPr>
-            <a:picLocks noChangeAspect="1"/>
-          </p:cNvPicPr>
-          <p:nvPr/>
-        </p:nvPicPr>
-        <p:blipFill>
-          <a:blip r:embed="rId17"/>
-          <a:stretch>
-            <a:fillRect/>
-          </a:stretch>
-        </p:blipFill>
-        <p:spPr>
-          <a:xfrm>
-            <a:off x="8949228" y="3190043"/>
+            <a:off x="8866137" y="3380750"/>
             <a:ext cx="1059614" cy="271784"/>
           </a:xfrm>
           <a:prstGeom prst="rect">
@@ -9679,7 +9423,7 @@
         </p:nvSpPr>
         <p:spPr>
           <a:xfrm>
-            <a:off x="9277632" y="3490623"/>
+            <a:off x="9950913" y="3526588"/>
             <a:ext cx="1079074" cy="200055"/>
           </a:xfrm>
           <a:prstGeom prst="rect">
@@ -9694,12 +9438,96 @@
           <a:lstStyle/>
           <a:p>
             <a:r>
-              <a:rPr lang="en-US" altLang="zh-CN" sz="700" dirty="0" err="1"/>
-              <a:t>Polybase</a:t>
-            </a:r>
-            <a:r>
               <a:rPr lang="en-US" altLang="zh-CN" sz="700" dirty="0"/>
-              <a:t> access</a:t>
+              <a:t>Polybase Access</a:t>
+            </a:r>
+            <a:endParaRPr lang="en-US" sz="700" dirty="0"/>
+          </a:p>
+        </p:txBody>
+      </p:sp>
+      <p:sp>
+        <p:nvSpPr>
+          <p:cNvPr id="51" name="Title 1"/>
+          <p:cNvSpPr>
+            <a:spLocks noGrp="1"/>
+          </p:cNvSpPr>
+          <p:nvPr>
+            <p:ph type="title"/>
+          </p:nvPr>
+        </p:nvSpPr>
+        <p:spPr>
+          <a:xfrm>
+            <a:off x="0" y="4763"/>
+            <a:ext cx="11655425" cy="744537"/>
+          </a:xfrm>
+        </p:spPr>
+        <p:txBody>
+          <a:bodyPr anchor="t">
+            <a:noAutofit/>
+          </a:bodyPr>
+          <a:lstStyle/>
+          <a:p>
+            <a:pPr>
+              <a:lnSpc>
+                <a:spcPts val="3000"/>
+              </a:lnSpc>
+            </a:pPr>
+            <a:r>
+              <a:rPr lang="en-US" sz="2800" dirty="0">
+                <a:solidFill>
+                  <a:srgbClr val="0072C6"/>
+                </a:solidFill>
+              </a:rPr>
+              <a:t>Starter Kit: Advanced Analytics (On-Premises Data Sources)</a:t>
+            </a:r>
+            <a:br>
+              <a:rPr lang="EN-US" sz="2800" dirty="0">
+                <a:solidFill>
+                  <a:srgbClr val="0072C6"/>
+                </a:solidFill>
+              </a:rPr>
+            </a:br>
+            <a:r>
+              <a:rPr lang="en-US" sz="1800" dirty="0">
+                <a:solidFill>
+                  <a:schemeClr val="accent3"/>
+                </a:solidFill>
+              </a:rPr>
+              <a:t>Cloud Big Data for  Customer Churn Analysis with On-Premises Data</a:t>
+            </a:r>
+            <a:endParaRPr lang="EN-US" sz="2800" dirty="0">
+              <a:solidFill>
+                <a:srgbClr val="0072C6"/>
+              </a:solidFill>
+            </a:endParaRPr>
+          </a:p>
+        </p:txBody>
+      </p:sp>
+      <p:sp>
+        <p:nvSpPr>
+          <p:cNvPr id="49" name="TextBox 48"/>
+          <p:cNvSpPr txBox="1"/>
+          <p:nvPr/>
+        </p:nvSpPr>
+        <p:spPr>
+          <a:xfrm>
+            <a:off x="9549582" y="3160176"/>
+            <a:ext cx="1079074" cy="200055"/>
+          </a:xfrm>
+          <a:prstGeom prst="rect">
+            <a:avLst/>
+          </a:prstGeom>
+          <a:noFill/>
+        </p:spPr>
+        <p:txBody>
+          <a:bodyPr wrap="square" rtlCol="0">
+            <a:spAutoFit/>
+          </a:bodyPr>
+          <a:lstStyle/>
+          <a:p>
+            <a:r>
+              <a:rPr lang="en-US" altLang="zh-CN" sz="700" dirty="0"/>
+              <a:t>On-Premises Gateway</a:t>
             </a:r>
             <a:endParaRPr lang="en-US" sz="700" dirty="0"/>
           </a:p>
@@ -9974,45 +9802,6 @@
       </p:sp>
       <p:sp>
         <p:nvSpPr>
-          <p:cNvPr id="2" name="Title 1"/>
-          <p:cNvSpPr>
-            <a:spLocks noGrp="1"/>
-          </p:cNvSpPr>
-          <p:nvPr>
-            <p:ph type="title"/>
-          </p:nvPr>
-        </p:nvSpPr>
-        <p:spPr>
-          <a:xfrm>
-            <a:off x="0" y="5987"/>
-            <a:ext cx="12087225" cy="744033"/>
-          </a:xfrm>
-        </p:spPr>
-        <p:txBody>
-          <a:bodyPr>
-            <a:noAutofit/>
-          </a:bodyPr>
-          <a:lstStyle/>
-          <a:p>
-            <a:r>
-              <a:rPr lang="EN-US" sz="2800" dirty="0">
-                <a:solidFill>
-                  <a:srgbClr val="0072C6"/>
-                </a:solidFill>
-              </a:rPr>
-              <a:t>Starter Kit: Intelligent App(Azure Event Hub, ASA and Machine Learning)</a:t>
-            </a:r>
-            <a:endParaRPr lang="EN-US" sz="2800" dirty="0">
-              <a:solidFill>
-                <a:srgbClr val="0072C6"/>
-              </a:solidFill>
-              <a:latin typeface="Segoe UI Semibold"/>
-            </a:endParaRPr>
-          </a:p>
-        </p:txBody>
-      </p:sp>
-      <p:sp>
-        <p:nvSpPr>
           <p:cNvPr id="32" name="TextBox 31"/>
           <p:cNvSpPr txBox="1"/>
           <p:nvPr/>
@@ -10530,7 +10319,7 @@
         <p:spPr>
           <a:xfrm>
             <a:off x="5782624" y="845769"/>
-            <a:ext cx="2893111" cy="4056842"/>
+            <a:ext cx="2893111" cy="3752144"/>
           </a:xfrm>
           <a:prstGeom prst="rect">
             <a:avLst/>
@@ -10627,23 +10416,6 @@
                   <a:schemeClr val="bg1"/>
                 </a:solidFill>
               </a:rPr>
-              <a:t>HDInsight A3 Windows = $476.16</a:t>
-            </a:r>
-          </a:p>
-          <a:p>
-            <a:pPr marL="742950" lvl="1" indent="-285750">
-              <a:lnSpc>
-                <a:spcPct val="90000"/>
-              </a:lnSpc>
-              <a:buFont typeface="Arial" panose="020B0604020202020204" pitchFamily="34" charset="0"/>
-              <a:buChar char="•"/>
-            </a:pPr>
-            <a:r>
-              <a:rPr lang="en-US" sz="1100" i="1" dirty="0">
-                <a:solidFill>
-                  <a:schemeClr val="bg1"/>
-                </a:solidFill>
-              </a:rPr>
               <a:t>Data Factory = $105</a:t>
             </a:r>
           </a:p>
@@ -10760,7 +10532,7 @@
                   <a:schemeClr val="bg1"/>
                 </a:solidFill>
               </a:rPr>
-              <a:t>1TB Block and Page Blob Locally Redundant = $75.78</a:t>
+              <a:t>50TB Block Blob Locally Redundant = $1208.73</a:t>
             </a:r>
           </a:p>
           <a:p>
@@ -10777,7 +10549,7 @@
                   <a:schemeClr val="bg1"/>
                 </a:solidFill>
               </a:rPr>
-              <a:t>S1 SQL Database = $31.02</a:t>
+              <a:t>S3 SQL Database = $149.99</a:t>
             </a:r>
           </a:p>
           <a:p>
@@ -10837,7 +10609,7 @@
                   <a:schemeClr val="bg1"/>
                 </a:solidFill>
               </a:rPr>
-              <a:t>Total : U$17,799.50 / Year</a:t>
+              <a:t>Total : U$  27,108.48/ Year</a:t>
             </a:r>
             <a:endParaRPr lang="en-US" sz="1200" b="1" dirty="0">
               <a:solidFill>
@@ -11780,7 +11552,7 @@
         <p:spPr>
           <a:xfrm>
             <a:off x="9098921" y="1774263"/>
-            <a:ext cx="1079074" cy="230832"/>
+            <a:ext cx="1079074" cy="246221"/>
           </a:xfrm>
           <a:prstGeom prst="rect">
             <a:avLst/>
@@ -11794,12 +11566,12 @@
           <a:lstStyle/>
           <a:p>
             <a:r>
-              <a:rPr lang="en-US" sz="900" dirty="0" err="1"/>
-              <a:t>IoT</a:t>
-            </a:r>
-            <a:r>
-              <a:rPr lang="en-US" sz="900" dirty="0"/>
-              <a:t> Sensors</a:t>
+              <a:rPr lang="en-US" sz="1000" dirty="0">
+                <a:solidFill>
+                  <a:schemeClr val="accent1"/>
+                </a:solidFill>
+              </a:rPr>
+              <a:t>IoT Sensors</a:t>
             </a:r>
           </a:p>
         </p:txBody>
@@ -11899,7 +11671,11 @@
           <a:lstStyle/>
           <a:p>
             <a:r>
-              <a:rPr lang="en-US" sz="900" dirty="0"/>
+              <a:rPr lang="en-US" sz="900" dirty="0">
+                <a:solidFill>
+                  <a:schemeClr val="accent1"/>
+                </a:solidFill>
+              </a:rPr>
               <a:t>Power BI Mobile App</a:t>
             </a:r>
           </a:p>
@@ -12053,7 +11829,11 @@
           <a:lstStyle/>
           <a:p>
             <a:r>
-              <a:rPr lang="en-US" sz="900" dirty="0"/>
+              <a:rPr lang="en-US" sz="900" dirty="0">
+                <a:solidFill>
+                  <a:schemeClr val="accent1"/>
+                </a:solidFill>
+              </a:rPr>
               <a:t>Azure Event Hub</a:t>
             </a:r>
           </a:p>
@@ -12312,6 +12092,125 @@
           </a:fontRef>
         </p:style>
       </p:cxnSp>
+      <p:pic>
+        <p:nvPicPr>
+          <p:cNvPr id="5" name="Picture 3"/>
+          <p:cNvPicPr>
+            <a:picLocks noChangeAspect="1"/>
+          </p:cNvPicPr>
+          <p:nvPr/>
+        </p:nvPicPr>
+        <p:blipFill>
+          <a:blip r:embed="rId18"/>
+          <a:stretch>
+            <a:fillRect/>
+          </a:stretch>
+        </p:blipFill>
+        <p:spPr>
+          <a:xfrm>
+            <a:off x="10246380" y="3738310"/>
+            <a:ext cx="368116" cy="372749"/>
+          </a:xfrm>
+          <a:prstGeom prst="rect">
+            <a:avLst/>
+          </a:prstGeom>
+        </p:spPr>
+      </p:pic>
+      <p:cxnSp>
+        <p:nvCxnSpPr>
+          <p:cNvPr id="7" name="Curved Connector 5"/>
+          <p:cNvCxnSpPr>
+            <a:stCxn id="15" idx="2"/>
+            <a:endCxn id="5" idx="3"/>
+          </p:cNvCxnSpPr>
+          <p:nvPr/>
+        </p:nvCxnSpPr>
+        <p:spPr>
+          <a:xfrm rot="5400000">
+            <a:off x="10563069" y="3721251"/>
+            <a:ext cx="254861" cy="152006"/>
+          </a:xfrm>
+          <a:prstGeom prst="curvedConnector2">
+            <a:avLst/>
+          </a:prstGeom>
+          <a:ln>
+            <a:prstDash val="sysDash"/>
+            <a:tailEnd type="triangle"/>
+          </a:ln>
+        </p:spPr>
+        <p:style>
+          <a:lnRef idx="1">
+            <a:schemeClr val="accent1"/>
+          </a:lnRef>
+          <a:fillRef idx="0">
+            <a:schemeClr val="accent1"/>
+          </a:fillRef>
+          <a:effectRef idx="0">
+            <a:schemeClr val="accent1"/>
+          </a:effectRef>
+          <a:fontRef idx="minor">
+            <a:schemeClr val="tx1"/>
+          </a:fontRef>
+        </p:style>
+      </p:cxnSp>
+      <p:sp>
+        <p:nvSpPr>
+          <p:cNvPr id="42" name="Title 1"/>
+          <p:cNvSpPr>
+            <a:spLocks noGrp="1"/>
+          </p:cNvSpPr>
+          <p:nvPr>
+            <p:ph type="title"/>
+          </p:nvPr>
+        </p:nvSpPr>
+        <p:spPr>
+          <a:xfrm>
+            <a:off x="0" y="6350"/>
+            <a:ext cx="12279313" cy="795338"/>
+          </a:xfrm>
+        </p:spPr>
+        <p:txBody>
+          <a:bodyPr anchor="t">
+            <a:noAutofit/>
+          </a:bodyPr>
+          <a:lstStyle/>
+          <a:p>
+            <a:pPr>
+              <a:lnSpc>
+                <a:spcPts val="3000"/>
+              </a:lnSpc>
+            </a:pPr>
+            <a:r>
+              <a:rPr lang="en-US" sz="2800" dirty="0">
+                <a:solidFill>
+                  <a:srgbClr val="0072C6"/>
+                </a:solidFill>
+              </a:rPr>
+              <a:t>Starter Kit: Intelligent App(Event Hub with Stream Analytics and Power BI)</a:t>
+            </a:r>
+            <a:br>
+              <a:rPr lang="EN-US" sz="2800" dirty="0">
+                <a:solidFill>
+                  <a:srgbClr val="0072C6"/>
+                </a:solidFill>
+              </a:rPr>
+            </a:br>
+            <a:r>
+              <a:rPr lang="en-US" sz="1800" dirty="0">
+                <a:solidFill>
+                  <a:schemeClr val="accent3"/>
+                </a:solidFill>
+              </a:rPr>
+              <a:t>Monitoring Elevator for Predictive Maintenance</a:t>
+            </a:r>
+            <a:endParaRPr lang="EN-US" sz="2800" dirty="0">
+              <a:solidFill>
+                <a:srgbClr val="0072C6"/>
+              </a:solidFill>
+            </a:endParaRPr>
+          </a:p>
+        </p:txBody>
+      </p:sp>
     </p:spTree>
     <p:extLst>
       <p:ext uri="{BB962C8B-B14F-4D97-AF65-F5344CB8AC3E}">
@@ -12324,7 +12223,7 @@
   </p:clrMapOvr>
   <mc:AlternateContent xmlns:mc="http://schemas.openxmlformats.org/markup-compatibility/2006" xmlns:p14="http://schemas.microsoft.com/office/powerpoint/2010/main">
     <mc:Choice Requires="p14">
-      <p:transition p14:dur="0"/>
+      <p:transition p14:dur="10"/>
     </mc:Choice>
     <mc:Fallback xmlns="">
       <p:transition/>
@@ -12634,39 +12533,6 @@
       </p:sp>
       <p:sp>
         <p:nvSpPr>
-          <p:cNvPr id="2" name="Title 1"/>
-          <p:cNvSpPr>
-            <a:spLocks noGrp="1"/>
-          </p:cNvSpPr>
-          <p:nvPr>
-            <p:ph type="title"/>
-          </p:nvPr>
-        </p:nvSpPr>
-        <p:spPr>
-          <a:xfrm>
-            <a:off x="0" y="-8008"/>
-            <a:ext cx="11917021" cy="744033"/>
-          </a:xfrm>
-        </p:spPr>
-        <p:txBody>
-          <a:bodyPr>
-            <a:noAutofit/>
-          </a:bodyPr>
-          <a:lstStyle/>
-          <a:p>
-            <a:r>
-              <a:rPr lang="EN-US" sz="2800" dirty="0">
-                <a:solidFill>
-                  <a:srgbClr val="0072C6"/>
-                </a:solidFill>
-              </a:rPr>
-              <a:t>Starter Kit: Intelligent App(Data Factory, Data Lake, Machine Learning)</a:t>
-            </a:r>
-          </a:p>
-        </p:txBody>
-      </p:sp>
-      <p:sp>
-        <p:nvSpPr>
           <p:cNvPr id="32" name="TextBox 31"/>
           <p:cNvSpPr txBox="1"/>
           <p:nvPr/>
@@ -13215,7 +13081,7 @@
         <p:spPr>
           <a:xfrm>
             <a:off x="5846993" y="845995"/>
-            <a:ext cx="2856453" cy="4084542"/>
+            <a:ext cx="2856453" cy="4236892"/>
           </a:xfrm>
           <a:prstGeom prst="rect">
             <a:avLst/>
@@ -13397,7 +13263,7 @@
                   <a:schemeClr val="bg1"/>
                 </a:solidFill>
               </a:rPr>
-              <a:t>1T Data Lake Storage = $40.96</a:t>
+              <a:t>5T Data Lake Storage = $274.8</a:t>
             </a:r>
           </a:p>
           <a:p>
@@ -13462,7 +13328,7 @@
                   <a:schemeClr val="bg1"/>
                 </a:solidFill>
               </a:rPr>
-              <a:t>1TB Block Blob Locally Redundant = $24.58</a:t>
+              <a:t>50TB Block Blob Locally Redundant = $1208.73</a:t>
             </a:r>
           </a:p>
           <a:p>
@@ -13479,7 +13345,7 @@
                   <a:schemeClr val="bg1"/>
                 </a:solidFill>
               </a:rPr>
-              <a:t>300 DWUs SQL Data Warehouse = $2700.05</a:t>
+              <a:t>300 DWUs SQL Data Warehouse = $900.24</a:t>
             </a:r>
           </a:p>
           <a:p>
@@ -13539,7 +13405,23 @@
                   <a:schemeClr val="bg1"/>
                 </a:solidFill>
               </a:rPr>
-              <a:t>Total : U$53,397.48 / Year</a:t>
+              <a:t>Total : U</a:t>
+            </a:r>
+            <a:r>
+              <a:rPr lang="en-US" sz="1200" b="1">
+                <a:solidFill>
+                  <a:schemeClr val="bg1"/>
+                </a:solidFill>
+              </a:rPr>
+              <a:t>$ 48,815.64 </a:t>
+            </a:r>
+            <a:r>
+              <a:rPr lang="en-US" sz="1200" b="1" dirty="0">
+                <a:solidFill>
+                  <a:schemeClr val="bg1"/>
+                </a:solidFill>
+              </a:rPr>
+              <a:t>/ Year</a:t>
             </a:r>
             <a:endParaRPr lang="en-US" sz="1200" b="1" dirty="0">
               <a:solidFill>
@@ -14541,7 +14423,7 @@
         </p:blipFill>
         <p:spPr>
           <a:xfrm>
-            <a:off x="10112520" y="2509056"/>
+            <a:off x="9947217" y="2623614"/>
             <a:ext cx="519392" cy="635305"/>
           </a:xfrm>
           <a:prstGeom prst="rect">
@@ -14565,7 +14447,7 @@
         </p:blipFill>
         <p:spPr>
           <a:xfrm>
-            <a:off x="9152607" y="1771493"/>
+            <a:off x="9965649" y="1922151"/>
             <a:ext cx="452394" cy="357240"/>
           </a:xfrm>
           <a:prstGeom prst="rect">
@@ -14589,7 +14471,7 @@
         </p:blipFill>
         <p:spPr>
           <a:xfrm>
-            <a:off x="9618279" y="1738710"/>
+            <a:off x="9205917" y="1866032"/>
             <a:ext cx="494241" cy="493178"/>
           </a:xfrm>
           <a:prstGeom prst="rect">
@@ -14605,8 +14487,8 @@
         </p:nvSpPr>
         <p:spPr>
           <a:xfrm>
-            <a:off x="9019276" y="2224631"/>
-            <a:ext cx="1437656" cy="369332"/>
+            <a:off x="9867825" y="2309413"/>
+            <a:ext cx="980055" cy="230832"/>
           </a:xfrm>
           <a:prstGeom prst="rect">
             <a:avLst/>
@@ -14620,20 +14502,21 @@
           <a:lstStyle/>
           <a:p>
             <a:r>
-              <a:rPr lang="en-US" sz="900" dirty="0"/>
-              <a:t>Azure Data Lake </a:t>
-            </a:r>
-            <a:r>
-              <a:rPr lang="en-US" altLang="zh-CN" sz="900" dirty="0"/>
-              <a:t>Storage</a:t>
-            </a:r>
-          </a:p>
-          <a:p>
-            <a:r>
-              <a:rPr lang="en-US" altLang="zh-CN" sz="900" dirty="0"/>
-              <a:t>Azure Data Lake Analytics</a:t>
-            </a:r>
-            <a:endParaRPr lang="en-US" sz="900" dirty="0"/>
+              <a:rPr lang="en-US" sz="900" dirty="0">
+                <a:solidFill>
+                  <a:schemeClr val="accent1"/>
+                </a:solidFill>
+              </a:rPr>
+              <a:t>Data Lake </a:t>
+            </a:r>
+            <a:r>
+              <a:rPr lang="en-US" altLang="zh-CN" sz="900" dirty="0">
+                <a:solidFill>
+                  <a:schemeClr val="accent1"/>
+                </a:solidFill>
+              </a:rPr>
+              <a:t>Store</a:t>
+            </a:r>
           </a:p>
         </p:txBody>
       </p:sp>
@@ -14676,7 +14559,7 @@
         </p:nvCxnSpPr>
         <p:spPr>
           <a:xfrm flipV="1">
-            <a:off x="9968353" y="3144361"/>
+            <a:off x="9803050" y="3258919"/>
             <a:ext cx="403863" cy="240862"/>
           </a:xfrm>
           <a:prstGeom prst="curvedConnector2">
@@ -14707,14 +14590,14 @@
           <p:cNvPr id="16" name="Curved Connector 15"/>
           <p:cNvCxnSpPr>
             <a:stCxn id="8" idx="0"/>
-            <a:endCxn id="10" idx="2"/>
+            <a:endCxn id="9" idx="2"/>
           </p:cNvCxnSpPr>
           <p:nvPr/>
         </p:nvCxnSpPr>
         <p:spPr>
           <a:xfrm rot="16200000" flipV="1">
-            <a:off x="9980224" y="2117064"/>
-            <a:ext cx="277168" cy="506816"/>
+            <a:off x="10027269" y="2443969"/>
+            <a:ext cx="344223" cy="15067"/>
           </a:xfrm>
           <a:prstGeom prst="curvedConnector3">
             <a:avLst>
@@ -14745,18 +14628,20 @@
         <p:nvCxnSpPr>
           <p:cNvPr id="20" name="Curved Connector 19"/>
           <p:cNvCxnSpPr>
-            <a:stCxn id="9" idx="2"/>
-            <a:endCxn id="8" idx="1"/>
+            <a:stCxn id="10" idx="3"/>
+            <a:endCxn id="9" idx="1"/>
           </p:cNvCxnSpPr>
           <p:nvPr/>
         </p:nvCxnSpPr>
         <p:spPr>
-          <a:xfrm rot="16200000" flipH="1">
-            <a:off x="9396674" y="2110863"/>
-            <a:ext cx="697976" cy="733716"/>
-          </a:xfrm>
-          <a:prstGeom prst="curvedConnector2">
-            <a:avLst/>
+          <a:xfrm flipV="1">
+            <a:off x="9700158" y="2100771"/>
+            <a:ext cx="265491" cy="11850"/>
+          </a:xfrm>
+          <a:prstGeom prst="curvedConnector3">
+            <a:avLst>
+              <a:gd name="adj1" fmla="val 50000"/>
+            </a:avLst>
           </a:prstGeom>
           <a:ln>
             <a:prstDash val="sysDash"/>
@@ -14849,12 +14734,20 @@
           <a:lstStyle/>
           <a:p>
             <a:r>
-              <a:rPr lang="en-US" sz="900" dirty="0"/>
+              <a:rPr lang="en-US" sz="900" dirty="0">
+                <a:solidFill>
+                  <a:schemeClr val="accent1"/>
+                </a:solidFill>
+              </a:rPr>
               <a:t>Data Lake </a:t>
             </a:r>
             <a:r>
-              <a:rPr lang="en-US" altLang="zh-CN" sz="900" dirty="0"/>
-              <a:t>Storage</a:t>
+              <a:rPr lang="en-US" altLang="zh-CN" sz="900" dirty="0">
+                <a:solidFill>
+                  <a:schemeClr val="accent1"/>
+                </a:solidFill>
+              </a:rPr>
+              <a:t>Store</a:t>
             </a:r>
           </a:p>
         </p:txBody>
@@ -14863,15 +14756,14 @@
         <p:nvCxnSpPr>
           <p:cNvPr id="30" name="Curved Connector 29"/>
           <p:cNvCxnSpPr>
-            <a:stCxn id="8" idx="3"/>
-            <a:endCxn id="24" idx="1"/>
+            <a:stCxn id="9" idx="3"/>
           </p:cNvCxnSpPr>
           <p:nvPr/>
         </p:nvCxnSpPr>
         <p:spPr>
           <a:xfrm flipV="1">
-            <a:off x="10631912" y="2069310"/>
-            <a:ext cx="198882" cy="757399"/>
+            <a:off x="10418043" y="1889434"/>
+            <a:ext cx="412751" cy="211337"/>
           </a:xfrm>
           <a:prstGeom prst="curvedConnector3">
             <a:avLst>
@@ -14914,7 +14806,7 @@
         </p:blipFill>
         <p:spPr>
           <a:xfrm>
-            <a:off x="10631912" y="3282353"/>
+            <a:off x="10730084" y="3105460"/>
             <a:ext cx="419058" cy="424956"/>
           </a:xfrm>
           <a:prstGeom prst="rect">
@@ -14930,7 +14822,7 @@
         </p:nvSpPr>
         <p:spPr>
           <a:xfrm>
-            <a:off x="10534268" y="3696026"/>
+            <a:off x="10710823" y="3554863"/>
             <a:ext cx="1176130" cy="230832"/>
           </a:xfrm>
           <a:prstGeom prst="rect">
@@ -14967,7 +14859,7 @@
         </p:blipFill>
         <p:spPr>
           <a:xfrm>
-            <a:off x="11296890" y="2709001"/>
+            <a:off x="11298888" y="2640925"/>
             <a:ext cx="324839" cy="294111"/>
           </a:xfrm>
           <a:prstGeom prst="rect">
@@ -14983,7 +14875,7 @@
         </p:nvSpPr>
         <p:spPr>
           <a:xfrm>
-            <a:off x="11021476" y="2963009"/>
+            <a:off x="11058052" y="2905481"/>
             <a:ext cx="1079074" cy="230832"/>
           </a:xfrm>
           <a:prstGeom prst="rect">
@@ -14998,7 +14890,11 @@
           <a:lstStyle/>
           <a:p>
             <a:r>
-              <a:rPr lang="en-US" sz="900" dirty="0"/>
+              <a:rPr lang="en-US" sz="900" dirty="0">
+                <a:solidFill>
+                  <a:schemeClr val="accent1"/>
+                </a:solidFill>
+              </a:rPr>
               <a:t>Power BI Desktop</a:t>
             </a:r>
           </a:p>
@@ -15008,14 +14904,15 @@
         <p:nvCxnSpPr>
           <p:cNvPr id="43" name="Curved Connector 42"/>
           <p:cNvCxnSpPr>
+            <a:stCxn id="24" idx="2"/>
             <a:endCxn id="40" idx="0"/>
           </p:cNvCxnSpPr>
           <p:nvPr/>
         </p:nvCxnSpPr>
         <p:spPr>
           <a:xfrm rot="5400000">
-            <a:off x="10541781" y="2722463"/>
-            <a:ext cx="859551" cy="260229"/>
+            <a:off x="10673019" y="2666505"/>
+            <a:ext cx="705550" cy="172361"/>
           </a:xfrm>
           <a:prstGeom prst="curvedConnector3">
             <a:avLst/>
@@ -15050,7 +14947,7 @@
         </p:nvCxnSpPr>
         <p:spPr>
           <a:xfrm rot="16200000" flipH="1">
-            <a:off x="11247531" y="2497221"/>
+            <a:off x="11249529" y="2429145"/>
             <a:ext cx="261139" cy="162420"/>
           </a:xfrm>
           <a:prstGeom prst="curvedConnector3">
@@ -15087,8 +14984,8 @@
         </p:nvCxnSpPr>
         <p:spPr>
           <a:xfrm rot="5400000">
-            <a:off x="11155497" y="3089315"/>
-            <a:ext cx="300990" cy="510043"/>
+            <a:off x="11282554" y="3002902"/>
+            <a:ext cx="181625" cy="448447"/>
           </a:xfrm>
           <a:prstGeom prst="curvedConnector2">
             <a:avLst/>
@@ -15161,6 +15058,141 @@
           </a:prstGeom>
         </p:spPr>
       </p:pic>
+      <p:sp>
+        <p:nvSpPr>
+          <p:cNvPr id="45" name="Title 1"/>
+          <p:cNvSpPr>
+            <a:spLocks noGrp="1"/>
+          </p:cNvSpPr>
+          <p:nvPr>
+            <p:ph type="title"/>
+          </p:nvPr>
+        </p:nvSpPr>
+        <p:spPr>
+          <a:xfrm>
+            <a:off x="0" y="4763"/>
+            <a:ext cx="12308114" cy="744537"/>
+          </a:xfrm>
+        </p:spPr>
+        <p:txBody>
+          <a:bodyPr anchor="t">
+            <a:noAutofit/>
+          </a:bodyPr>
+          <a:lstStyle/>
+          <a:p>
+            <a:pPr>
+              <a:lnSpc>
+                <a:spcPts val="3000"/>
+              </a:lnSpc>
+            </a:pPr>
+            <a:r>
+              <a:rPr lang="en-US" sz="2800" dirty="0">
+                <a:solidFill>
+                  <a:srgbClr val="0072C6"/>
+                </a:solidFill>
+              </a:rPr>
+              <a:t>Starter Kit: Intelligent App(Data Factory, Data Lake, Machine Learning)</a:t>
+            </a:r>
+            <a:br>
+              <a:rPr lang="EN-US" sz="2800" dirty="0">
+                <a:solidFill>
+                  <a:srgbClr val="0072C6"/>
+                </a:solidFill>
+              </a:rPr>
+            </a:br>
+            <a:r>
+              <a:rPr lang="en-US" sz="1800" dirty="0">
+                <a:solidFill>
+                  <a:schemeClr val="accent3"/>
+                </a:solidFill>
+              </a:rPr>
+              <a:t>Call Center Sentiment Analysis with Cortana Intelligence Suite</a:t>
+            </a:r>
+            <a:endParaRPr lang="EN-US" sz="2800" dirty="0">
+              <a:solidFill>
+                <a:srgbClr val="0072C6"/>
+              </a:solidFill>
+            </a:endParaRPr>
+          </a:p>
+        </p:txBody>
+      </p:sp>
+      <p:sp>
+        <p:nvSpPr>
+          <p:cNvPr id="61" name="TextBox 60"/>
+          <p:cNvSpPr txBox="1"/>
+          <p:nvPr/>
+        </p:nvSpPr>
+        <p:spPr>
+          <a:xfrm>
+            <a:off x="8912993" y="2318539"/>
+            <a:ext cx="1437656" cy="230832"/>
+          </a:xfrm>
+          <a:prstGeom prst="rect">
+            <a:avLst/>
+          </a:prstGeom>
+          <a:noFill/>
+        </p:spPr>
+        <p:txBody>
+          <a:bodyPr wrap="square" rtlCol="0">
+            <a:spAutoFit/>
+          </a:bodyPr>
+          <a:lstStyle/>
+          <a:p>
+            <a:r>
+              <a:rPr lang="en-US" altLang="zh-CN" sz="900" dirty="0">
+                <a:solidFill>
+                  <a:schemeClr val="accent1"/>
+                </a:solidFill>
+              </a:rPr>
+              <a:t>Data Lake Analytics</a:t>
+            </a:r>
+            <a:endParaRPr lang="en-US" sz="900" dirty="0">
+              <a:solidFill>
+                <a:schemeClr val="accent1"/>
+              </a:solidFill>
+            </a:endParaRPr>
+          </a:p>
+        </p:txBody>
+      </p:sp>
+      <p:cxnSp>
+        <p:nvCxnSpPr>
+          <p:cNvPr id="69" name="Curved Connector 68"/>
+          <p:cNvCxnSpPr>
+            <a:stCxn id="9" idx="0"/>
+            <a:endCxn id="10" idx="0"/>
+          </p:cNvCxnSpPr>
+          <p:nvPr/>
+        </p:nvCxnSpPr>
+        <p:spPr>
+          <a:xfrm rot="16200000" flipV="1">
+            <a:off x="9794383" y="1524688"/>
+            <a:ext cx="56119" cy="738808"/>
+          </a:xfrm>
+          <a:prstGeom prst="curvedConnector3">
+            <a:avLst>
+              <a:gd name="adj1" fmla="val 253219"/>
+            </a:avLst>
+          </a:prstGeom>
+          <a:ln>
+            <a:prstDash val="sysDash"/>
+            <a:tailEnd type="triangle"/>
+          </a:ln>
+        </p:spPr>
+        <p:style>
+          <a:lnRef idx="1">
+            <a:schemeClr val="accent1"/>
+          </a:lnRef>
+          <a:fillRef idx="0">
+            <a:schemeClr val="accent1"/>
+          </a:fillRef>
+          <a:effectRef idx="0">
+            <a:schemeClr val="accent1"/>
+          </a:effectRef>
+          <a:fontRef idx="minor">
+            <a:schemeClr val="tx1"/>
+          </a:fontRef>
+        </p:style>
+      </p:cxnSp>
     </p:spTree>
     <p:extLst>
       <p:ext uri="{BB962C8B-B14F-4D97-AF65-F5344CB8AC3E}">
@@ -16255,13 +16287,13 @@
 <file path=customXml/itemProps3.xml><?xml version="1.0" encoding="utf-8"?>
 <ds:datastoreItem xmlns:ds="http://schemas.openxmlformats.org/officeDocument/2006/customXml" ds:itemID="{2A7D4CEE-4A6E-444C-9F48-154C694282ED}">
   <ds:schemaRefs>
+    <ds:schemaRef ds:uri="http://purl.org/dc/dcmitype/"/>
+    <ds:schemaRef ds:uri="http://schemas.microsoft.com/office/infopath/2007/PartnerControls"/>
     <ds:schemaRef ds:uri="http://purl.org/dc/elements/1.1/"/>
     <ds:schemaRef ds:uri="http://schemas.microsoft.com/office/2006/metadata/properties"/>
     <ds:schemaRef ds:uri="http://purl.org/dc/terms/"/>
+    <ds:schemaRef ds:uri="http://schemas.microsoft.com/office/2006/documentManagement/types"/>
     <ds:schemaRef ds:uri="http://schemas.openxmlformats.org/package/2006/metadata/core-properties"/>
-    <ds:schemaRef ds:uri="http://schemas.microsoft.com/office/2006/documentManagement/types"/>
-    <ds:schemaRef ds:uri="http://purl.org/dc/dcmitype/"/>
-    <ds:schemaRef ds:uri="http://schemas.microsoft.com/office/infopath/2007/PartnerControls"/>
     <ds:schemaRef ds:uri="http://www.w3.org/XML/1998/namespace"/>
   </ds:schemaRefs>
 </ds:datastoreItem>

</xml_diff>

<commit_message>
Sync with Global content
</commit_message>
<xml_diff>
--- a/Content/Starter Kit - Intelligent Apps & Analytics/0 - Starter Kit - Intelligent Apps & Analytics.pptx
+++ b/Content/Starter Kit - Intelligent Apps & Analytics/0 - Starter Kit - Intelligent Apps & Analytics.pptx
@@ -129,7 +129,7 @@
       </p:ext>
     </p:extLst>
   </p:cmAuthor>
-  <p:cmAuthor id="2" name="Eumar Assis" initials="EA" lastIdx="21" clrIdx="1">
+  <p:cmAuthor id="2" name="Eumar Assis" initials="EA" lastIdx="10" clrIdx="1">
     <p:extLst>
       <p:ext uri="{19B8F6BF-5375-455C-9EA6-DF929625EA0E}">
         <p15:presenceInfo xmlns:p15="http://schemas.microsoft.com/office/powerpoint/2012/main" userId="S-1-5-21-124525095-708259637-1543119021-1495550" providerId="AD"/>
@@ -141,10 +141,10 @@
 
 <file path=ppt/comments/comment1.xml><?xml version="1.0" encoding="utf-8"?>
 <p:cmLst xmlns:a="http://schemas.openxmlformats.org/drawingml/2006/main" xmlns:r="http://schemas.openxmlformats.org/officeDocument/2006/relationships" xmlns:p="http://schemas.openxmlformats.org/presentationml/2006/main">
-  <p:cm authorId="2" dt="2016-08-23T11:55:25.527" idx="14">
-    <p:pos x="2541" y="1378"/>
+  <p:cm authorId="2" dt="2016-08-23T11:55:25.527" idx="1">
+    <p:pos x="1789" y="1360"/>
     <p:text>Mention Power BI and AZURE (e.g. Azure SQL Data warehouse)</p:text>
-    <p:extLst mod="1">
+    <p:extLst>
       <p:ext uri="{C676402C-5697-4E1C-873F-D02D1690AC5C}">
         <p15:threadingInfo xmlns:p15="http://schemas.microsoft.com/office/powerpoint/2012/main" timeZoneBias="240"/>
       </p:ext>
@@ -159,7 +159,7 @@
       </p:ext>
     </p:extLst>
   </p:cm>
-  <p:cm authorId="2" dt="2016-08-23T11:57:25.117" idx="13">
+  <p:cm authorId="2" dt="2016-08-23T11:57:25.117" idx="3">
     <p:pos x="5271" y="1587"/>
     <p:text>Is this correct? Is 1Tb enough?</p:text>
     <p:extLst>
@@ -182,7 +182,7 @@
 
 <file path=ppt/comments/comment2.xml><?xml version="1.0" encoding="utf-8"?>
 <p:cmLst xmlns:a="http://schemas.openxmlformats.org/drawingml/2006/main" xmlns:r="http://schemas.openxmlformats.org/officeDocument/2006/relationships" xmlns:p="http://schemas.openxmlformats.org/presentationml/2006/main">
-  <p:cm authorId="2" dt="2016-08-23T11:58:59.542" idx="17">
+  <p:cm authorId="2" dt="2016-08-23T11:58:59.542" idx="4">
     <p:pos x="5362" y="392"/>
     <p:text>Why do we need HDInsight in this scenario?</p:text>
     <p:extLst>
@@ -191,14 +191,14 @@
       </p:ext>
     </p:extLst>
   </p:cm>
-  <p:cm authorId="2" dt="2016-08-23T12:00:16.339" idx="18">
+  <p:cm authorId="2" dt="2016-08-23T12:00:16.339" idx="5">
     <p:pos x="5362" y="488"/>
     <p:text>My suggestions: Option 1: Power BI with Enterprise Connector
 Option 2: Azure Data Factory with Connector + Azure SQl Datawarehouse + Power BI Direct Query</p:text>
     <p:extLst>
       <p:ext uri="{C676402C-5697-4E1C-873F-D02D1690AC5C}">
         <p15:threadingInfo xmlns:p15="http://schemas.microsoft.com/office/powerpoint/2012/main" timeZoneBias="240">
-          <p15:parentCm authorId="2" idx="17"/>
+          <p15:parentCm authorId="2" idx="4"/>
         </p15:threadingInfo>
       </p:ext>
     </p:extLst>
@@ -334,7 +334,7 @@
           <a:p>
             <a:fld id="{386A5666-4B6A-423A-AB1B-8D7E7E0D4931}" type="datetimeFigureOut">
               <a:rPr lang="en-US" smtClean="0"/>
-              <a:t>8/26/2016</a:t>
+              <a:t>23-Aug-16</a:t>
             </a:fld>
             <a:endParaRPr lang="en-US"/>
           </a:p>
@@ -1894,7 +1894,7 @@
           <a:p>
             <a:fld id="{DD6EF947-8D9F-492B-9CF5-9DCF2EF799ED}" type="datetimeFigureOut">
               <a:rPr lang="en-US" smtClean="0"/>
-              <a:t>8/26/2016</a:t>
+              <a:t>23-Aug-16</a:t>
             </a:fld>
             <a:endParaRPr lang="en-US"/>
           </a:p>
@@ -2062,7 +2062,7 @@
           <a:p>
             <a:fld id="{DD6EF947-8D9F-492B-9CF5-9DCF2EF799ED}" type="datetimeFigureOut">
               <a:rPr lang="en-US" smtClean="0"/>
-              <a:t>8/26/2016</a:t>
+              <a:t>23-Aug-16</a:t>
             </a:fld>
             <a:endParaRPr lang="en-US"/>
           </a:p>
@@ -2240,7 +2240,7 @@
           <a:p>
             <a:fld id="{DD6EF947-8D9F-492B-9CF5-9DCF2EF799ED}" type="datetimeFigureOut">
               <a:rPr lang="en-US" smtClean="0"/>
-              <a:t>8/26/2016</a:t>
+              <a:t>23-Aug-16</a:t>
             </a:fld>
             <a:endParaRPr lang="en-US"/>
           </a:p>
@@ -2592,7 +2592,7 @@
           <a:p>
             <a:fld id="{DD6EF947-8D9F-492B-9CF5-9DCF2EF799ED}" type="datetimeFigureOut">
               <a:rPr lang="en-US" smtClean="0"/>
-              <a:t>8/26/2016</a:t>
+              <a:t>23-Aug-16</a:t>
             </a:fld>
             <a:endParaRPr lang="en-US"/>
           </a:p>
@@ -2837,7 +2837,7 @@
           <a:p>
             <a:fld id="{DD6EF947-8D9F-492B-9CF5-9DCF2EF799ED}" type="datetimeFigureOut">
               <a:rPr lang="en-US" smtClean="0"/>
-              <a:t>8/26/2016</a:t>
+              <a:t>23-Aug-16</a:t>
             </a:fld>
             <a:endParaRPr lang="en-US"/>
           </a:p>
@@ -3066,7 +3066,7 @@
           <a:p>
             <a:fld id="{DD6EF947-8D9F-492B-9CF5-9DCF2EF799ED}" type="datetimeFigureOut">
               <a:rPr lang="en-US" smtClean="0"/>
-              <a:t>8/26/2016</a:t>
+              <a:t>23-Aug-16</a:t>
             </a:fld>
             <a:endParaRPr lang="en-US"/>
           </a:p>
@@ -3430,7 +3430,7 @@
           <a:p>
             <a:fld id="{DD6EF947-8D9F-492B-9CF5-9DCF2EF799ED}" type="datetimeFigureOut">
               <a:rPr lang="en-US" smtClean="0"/>
-              <a:t>8/26/2016</a:t>
+              <a:t>23-Aug-16</a:t>
             </a:fld>
             <a:endParaRPr lang="en-US"/>
           </a:p>
@@ -3547,7 +3547,7 @@
           <a:p>
             <a:fld id="{DD6EF947-8D9F-492B-9CF5-9DCF2EF799ED}" type="datetimeFigureOut">
               <a:rPr lang="en-US" smtClean="0"/>
-              <a:t>8/26/2016</a:t>
+              <a:t>23-Aug-16</a:t>
             </a:fld>
             <a:endParaRPr lang="en-US"/>
           </a:p>
@@ -3642,7 +3642,7 @@
           <a:p>
             <a:fld id="{DD6EF947-8D9F-492B-9CF5-9DCF2EF799ED}" type="datetimeFigureOut">
               <a:rPr lang="en-US" smtClean="0"/>
-              <a:t>8/26/2016</a:t>
+              <a:t>23-Aug-16</a:t>
             </a:fld>
             <a:endParaRPr lang="en-US"/>
           </a:p>
@@ -3917,7 +3917,7 @@
           <a:p>
             <a:fld id="{DD6EF947-8D9F-492B-9CF5-9DCF2EF799ED}" type="datetimeFigureOut">
               <a:rPr lang="en-US" smtClean="0"/>
-              <a:t>8/26/2016</a:t>
+              <a:t>23-Aug-16</a:t>
             </a:fld>
             <a:endParaRPr lang="en-US"/>
           </a:p>
@@ -4169,7 +4169,7 @@
           <a:p>
             <a:fld id="{DD6EF947-8D9F-492B-9CF5-9DCF2EF799ED}" type="datetimeFigureOut">
               <a:rPr lang="en-US" smtClean="0"/>
-              <a:t>8/26/2016</a:t>
+              <a:t>23-Aug-16</a:t>
             </a:fld>
             <a:endParaRPr lang="en-US"/>
           </a:p>
@@ -4380,7 +4380,7 @@
           <a:p>
             <a:fld id="{DD6EF947-8D9F-492B-9CF5-9DCF2EF799ED}" type="datetimeFigureOut">
               <a:rPr lang="en-US" smtClean="0"/>
-              <a:t>8/26/2016</a:t>
+              <a:t>23-Aug-16</a:t>
             </a:fld>
             <a:endParaRPr lang="en-US"/>
           </a:p>
@@ -5014,6 +5014,39 @@
       </p:sp>
       <p:sp>
         <p:nvSpPr>
+          <p:cNvPr id="2" name="Title 1"/>
+          <p:cNvSpPr>
+            <a:spLocks noGrp="1"/>
+          </p:cNvSpPr>
+          <p:nvPr>
+            <p:ph type="title"/>
+          </p:nvPr>
+        </p:nvSpPr>
+        <p:spPr>
+          <a:xfrm>
+            <a:off x="0" y="16794"/>
+            <a:ext cx="12087225" cy="744033"/>
+          </a:xfrm>
+        </p:spPr>
+        <p:txBody>
+          <a:bodyPr>
+            <a:noAutofit/>
+          </a:bodyPr>
+          <a:lstStyle/>
+          <a:p>
+            <a:r>
+              <a:rPr lang="EN-US" sz="2800" dirty="0">
+                <a:solidFill>
+                  <a:srgbClr val="0072C6"/>
+                </a:solidFill>
+              </a:rPr>
+              <a:t>Starter Kit: Advanced Analytics(SQL Azure DW with Power BI)</a:t>
+            </a:r>
+          </a:p>
+        </p:txBody>
+      </p:sp>
+      <p:sp>
+        <p:nvSpPr>
           <p:cNvPr id="32" name="TextBox 31"/>
           <p:cNvSpPr txBox="1"/>
           <p:nvPr/>
@@ -5439,7 +5472,7 @@
         <p:spPr>
           <a:xfrm>
             <a:off x="5825481" y="942678"/>
-            <a:ext cx="2789996" cy="3156596"/>
+            <a:ext cx="2789996" cy="3461295"/>
           </a:xfrm>
           <a:prstGeom prst="rect">
             <a:avLst/>
@@ -5502,14 +5535,50 @@
                   <a:schemeClr val="bg1"/>
                 </a:solidFill>
               </a:rPr>
-              <a:t>Scenario: Power BI with SQL Azure Data Warehouse</a:t>
-            </a:r>
-          </a:p>
-          <a:p>
-            <a:pPr>
+              <a:t>Scenario: Power BI with SQL Azure DW</a:t>
+            </a:r>
+          </a:p>
+          <a:p>
+            <a:pPr marL="285750" indent="-285750">
               <a:lnSpc>
                 <a:spcPct val="90000"/>
               </a:lnSpc>
+              <a:buFont typeface="Arial" panose="020B0604020202020204" pitchFamily="34" charset="0"/>
+              <a:buChar char="•"/>
+            </a:pPr>
+            <a:r>
+              <a:rPr lang="en-US" sz="1100" i="1" dirty="0">
+                <a:solidFill>
+                  <a:schemeClr val="bg1"/>
+                </a:solidFill>
+              </a:rPr>
+              <a:t>Analytics:</a:t>
+            </a:r>
+          </a:p>
+          <a:p>
+            <a:pPr marL="742950" lvl="1" indent="-285750">
+              <a:lnSpc>
+                <a:spcPct val="90000"/>
+              </a:lnSpc>
+              <a:buFont typeface="Arial" panose="020B0604020202020204" pitchFamily="34" charset="0"/>
+              <a:buChar char="•"/>
+            </a:pPr>
+            <a:r>
+              <a:rPr lang="en-US" sz="1100" i="1" dirty="0">
+                <a:solidFill>
+                  <a:schemeClr val="bg1"/>
+                </a:solidFill>
+              </a:rPr>
+              <a:t>HDInsight A4 Windows= $476.16</a:t>
+            </a:r>
+          </a:p>
+          <a:p>
+            <a:pPr marL="285750" indent="-285750">
+              <a:lnSpc>
+                <a:spcPct val="90000"/>
+              </a:lnSpc>
+              <a:buFont typeface="Arial" panose="020B0604020202020204" pitchFamily="34" charset="0"/>
+              <a:buChar char="•"/>
             </a:pPr>
             <a:endParaRPr lang="en-US" sz="1100" i="1" dirty="0">
               <a:solidFill>
@@ -5565,7 +5634,7 @@
                   <a:schemeClr val="bg1"/>
                 </a:solidFill>
               </a:rPr>
-              <a:t>50TB Block Blob Locally Redundant = $1208.73</a:t>
+              <a:t>1TB Block Blob Locally Redundant = $24.58</a:t>
             </a:r>
           </a:p>
           <a:p>
@@ -5582,7 +5651,7 @@
                   <a:schemeClr val="bg1"/>
                 </a:solidFill>
               </a:rPr>
-              <a:t>300 DWUs SQL Data Warehouse = $900.24</a:t>
+              <a:t>300 DWUs SQL Data Warehouse = $2700.05</a:t>
             </a:r>
           </a:p>
           <a:p>
@@ -5642,7 +5711,7 @@
                   <a:schemeClr val="bg1"/>
                 </a:solidFill>
               </a:rPr>
-              <a:t>Total : U$ 29,971.44/ Year</a:t>
+              <a:t>Total : U$43,073.28 / Year</a:t>
             </a:r>
             <a:endParaRPr lang="en-US" sz="1200" b="1" dirty="0">
               <a:solidFill>
@@ -6539,11 +6608,7 @@
           <a:lstStyle/>
           <a:p>
             <a:r>
-              <a:rPr lang="en-US" sz="900" dirty="0">
-                <a:solidFill>
-                  <a:schemeClr val="accent1"/>
-                </a:solidFill>
-              </a:rPr>
+              <a:rPr lang="en-US" sz="900" dirty="0"/>
               <a:t>Power BI Desktop</a:t>
             </a:r>
           </a:p>
@@ -6565,7 +6630,7 @@
         </p:blipFill>
         <p:spPr>
           <a:xfrm>
-            <a:off x="9534889" y="3289149"/>
+            <a:off x="9090628" y="3093117"/>
             <a:ext cx="607502" cy="606195"/>
           </a:xfrm>
           <a:prstGeom prst="rect">
@@ -6637,7 +6702,7 @@
         </p:blipFill>
         <p:spPr>
           <a:xfrm>
-            <a:off x="10664923" y="3272121"/>
+            <a:off x="9797378" y="3408137"/>
             <a:ext cx="640828" cy="461100"/>
           </a:xfrm>
           <a:prstGeom prst="rect">
@@ -6645,6 +6710,134 @@
           </a:prstGeom>
         </p:spPr>
       </p:pic>
+      <p:pic>
+        <p:nvPicPr>
+          <p:cNvPr id="21" name="Picture 20"/>
+          <p:cNvPicPr>
+            <a:picLocks noChangeAspect="1"/>
+          </p:cNvPicPr>
+          <p:nvPr/>
+        </p:nvPicPr>
+        <p:blipFill>
+          <a:blip r:embed="rId13"/>
+          <a:stretch>
+            <a:fillRect/>
+          </a:stretch>
+        </p:blipFill>
+        <p:spPr>
+          <a:xfrm>
+            <a:off x="10560599" y="3386308"/>
+            <a:ext cx="745453" cy="474150"/>
+          </a:xfrm>
+          <a:prstGeom prst="rect">
+            <a:avLst/>
+          </a:prstGeom>
+        </p:spPr>
+      </p:pic>
+      <p:pic>
+        <p:nvPicPr>
+          <p:cNvPr id="22" name="Picture 21"/>
+          <p:cNvPicPr>
+            <a:picLocks noChangeAspect="1"/>
+          </p:cNvPicPr>
+          <p:nvPr/>
+        </p:nvPicPr>
+        <p:blipFill>
+          <a:blip r:embed="rId14"/>
+          <a:stretch>
+            <a:fillRect/>
+          </a:stretch>
+        </p:blipFill>
+        <p:spPr>
+          <a:xfrm>
+            <a:off x="10819217" y="2820856"/>
+            <a:ext cx="566719" cy="421950"/>
+          </a:xfrm>
+          <a:prstGeom prst="rect">
+            <a:avLst/>
+          </a:prstGeom>
+        </p:spPr>
+      </p:pic>
+      <p:cxnSp>
+        <p:nvCxnSpPr>
+          <p:cNvPr id="24" name="Straight Arrow Connector 23"/>
+          <p:cNvCxnSpPr>
+            <a:stCxn id="22" idx="1"/>
+            <a:endCxn id="21" idx="0"/>
+          </p:cNvCxnSpPr>
+          <p:nvPr/>
+        </p:nvCxnSpPr>
+        <p:spPr>
+          <a:xfrm rot="10800000" flipH="1" flipV="1">
+            <a:off x="10819216" y="3031830"/>
+            <a:ext cx="114109" cy="354477"/>
+          </a:xfrm>
+          <a:prstGeom prst="curvedConnector4">
+            <a:avLst>
+              <a:gd name="adj1" fmla="val -200335"/>
+              <a:gd name="adj2" fmla="val 79759"/>
+            </a:avLst>
+          </a:prstGeom>
+          <a:ln>
+            <a:solidFill>
+              <a:schemeClr val="accent1"/>
+            </a:solidFill>
+            <a:prstDash val="sysDash"/>
+            <a:tailEnd type="triangle"/>
+          </a:ln>
+        </p:spPr>
+        <p:style>
+          <a:lnRef idx="1">
+            <a:schemeClr val="accent1"/>
+          </a:lnRef>
+          <a:fillRef idx="0">
+            <a:schemeClr val="accent1"/>
+          </a:fillRef>
+          <a:effectRef idx="0">
+            <a:schemeClr val="accent1"/>
+          </a:effectRef>
+          <a:fontRef idx="minor">
+            <a:schemeClr val="tx1"/>
+          </a:fontRef>
+        </p:style>
+      </p:cxnSp>
+      <p:cxnSp>
+        <p:nvCxnSpPr>
+          <p:cNvPr id="30" name="Curved Connector 29"/>
+          <p:cNvCxnSpPr>
+            <a:stCxn id="21" idx="1"/>
+            <a:endCxn id="20" idx="3"/>
+          </p:cNvCxnSpPr>
+          <p:nvPr/>
+        </p:nvCxnSpPr>
+        <p:spPr>
+          <a:xfrm rot="10800000" flipV="1">
+            <a:off x="10438207" y="3623383"/>
+            <a:ext cx="122393" cy="15304"/>
+          </a:xfrm>
+          <a:prstGeom prst="curvedConnector3">
+            <a:avLst/>
+          </a:prstGeom>
+          <a:ln>
+            <a:prstDash val="sysDash"/>
+            <a:tailEnd type="triangle"/>
+          </a:ln>
+        </p:spPr>
+        <p:style>
+          <a:lnRef idx="1">
+            <a:schemeClr val="accent1"/>
+          </a:lnRef>
+          <a:fillRef idx="0">
+            <a:schemeClr val="accent1"/>
+          </a:fillRef>
+          <a:effectRef idx="0">
+            <a:schemeClr val="accent1"/>
+          </a:effectRef>
+          <a:fontRef idx="minor">
+            <a:schemeClr val="tx1"/>
+          </a:fontRef>
+        </p:style>
+      </p:cxnSp>
       <p:cxnSp>
         <p:nvCxnSpPr>
           <p:cNvPr id="34" name="Curved Connector 33"/>
@@ -6655,9 +6848,9 @@
           <p:nvPr/>
         </p:nvCxnSpPr>
         <p:spPr>
-          <a:xfrm rot="10800000" flipV="1">
-            <a:off x="10142391" y="3502671"/>
-            <a:ext cx="522532" cy="89576"/>
+          <a:xfrm rot="10800000">
+            <a:off x="9698130" y="3396215"/>
+            <a:ext cx="99248" cy="242472"/>
           </a:xfrm>
           <a:prstGeom prst="curvedConnector3">
             <a:avLst/>
@@ -6693,12 +6886,12 @@
         </p:nvCxnSpPr>
         <p:spPr>
           <a:xfrm rot="5400000" flipH="1" flipV="1">
-            <a:off x="9899280" y="2999193"/>
-            <a:ext cx="229316" cy="350597"/>
+            <a:off x="9775166" y="2679046"/>
+            <a:ext cx="33284" cy="794858"/>
           </a:xfrm>
           <a:prstGeom prst="curvedConnector3">
             <a:avLst>
-              <a:gd name="adj1" fmla="val 50000"/>
+              <a:gd name="adj1" fmla="val -149396"/>
             </a:avLst>
           </a:prstGeom>
           <a:ln>
@@ -6730,7 +6923,7 @@
           <p:nvPr/>
         </p:nvPicPr>
         <p:blipFill>
-          <a:blip r:embed="rId13"/>
+          <a:blip r:embed="rId15"/>
           <a:stretch>
             <a:fillRect/>
           </a:stretch>
@@ -6754,7 +6947,7 @@
           <p:nvPr/>
         </p:nvPicPr>
         <p:blipFill>
-          <a:blip r:embed="rId14"/>
+          <a:blip r:embed="rId16"/>
           <a:stretch>
             <a:fillRect/>
           </a:stretch>
@@ -6778,7 +6971,7 @@
           <p:nvPr/>
         </p:nvPicPr>
         <p:blipFill>
-          <a:blip r:embed="rId15"/>
+          <a:blip r:embed="rId17"/>
           <a:stretch>
             <a:fillRect/>
           </a:stretch>
@@ -6816,11 +7009,7 @@
           <a:lstStyle/>
           <a:p>
             <a:r>
-              <a:rPr lang="en-US" sz="900" dirty="0">
-                <a:solidFill>
-                  <a:schemeClr val="accent1"/>
-                </a:solidFill>
-              </a:rPr>
+              <a:rPr lang="en-US" sz="900" dirty="0"/>
               <a:t>Power BI Mobile App</a:t>
             </a:r>
           </a:p>
@@ -6929,64 +7118,6 @@
           </a:fontRef>
         </p:style>
       </p:cxnSp>
-      <p:sp>
-        <p:nvSpPr>
-          <p:cNvPr id="41" name="Title 1"/>
-          <p:cNvSpPr>
-            <a:spLocks noGrp="1"/>
-          </p:cNvSpPr>
-          <p:nvPr>
-            <p:ph type="title"/>
-          </p:nvPr>
-        </p:nvSpPr>
-        <p:spPr>
-          <a:xfrm>
-            <a:off x="-2440" y="-12644"/>
-            <a:ext cx="12194439" cy="744138"/>
-          </a:xfrm>
-        </p:spPr>
-        <p:txBody>
-          <a:bodyPr anchor="t">
-            <a:noAutofit/>
-          </a:bodyPr>
-          <a:lstStyle/>
-          <a:p>
-            <a:pPr>
-              <a:lnSpc>
-                <a:spcPts val="3000"/>
-              </a:lnSpc>
-            </a:pPr>
-            <a:r>
-              <a:rPr lang="en-US" sz="2800" dirty="0">
-                <a:solidFill>
-                  <a:srgbClr val="0072C6"/>
-                </a:solidFill>
-              </a:rPr>
-              <a:t>Starter Kit: Advanced Analytics(SQL Azure Data Warehouse with Power BI)</a:t>
-            </a:r>
-            <a:br>
-              <a:rPr lang="EN-US" sz="2800" dirty="0">
-                <a:solidFill>
-                  <a:srgbClr val="0072C6"/>
-                </a:solidFill>
-              </a:rPr>
-            </a:br>
-            <a:r>
-              <a:rPr lang="en-US" sz="1800" dirty="0">
-                <a:solidFill>
-                  <a:schemeClr val="accent3"/>
-                </a:solidFill>
-              </a:rPr>
-              <a:t>Twitter Sentiment Analysis AZURE DW and Power BI</a:t>
-            </a:r>
-            <a:endParaRPr lang="EN-US" sz="2800" dirty="0">
-              <a:solidFill>
-                <a:srgbClr val="0072C6"/>
-              </a:solidFill>
-            </a:endParaRPr>
-          </a:p>
-        </p:txBody>
-      </p:sp>
     </p:spTree>
     <p:extLst>
       <p:ext uri="{BB962C8B-B14F-4D97-AF65-F5344CB8AC3E}">
@@ -7309,6 +7440,44 @@
       </p:sp>
       <p:sp>
         <p:nvSpPr>
+          <p:cNvPr id="2" name="Title 1"/>
+          <p:cNvSpPr>
+            <a:spLocks noGrp="1"/>
+          </p:cNvSpPr>
+          <p:nvPr>
+            <p:ph type="title"/>
+          </p:nvPr>
+        </p:nvSpPr>
+        <p:spPr>
+          <a:xfrm>
+            <a:off x="49821" y="49954"/>
+            <a:ext cx="11536084" cy="744033"/>
+          </a:xfrm>
+        </p:spPr>
+        <p:txBody>
+          <a:bodyPr>
+            <a:noAutofit/>
+          </a:bodyPr>
+          <a:lstStyle/>
+          <a:p>
+            <a:r>
+              <a:rPr lang="EN-US" sz="2800" dirty="0">
+                <a:solidFill>
+                  <a:srgbClr val="0072C6"/>
+                </a:solidFill>
+              </a:rPr>
+              <a:t>Starter Kit: Advanced Analytics (On-Premises Data Sources)</a:t>
+            </a:r>
+            <a:endParaRPr lang="EN-US" sz="2800" dirty="0">
+              <a:solidFill>
+                <a:schemeClr val="tx2"/>
+              </a:solidFill>
+            </a:endParaRPr>
+          </a:p>
+        </p:txBody>
+      </p:sp>
+      <p:sp>
+        <p:nvSpPr>
           <p:cNvPr id="32" name="TextBox 31"/>
           <p:cNvSpPr txBox="1"/>
           <p:nvPr/>
@@ -7638,7 +7807,7 @@
         <p:spPr>
           <a:xfrm>
             <a:off x="3107639" y="850884"/>
-            <a:ext cx="2579950" cy="5995835"/>
+            <a:ext cx="2579950" cy="5372587"/>
           </a:xfrm>
           <a:prstGeom prst="rect">
             <a:avLst/>
@@ -7699,7 +7868,7 @@
                   <a:schemeClr val="bg1"/>
                 </a:solidFill>
               </a:rPr>
-              <a:t>Microsoft provide Power BI service to quickly create self-service online reports. Also, Azure Data Factory is a  globally deployed data movement service in the cloud. Use it to ingest data from multiple on-premises and cloud sources easily. You pay for what you use and no more:</a:t>
+              <a:t>Microsoft provide Power BI service to quickly create self-service online reports. You pay for what you use and no more:</a:t>
             </a:r>
           </a:p>
           <a:p>
@@ -7788,12 +7957,57 @@
               </a:rPr>
               <a:t>refreshed </a:t>
             </a:r>
+          </a:p>
+          <a:p>
+            <a:pPr marL="285750" lvl="0" indent="-285750">
+              <a:lnSpc>
+                <a:spcPct val="90000"/>
+              </a:lnSpc>
+              <a:buFont typeface="Arial" panose="020B0604020202020204" pitchFamily="34" charset="0"/>
+              <a:buChar char="•"/>
+            </a:pPr>
+            <a:r>
+              <a:rPr lang="en-US" sz="1400" dirty="0">
+                <a:solidFill>
+                  <a:schemeClr val="bg1"/>
+                </a:solidFill>
+              </a:rPr>
+              <a:t> </a:t>
+            </a:r>
+          </a:p>
+          <a:p>
+            <a:pPr marL="285750" lvl="0" indent="-285750">
+              <a:lnSpc>
+                <a:spcPct val="90000"/>
+              </a:lnSpc>
+              <a:buFont typeface="Arial" panose="020B0604020202020204" pitchFamily="34" charset="0"/>
+              <a:buChar char="•"/>
+            </a:pPr>
             <a:endParaRPr lang="en-US" sz="1300" b="1" dirty="0">
               <a:solidFill>
                 <a:schemeClr val="bg1"/>
               </a:solidFill>
             </a:endParaRPr>
           </a:p>
+          <a:p>
+            <a:pPr>
+              <a:lnSpc>
+                <a:spcPct val="90000"/>
+              </a:lnSpc>
+            </a:pPr>
+            <a:br>
+              <a:rPr lang="en-US" sz="1300" b="1" dirty="0">
+                <a:solidFill>
+                  <a:schemeClr val="bg1"/>
+                </a:solidFill>
+              </a:rPr>
+            </a:br>
+            <a:endParaRPr lang="en-US" sz="1300" b="1" dirty="0">
+              <a:solidFill>
+                <a:schemeClr val="bg1"/>
+              </a:solidFill>
+            </a:endParaRPr>
+          </a:p>
         </p:txBody>
       </p:sp>
       <p:sp>
@@ -7805,7 +8019,7 @@
         <p:spPr>
           <a:xfrm>
             <a:off x="5817863" y="845996"/>
-            <a:ext cx="2818824" cy="2685698"/>
+            <a:ext cx="2818824" cy="3295095"/>
           </a:xfrm>
           <a:prstGeom prst="rect">
             <a:avLst/>
@@ -7870,6 +8084,49 @@
               </a:rPr>
               <a:t>Scenario: Power BI with On-premises Data Sources</a:t>
             </a:r>
+          </a:p>
+          <a:p>
+            <a:pPr marL="285750" indent="-285750">
+              <a:lnSpc>
+                <a:spcPct val="90000"/>
+              </a:lnSpc>
+              <a:buFont typeface="Arial" panose="020B0604020202020204" pitchFamily="34" charset="0"/>
+              <a:buChar char="•"/>
+            </a:pPr>
+            <a:r>
+              <a:rPr lang="en-US" sz="1100" i="1" dirty="0">
+                <a:solidFill>
+                  <a:schemeClr val="bg1"/>
+                </a:solidFill>
+              </a:rPr>
+              <a:t>Analytics:</a:t>
+            </a:r>
+          </a:p>
+          <a:p>
+            <a:pPr marL="742950" lvl="1" indent="-285750">
+              <a:lnSpc>
+                <a:spcPct val="90000"/>
+              </a:lnSpc>
+              <a:buFont typeface="Arial" panose="020B0604020202020204" pitchFamily="34" charset="0"/>
+              <a:buChar char="•"/>
+            </a:pPr>
+            <a:r>
+              <a:rPr lang="en-US" sz="1100" i="1" dirty="0">
+                <a:solidFill>
+                  <a:schemeClr val="bg1"/>
+                </a:solidFill>
+              </a:rPr>
+              <a:t>HDInsight A2 Windows= $238.08</a:t>
+            </a:r>
+          </a:p>
+          <a:p>
+            <a:pPr marL="285750" indent="-285750">
+              <a:lnSpc>
+                <a:spcPct val="90000"/>
+              </a:lnSpc>
+              <a:buFont typeface="Arial" panose="020B0604020202020204" pitchFamily="34" charset="0"/>
+              <a:buChar char="•"/>
+            </a:pPr>
             <a:endParaRPr lang="en-US" sz="1100" i="1" dirty="0">
               <a:solidFill>
                 <a:schemeClr val="bg1"/>
@@ -7924,7 +8181,7 @@
                   <a:schemeClr val="bg1"/>
                 </a:solidFill>
               </a:rPr>
-              <a:t>50TB Block Blob Locally Redundant = $1208.73</a:t>
+              <a:t>1TB Block Blob Locally Redundant = $24.58</a:t>
             </a:r>
           </a:p>
           <a:p>
@@ -7986,7 +8243,7 @@
                   <a:prstClr val="white"/>
                 </a:solidFill>
               </a:rPr>
-              <a:t>Total : U$ 19,168.56/ Year</a:t>
+              <a:t>Total : U$7815.72/ Year</a:t>
             </a:r>
             <a:endParaRPr lang="en-US" sz="1200" b="1" dirty="0">
               <a:solidFill>
@@ -8916,7 +9173,7 @@
         </p:nvSpPr>
         <p:spPr>
           <a:xfrm>
-            <a:off x="8671227" y="1293990"/>
+            <a:off x="8692272" y="1293990"/>
             <a:ext cx="3224749" cy="3122294"/>
           </a:xfrm>
           <a:prstGeom prst="cloud">
@@ -9026,11 +9283,7 @@
           <a:lstStyle/>
           <a:p>
             <a:r>
-              <a:rPr lang="en-US" sz="900" dirty="0">
-                <a:solidFill>
-                  <a:schemeClr val="accent1"/>
-                </a:solidFill>
-              </a:rPr>
+              <a:rPr lang="en-US" sz="900" dirty="0"/>
               <a:t>Power BI Desktop</a:t>
             </a:r>
           </a:p>
@@ -9100,7 +9353,7 @@
         </p:blipFill>
         <p:spPr>
           <a:xfrm>
-            <a:off x="10639275" y="3296163"/>
+            <a:off x="9786047" y="3408137"/>
             <a:ext cx="640828" cy="461100"/>
           </a:xfrm>
           <a:prstGeom prst="rect">
@@ -9108,19 +9361,146 @@
           </a:prstGeom>
         </p:spPr>
       </p:pic>
+      <p:pic>
+        <p:nvPicPr>
+          <p:cNvPr id="33" name="Picture 32"/>
+          <p:cNvPicPr>
+            <a:picLocks noChangeAspect="1"/>
+          </p:cNvPicPr>
+          <p:nvPr/>
+        </p:nvPicPr>
+        <p:blipFill>
+          <a:blip r:embed="rId12"/>
+          <a:stretch>
+            <a:fillRect/>
+          </a:stretch>
+        </p:blipFill>
+        <p:spPr>
+          <a:xfrm>
+            <a:off x="10549268" y="3386308"/>
+            <a:ext cx="745453" cy="474150"/>
+          </a:xfrm>
+          <a:prstGeom prst="rect">
+            <a:avLst/>
+          </a:prstGeom>
+        </p:spPr>
+      </p:pic>
+      <p:pic>
+        <p:nvPicPr>
+          <p:cNvPr id="34" name="Picture 33"/>
+          <p:cNvPicPr>
+            <a:picLocks noChangeAspect="1"/>
+          </p:cNvPicPr>
+          <p:nvPr/>
+        </p:nvPicPr>
+        <p:blipFill>
+          <a:blip r:embed="rId13"/>
+          <a:stretch>
+            <a:fillRect/>
+          </a:stretch>
+        </p:blipFill>
+        <p:spPr>
+          <a:xfrm>
+            <a:off x="10807886" y="2820856"/>
+            <a:ext cx="566719" cy="421950"/>
+          </a:xfrm>
+          <a:prstGeom prst="rect">
+            <a:avLst/>
+          </a:prstGeom>
+        </p:spPr>
+      </p:pic>
+      <p:cxnSp>
+        <p:nvCxnSpPr>
+          <p:cNvPr id="37" name="Straight Arrow Connector 23"/>
+          <p:cNvCxnSpPr>
+            <a:stCxn id="34" idx="1"/>
+            <a:endCxn id="33" idx="0"/>
+          </p:cNvCxnSpPr>
+          <p:nvPr/>
+        </p:nvCxnSpPr>
+        <p:spPr>
+          <a:xfrm rot="10800000" flipH="1" flipV="1">
+            <a:off x="10807885" y="3031830"/>
+            <a:ext cx="114109" cy="354477"/>
+          </a:xfrm>
+          <a:prstGeom prst="curvedConnector4">
+            <a:avLst>
+              <a:gd name="adj1" fmla="val -200335"/>
+              <a:gd name="adj2" fmla="val 79759"/>
+            </a:avLst>
+          </a:prstGeom>
+          <a:ln>
+            <a:solidFill>
+              <a:schemeClr val="accent1"/>
+            </a:solidFill>
+            <a:prstDash val="sysDash"/>
+            <a:tailEnd type="triangle"/>
+          </a:ln>
+        </p:spPr>
+        <p:style>
+          <a:lnRef idx="1">
+            <a:schemeClr val="accent1"/>
+          </a:lnRef>
+          <a:fillRef idx="0">
+            <a:schemeClr val="accent1"/>
+          </a:fillRef>
+          <a:effectRef idx="0">
+            <a:schemeClr val="accent1"/>
+          </a:effectRef>
+          <a:fontRef idx="minor">
+            <a:schemeClr val="tx1"/>
+          </a:fontRef>
+        </p:style>
+      </p:cxnSp>
+      <p:cxnSp>
+        <p:nvCxnSpPr>
+          <p:cNvPr id="38" name="Curved Connector 37"/>
+          <p:cNvCxnSpPr>
+            <a:stCxn id="33" idx="1"/>
+            <a:endCxn id="30" idx="3"/>
+          </p:cNvCxnSpPr>
+          <p:nvPr/>
+        </p:nvCxnSpPr>
+        <p:spPr>
+          <a:xfrm rot="10800000" flipV="1">
+            <a:off x="10426876" y="3623383"/>
+            <a:ext cx="122393" cy="15304"/>
+          </a:xfrm>
+          <a:prstGeom prst="curvedConnector3">
+            <a:avLst/>
+          </a:prstGeom>
+          <a:ln>
+            <a:prstDash val="sysDash"/>
+            <a:tailEnd type="triangle"/>
+          </a:ln>
+        </p:spPr>
+        <p:style>
+          <a:lnRef idx="1">
+            <a:schemeClr val="accent1"/>
+          </a:lnRef>
+          <a:fillRef idx="0">
+            <a:schemeClr val="accent1"/>
+          </a:fillRef>
+          <a:effectRef idx="0">
+            <a:schemeClr val="accent1"/>
+          </a:effectRef>
+          <a:fontRef idx="minor">
+            <a:schemeClr val="tx1"/>
+          </a:fontRef>
+        </p:style>
+      </p:cxnSp>
       <p:cxnSp>
         <p:nvCxnSpPr>
           <p:cNvPr id="40" name="Curved Connector 39"/>
           <p:cNvCxnSpPr>
             <a:stCxn id="30" idx="1"/>
-            <a:endCxn id="3" idx="3"/>
           </p:cNvCxnSpPr>
           <p:nvPr/>
         </p:nvCxnSpPr>
         <p:spPr>
           <a:xfrm rot="10800000">
-            <a:off x="9925751" y="3516643"/>
-            <a:ext cx="713524" cy="10071"/>
+            <a:off x="9686799" y="3396215"/>
+            <a:ext cx="99248" cy="242472"/>
           </a:xfrm>
           <a:prstGeom prst="curvedConnector3">
             <a:avLst/>
@@ -9156,8 +9536,8 @@
         </p:nvCxnSpPr>
         <p:spPr>
           <a:xfrm rot="5400000" flipH="1" flipV="1">
-            <a:off x="9626467" y="2829311"/>
-            <a:ext cx="320917" cy="781962"/>
+            <a:off x="9763365" y="2775503"/>
+            <a:ext cx="130210" cy="698871"/>
           </a:xfrm>
           <a:prstGeom prst="curvedConnector3">
             <a:avLst>
@@ -9193,54 +9573,6 @@
           <p:nvPr/>
         </p:nvPicPr>
         <p:blipFill>
-          <a:blip r:embed="rId12"/>
-          <a:stretch>
-            <a:fillRect/>
-          </a:stretch>
-        </p:blipFill>
-        <p:spPr>
-          <a:xfrm>
-            <a:off x="10334619" y="1789981"/>
-            <a:ext cx="537093" cy="483828"/>
-          </a:xfrm>
-          <a:prstGeom prst="rect">
-            <a:avLst/>
-          </a:prstGeom>
-        </p:spPr>
-      </p:pic>
-      <p:pic>
-        <p:nvPicPr>
-          <p:cNvPr id="43" name="Picture 42"/>
-          <p:cNvPicPr>
-            <a:picLocks noChangeAspect="1"/>
-          </p:cNvPicPr>
-          <p:nvPr/>
-        </p:nvPicPr>
-        <p:blipFill>
-          <a:blip r:embed="rId13"/>
-          <a:stretch>
-            <a:fillRect/>
-          </a:stretch>
-        </p:blipFill>
-        <p:spPr>
-          <a:xfrm>
-            <a:off x="10866119" y="1732067"/>
-            <a:ext cx="374906" cy="639450"/>
-          </a:xfrm>
-          <a:prstGeom prst="rect">
-            <a:avLst/>
-          </a:prstGeom>
-        </p:spPr>
-      </p:pic>
-      <p:pic>
-        <p:nvPicPr>
-          <p:cNvPr id="45" name="Picture 44"/>
-          <p:cNvPicPr>
-            <a:picLocks noChangeAspect="1"/>
-          </p:cNvPicPr>
-          <p:nvPr/>
-        </p:nvPicPr>
-        <p:blipFill>
           <a:blip r:embed="rId14"/>
           <a:stretch>
             <a:fillRect/>
@@ -9248,79 +9580,17 @@
         </p:blipFill>
         <p:spPr>
           <a:xfrm>
-            <a:off x="11280103" y="1769761"/>
-            <a:ext cx="357469" cy="513300"/>
+            <a:off x="10334619" y="1789981"/>
+            <a:ext cx="537093" cy="483828"/>
           </a:xfrm>
           <a:prstGeom prst="rect">
             <a:avLst/>
           </a:prstGeom>
         </p:spPr>
       </p:pic>
-      <p:sp>
-        <p:nvSpPr>
-          <p:cNvPr id="46" name="TextBox 45"/>
-          <p:cNvSpPr txBox="1"/>
-          <p:nvPr/>
-        </p:nvSpPr>
-        <p:spPr>
-          <a:xfrm>
-            <a:off x="10523930" y="2304124"/>
-            <a:ext cx="1168351" cy="230832"/>
-          </a:xfrm>
-          <a:prstGeom prst="rect">
-            <a:avLst/>
-          </a:prstGeom>
-          <a:noFill/>
-        </p:spPr>
-        <p:txBody>
-          <a:bodyPr wrap="square" rtlCol="0">
-            <a:spAutoFit/>
-          </a:bodyPr>
-          <a:lstStyle/>
-          <a:p>
-            <a:r>
-              <a:rPr lang="en-US" sz="900" dirty="0">
-                <a:solidFill>
-                  <a:schemeClr val="accent1"/>
-                </a:solidFill>
-              </a:rPr>
-              <a:t>Power BI Mobile App</a:t>
-            </a:r>
-          </a:p>
-        </p:txBody>
-      </p:sp>
-      <p:sp>
-        <p:nvSpPr>
-          <p:cNvPr id="47" name="TextBox 46"/>
-          <p:cNvSpPr txBox="1"/>
-          <p:nvPr/>
-        </p:nvSpPr>
-        <p:spPr>
-          <a:xfrm>
-            <a:off x="10365030" y="2650144"/>
-            <a:ext cx="1176130" cy="230832"/>
-          </a:xfrm>
-          <a:prstGeom prst="rect">
-            <a:avLst/>
-          </a:prstGeom>
-          <a:noFill/>
-        </p:spPr>
-        <p:txBody>
-          <a:bodyPr wrap="square" rtlCol="0">
-            <a:spAutoFit/>
-          </a:bodyPr>
-          <a:lstStyle/>
-          <a:p>
-            <a:r>
-              <a:rPr lang="en-US" sz="900" b="1" dirty="0"/>
-              <a:t>Power BI</a:t>
-            </a:r>
-          </a:p>
-        </p:txBody>
-      </p:sp>
       <p:pic>
         <p:nvPicPr>
-          <p:cNvPr id="3" name="Picture 2"/>
+          <p:cNvPr id="43" name="Picture 42"/>
           <p:cNvPicPr>
             <a:picLocks noChangeAspect="1"/>
           </p:cNvPicPr>
@@ -9334,7 +9604,113 @@
         </p:blipFill>
         <p:spPr>
           <a:xfrm>
-            <a:off x="8866137" y="3380750"/>
+            <a:off x="10866119" y="1732067"/>
+            <a:ext cx="374906" cy="639450"/>
+          </a:xfrm>
+          <a:prstGeom prst="rect">
+            <a:avLst/>
+          </a:prstGeom>
+        </p:spPr>
+      </p:pic>
+      <p:pic>
+        <p:nvPicPr>
+          <p:cNvPr id="45" name="Picture 44"/>
+          <p:cNvPicPr>
+            <a:picLocks noChangeAspect="1"/>
+          </p:cNvPicPr>
+          <p:nvPr/>
+        </p:nvPicPr>
+        <p:blipFill>
+          <a:blip r:embed="rId16"/>
+          <a:stretch>
+            <a:fillRect/>
+          </a:stretch>
+        </p:blipFill>
+        <p:spPr>
+          <a:xfrm>
+            <a:off x="11280103" y="1769761"/>
+            <a:ext cx="357469" cy="513300"/>
+          </a:xfrm>
+          <a:prstGeom prst="rect">
+            <a:avLst/>
+          </a:prstGeom>
+        </p:spPr>
+      </p:pic>
+      <p:sp>
+        <p:nvSpPr>
+          <p:cNvPr id="46" name="TextBox 45"/>
+          <p:cNvSpPr txBox="1"/>
+          <p:nvPr/>
+        </p:nvSpPr>
+        <p:spPr>
+          <a:xfrm>
+            <a:off x="10523930" y="2304124"/>
+            <a:ext cx="1168351" cy="230832"/>
+          </a:xfrm>
+          <a:prstGeom prst="rect">
+            <a:avLst/>
+          </a:prstGeom>
+          <a:noFill/>
+        </p:spPr>
+        <p:txBody>
+          <a:bodyPr wrap="square" rtlCol="0">
+            <a:spAutoFit/>
+          </a:bodyPr>
+          <a:lstStyle/>
+          <a:p>
+            <a:r>
+              <a:rPr lang="en-US" sz="900" dirty="0"/>
+              <a:t>Power BI Mobile App</a:t>
+            </a:r>
+          </a:p>
+        </p:txBody>
+      </p:sp>
+      <p:sp>
+        <p:nvSpPr>
+          <p:cNvPr id="47" name="TextBox 46"/>
+          <p:cNvSpPr txBox="1"/>
+          <p:nvPr/>
+        </p:nvSpPr>
+        <p:spPr>
+          <a:xfrm>
+            <a:off x="10365030" y="2650144"/>
+            <a:ext cx="1176130" cy="230832"/>
+          </a:xfrm>
+          <a:prstGeom prst="rect">
+            <a:avLst/>
+          </a:prstGeom>
+          <a:noFill/>
+        </p:spPr>
+        <p:txBody>
+          <a:bodyPr wrap="square" rtlCol="0">
+            <a:spAutoFit/>
+          </a:bodyPr>
+          <a:lstStyle/>
+          <a:p>
+            <a:r>
+              <a:rPr lang="en-US" sz="900" b="1" dirty="0"/>
+              <a:t>Power BI</a:t>
+            </a:r>
+          </a:p>
+        </p:txBody>
+      </p:sp>
+      <p:pic>
+        <p:nvPicPr>
+          <p:cNvPr id="3" name="Picture 2"/>
+          <p:cNvPicPr>
+            <a:picLocks noChangeAspect="1"/>
+          </p:cNvPicPr>
+          <p:nvPr/>
+        </p:nvPicPr>
+        <p:blipFill>
+          <a:blip r:embed="rId17"/>
+          <a:stretch>
+            <a:fillRect/>
+          </a:stretch>
+        </p:blipFill>
+        <p:spPr>
+          <a:xfrm>
+            <a:off x="8949228" y="3190043"/>
             <a:ext cx="1059614" cy="271784"/>
           </a:xfrm>
           <a:prstGeom prst="rect">
@@ -9423,7 +9799,7 @@
         </p:nvSpPr>
         <p:spPr>
           <a:xfrm>
-            <a:off x="9950913" y="3526588"/>
+            <a:off x="9277632" y="3490623"/>
             <a:ext cx="1079074" cy="200055"/>
           </a:xfrm>
           <a:prstGeom prst="rect">
@@ -9438,96 +9814,12 @@
           <a:lstStyle/>
           <a:p>
             <a:r>
+              <a:rPr lang="en-US" altLang="zh-CN" sz="700" dirty="0" err="1"/>
+              <a:t>Polybase</a:t>
+            </a:r>
+            <a:r>
               <a:rPr lang="en-US" altLang="zh-CN" sz="700" dirty="0"/>
-              <a:t>Polybase Access</a:t>
-            </a:r>
-            <a:endParaRPr lang="en-US" sz="700" dirty="0"/>
-          </a:p>
-        </p:txBody>
-      </p:sp>
-      <p:sp>
-        <p:nvSpPr>
-          <p:cNvPr id="51" name="Title 1"/>
-          <p:cNvSpPr>
-            <a:spLocks noGrp="1"/>
-          </p:cNvSpPr>
-          <p:nvPr>
-            <p:ph type="title"/>
-          </p:nvPr>
-        </p:nvSpPr>
-        <p:spPr>
-          <a:xfrm>
-            <a:off x="0" y="4763"/>
-            <a:ext cx="11655425" cy="744537"/>
-          </a:xfrm>
-        </p:spPr>
-        <p:txBody>
-          <a:bodyPr anchor="t">
-            <a:noAutofit/>
-          </a:bodyPr>
-          <a:lstStyle/>
-          <a:p>
-            <a:pPr>
-              <a:lnSpc>
-                <a:spcPts val="3000"/>
-              </a:lnSpc>
-            </a:pPr>
-            <a:r>
-              <a:rPr lang="en-US" sz="2800" dirty="0">
-                <a:solidFill>
-                  <a:srgbClr val="0072C6"/>
-                </a:solidFill>
-              </a:rPr>
-              <a:t>Starter Kit: Advanced Analytics (On-Premises Data Sources)</a:t>
-            </a:r>
-            <a:br>
-              <a:rPr lang="EN-US" sz="2800" dirty="0">
-                <a:solidFill>
-                  <a:srgbClr val="0072C6"/>
-                </a:solidFill>
-              </a:rPr>
-            </a:br>
-            <a:r>
-              <a:rPr lang="en-US" sz="1800" dirty="0">
-                <a:solidFill>
-                  <a:schemeClr val="accent3"/>
-                </a:solidFill>
-              </a:rPr>
-              <a:t>Cloud Big Data for  Customer Churn Analysis with On-Premises Data</a:t>
-            </a:r>
-            <a:endParaRPr lang="EN-US" sz="2800" dirty="0">
-              <a:solidFill>
-                <a:srgbClr val="0072C6"/>
-              </a:solidFill>
-            </a:endParaRPr>
-          </a:p>
-        </p:txBody>
-      </p:sp>
-      <p:sp>
-        <p:nvSpPr>
-          <p:cNvPr id="49" name="TextBox 48"/>
-          <p:cNvSpPr txBox="1"/>
-          <p:nvPr/>
-        </p:nvSpPr>
-        <p:spPr>
-          <a:xfrm>
-            <a:off x="9549582" y="3160176"/>
-            <a:ext cx="1079074" cy="200055"/>
-          </a:xfrm>
-          <a:prstGeom prst="rect">
-            <a:avLst/>
-          </a:prstGeom>
-          <a:noFill/>
-        </p:spPr>
-        <p:txBody>
-          <a:bodyPr wrap="square" rtlCol="0">
-            <a:spAutoFit/>
-          </a:bodyPr>
-          <a:lstStyle/>
-          <a:p>
-            <a:r>
-              <a:rPr lang="en-US" altLang="zh-CN" sz="700" dirty="0"/>
-              <a:t>On-Premises Gateway</a:t>
+              <a:t> access</a:t>
             </a:r>
             <a:endParaRPr lang="en-US" sz="700" dirty="0"/>
           </a:p>
@@ -9802,6 +10094,45 @@
       </p:sp>
       <p:sp>
         <p:nvSpPr>
+          <p:cNvPr id="2" name="Title 1"/>
+          <p:cNvSpPr>
+            <a:spLocks noGrp="1"/>
+          </p:cNvSpPr>
+          <p:nvPr>
+            <p:ph type="title"/>
+          </p:nvPr>
+        </p:nvSpPr>
+        <p:spPr>
+          <a:xfrm>
+            <a:off x="0" y="5987"/>
+            <a:ext cx="12087225" cy="744033"/>
+          </a:xfrm>
+        </p:spPr>
+        <p:txBody>
+          <a:bodyPr>
+            <a:noAutofit/>
+          </a:bodyPr>
+          <a:lstStyle/>
+          <a:p>
+            <a:r>
+              <a:rPr lang="EN-US" sz="2800" dirty="0">
+                <a:solidFill>
+                  <a:srgbClr val="0072C6"/>
+                </a:solidFill>
+              </a:rPr>
+              <a:t>Starter Kit: Intelligent App(Azure Event Hub, ASA and Machine Learning)</a:t>
+            </a:r>
+            <a:endParaRPr lang="EN-US" sz="2800" dirty="0">
+              <a:solidFill>
+                <a:srgbClr val="0072C6"/>
+              </a:solidFill>
+              <a:latin typeface="Segoe UI Semibold"/>
+            </a:endParaRPr>
+          </a:p>
+        </p:txBody>
+      </p:sp>
+      <p:sp>
+        <p:nvSpPr>
           <p:cNvPr id="32" name="TextBox 31"/>
           <p:cNvSpPr txBox="1"/>
           <p:nvPr/>
@@ -10319,7 +10650,7 @@
         <p:spPr>
           <a:xfrm>
             <a:off x="5782624" y="845769"/>
-            <a:ext cx="2893111" cy="3752144"/>
+            <a:ext cx="2893111" cy="4056842"/>
           </a:xfrm>
           <a:prstGeom prst="rect">
             <a:avLst/>
@@ -10416,6 +10747,23 @@
                   <a:schemeClr val="bg1"/>
                 </a:solidFill>
               </a:rPr>
+              <a:t>HDInsight A3 Windows = $476.16</a:t>
+            </a:r>
+          </a:p>
+          <a:p>
+            <a:pPr marL="742950" lvl="1" indent="-285750">
+              <a:lnSpc>
+                <a:spcPct val="90000"/>
+              </a:lnSpc>
+              <a:buFont typeface="Arial" panose="020B0604020202020204" pitchFamily="34" charset="0"/>
+              <a:buChar char="•"/>
+            </a:pPr>
+            <a:r>
+              <a:rPr lang="en-US" sz="1100" i="1" dirty="0">
+                <a:solidFill>
+                  <a:schemeClr val="bg1"/>
+                </a:solidFill>
+              </a:rPr>
               <a:t>Data Factory = $105</a:t>
             </a:r>
           </a:p>
@@ -10532,7 +10880,7 @@
                   <a:schemeClr val="bg1"/>
                 </a:solidFill>
               </a:rPr>
-              <a:t>50TB Block Blob Locally Redundant = $1208.73</a:t>
+              <a:t>1TB Block and Page Blob Locally Redundant = $75.78</a:t>
             </a:r>
           </a:p>
           <a:p>
@@ -10549,7 +10897,7 @@
                   <a:schemeClr val="bg1"/>
                 </a:solidFill>
               </a:rPr>
-              <a:t>S3 SQL Database = $149.99</a:t>
+              <a:t>S1 SQL Database = $31.02</a:t>
             </a:r>
           </a:p>
           <a:p>
@@ -10609,7 +10957,7 @@
                   <a:schemeClr val="bg1"/>
                 </a:solidFill>
               </a:rPr>
-              <a:t>Total : U$  27,108.48/ Year</a:t>
+              <a:t>Total : U$17,799.50 / Year</a:t>
             </a:r>
             <a:endParaRPr lang="en-US" sz="1200" b="1" dirty="0">
               <a:solidFill>
@@ -11552,7 +11900,7 @@
         <p:spPr>
           <a:xfrm>
             <a:off x="9098921" y="1774263"/>
-            <a:ext cx="1079074" cy="246221"/>
+            <a:ext cx="1079074" cy="230832"/>
           </a:xfrm>
           <a:prstGeom prst="rect">
             <a:avLst/>
@@ -11566,12 +11914,12 @@
           <a:lstStyle/>
           <a:p>
             <a:r>
-              <a:rPr lang="en-US" sz="1000" dirty="0">
-                <a:solidFill>
-                  <a:schemeClr val="accent1"/>
-                </a:solidFill>
-              </a:rPr>
-              <a:t>IoT Sensors</a:t>
+              <a:rPr lang="en-US" sz="900" dirty="0" err="1"/>
+              <a:t>IoT</a:t>
+            </a:r>
+            <a:r>
+              <a:rPr lang="en-US" sz="900" dirty="0"/>
+              <a:t> Sensors</a:t>
             </a:r>
           </a:p>
         </p:txBody>
@@ -11671,11 +12019,7 @@
           <a:lstStyle/>
           <a:p>
             <a:r>
-              <a:rPr lang="en-US" sz="900" dirty="0">
-                <a:solidFill>
-                  <a:schemeClr val="accent1"/>
-                </a:solidFill>
-              </a:rPr>
+              <a:rPr lang="en-US" sz="900" dirty="0"/>
               <a:t>Power BI Mobile App</a:t>
             </a:r>
           </a:p>
@@ -11829,11 +12173,7 @@
           <a:lstStyle/>
           <a:p>
             <a:r>
-              <a:rPr lang="en-US" sz="900" dirty="0">
-                <a:solidFill>
-                  <a:schemeClr val="accent1"/>
-                </a:solidFill>
-              </a:rPr>
+              <a:rPr lang="en-US" sz="900" dirty="0"/>
               <a:t>Azure Event Hub</a:t>
             </a:r>
           </a:p>
@@ -12092,125 +12432,6 @@
           </a:fontRef>
         </p:style>
       </p:cxnSp>
-      <p:pic>
-        <p:nvPicPr>
-          <p:cNvPr id="5" name="Picture 3"/>
-          <p:cNvPicPr>
-            <a:picLocks noChangeAspect="1"/>
-          </p:cNvPicPr>
-          <p:nvPr/>
-        </p:nvPicPr>
-        <p:blipFill>
-          <a:blip r:embed="rId18"/>
-          <a:stretch>
-            <a:fillRect/>
-          </a:stretch>
-        </p:blipFill>
-        <p:spPr>
-          <a:xfrm>
-            <a:off x="10246380" y="3738310"/>
-            <a:ext cx="368116" cy="372749"/>
-          </a:xfrm>
-          <a:prstGeom prst="rect">
-            <a:avLst/>
-          </a:prstGeom>
-        </p:spPr>
-      </p:pic>
-      <p:cxnSp>
-        <p:nvCxnSpPr>
-          <p:cNvPr id="7" name="Curved Connector 5"/>
-          <p:cNvCxnSpPr>
-            <a:stCxn id="15" idx="2"/>
-            <a:endCxn id="5" idx="3"/>
-          </p:cNvCxnSpPr>
-          <p:nvPr/>
-        </p:nvCxnSpPr>
-        <p:spPr>
-          <a:xfrm rot="5400000">
-            <a:off x="10563069" y="3721251"/>
-            <a:ext cx="254861" cy="152006"/>
-          </a:xfrm>
-          <a:prstGeom prst="curvedConnector2">
-            <a:avLst/>
-          </a:prstGeom>
-          <a:ln>
-            <a:prstDash val="sysDash"/>
-            <a:tailEnd type="triangle"/>
-          </a:ln>
-        </p:spPr>
-        <p:style>
-          <a:lnRef idx="1">
-            <a:schemeClr val="accent1"/>
-          </a:lnRef>
-          <a:fillRef idx="0">
-            <a:schemeClr val="accent1"/>
-          </a:fillRef>
-          <a:effectRef idx="0">
-            <a:schemeClr val="accent1"/>
-          </a:effectRef>
-          <a:fontRef idx="minor">
-            <a:schemeClr val="tx1"/>
-          </a:fontRef>
-        </p:style>
-      </p:cxnSp>
-      <p:sp>
-        <p:nvSpPr>
-          <p:cNvPr id="42" name="Title 1"/>
-          <p:cNvSpPr>
-            <a:spLocks noGrp="1"/>
-          </p:cNvSpPr>
-          <p:nvPr>
-            <p:ph type="title"/>
-          </p:nvPr>
-        </p:nvSpPr>
-        <p:spPr>
-          <a:xfrm>
-            <a:off x="0" y="6350"/>
-            <a:ext cx="12279313" cy="795338"/>
-          </a:xfrm>
-        </p:spPr>
-        <p:txBody>
-          <a:bodyPr anchor="t">
-            <a:noAutofit/>
-          </a:bodyPr>
-          <a:lstStyle/>
-          <a:p>
-            <a:pPr>
-              <a:lnSpc>
-                <a:spcPts val="3000"/>
-              </a:lnSpc>
-            </a:pPr>
-            <a:r>
-              <a:rPr lang="en-US" sz="2800" dirty="0">
-                <a:solidFill>
-                  <a:srgbClr val="0072C6"/>
-                </a:solidFill>
-              </a:rPr>
-              <a:t>Starter Kit: Intelligent App(Event Hub with Stream Analytics and Power BI)</a:t>
-            </a:r>
-            <a:br>
-              <a:rPr lang="EN-US" sz="2800" dirty="0">
-                <a:solidFill>
-                  <a:srgbClr val="0072C6"/>
-                </a:solidFill>
-              </a:rPr>
-            </a:br>
-            <a:r>
-              <a:rPr lang="en-US" sz="1800" dirty="0">
-                <a:solidFill>
-                  <a:schemeClr val="accent3"/>
-                </a:solidFill>
-              </a:rPr>
-              <a:t>Monitoring Elevator for Predictive Maintenance</a:t>
-            </a:r>
-            <a:endParaRPr lang="EN-US" sz="2800" dirty="0">
-              <a:solidFill>
-                <a:srgbClr val="0072C6"/>
-              </a:solidFill>
-            </a:endParaRPr>
-          </a:p>
-        </p:txBody>
-      </p:sp>
     </p:spTree>
     <p:extLst>
       <p:ext uri="{BB962C8B-B14F-4D97-AF65-F5344CB8AC3E}">
@@ -12223,7 +12444,7 @@
   </p:clrMapOvr>
   <mc:AlternateContent xmlns:mc="http://schemas.openxmlformats.org/markup-compatibility/2006" xmlns:p14="http://schemas.microsoft.com/office/powerpoint/2010/main">
     <mc:Choice Requires="p14">
-      <p:transition p14:dur="10"/>
+      <p:transition p14:dur="0"/>
     </mc:Choice>
     <mc:Fallback xmlns="">
       <p:transition/>
@@ -12533,6 +12754,39 @@
       </p:sp>
       <p:sp>
         <p:nvSpPr>
+          <p:cNvPr id="2" name="Title 1"/>
+          <p:cNvSpPr>
+            <a:spLocks noGrp="1"/>
+          </p:cNvSpPr>
+          <p:nvPr>
+            <p:ph type="title"/>
+          </p:nvPr>
+        </p:nvSpPr>
+        <p:spPr>
+          <a:xfrm>
+            <a:off x="0" y="-8008"/>
+            <a:ext cx="11917021" cy="744033"/>
+          </a:xfrm>
+        </p:spPr>
+        <p:txBody>
+          <a:bodyPr>
+            <a:noAutofit/>
+          </a:bodyPr>
+          <a:lstStyle/>
+          <a:p>
+            <a:r>
+              <a:rPr lang="EN-US" sz="2800" dirty="0">
+                <a:solidFill>
+                  <a:srgbClr val="0072C6"/>
+                </a:solidFill>
+              </a:rPr>
+              <a:t>Starter Kit: Intelligent App(Data Factory, Data Lake, Machine Learning)</a:t>
+            </a:r>
+          </a:p>
+        </p:txBody>
+      </p:sp>
+      <p:sp>
+        <p:nvSpPr>
           <p:cNvPr id="32" name="TextBox 31"/>
           <p:cNvSpPr txBox="1"/>
           <p:nvPr/>
@@ -13081,7 +13335,7 @@
         <p:spPr>
           <a:xfrm>
             <a:off x="5846993" y="845995"/>
-            <a:ext cx="2856453" cy="4236892"/>
+            <a:ext cx="2856453" cy="4084542"/>
           </a:xfrm>
           <a:prstGeom prst="rect">
             <a:avLst/>
@@ -13263,7 +13517,7 @@
                   <a:schemeClr val="bg1"/>
                 </a:solidFill>
               </a:rPr>
-              <a:t>5T Data Lake Storage = $274.8</a:t>
+              <a:t>1T Data Lake Storage = $40.96</a:t>
             </a:r>
           </a:p>
           <a:p>
@@ -13328,7 +13582,7 @@
                   <a:schemeClr val="bg1"/>
                 </a:solidFill>
               </a:rPr>
-              <a:t>50TB Block Blob Locally Redundant = $1208.73</a:t>
+              <a:t>1TB Block Blob Locally Redundant = $24.58</a:t>
             </a:r>
           </a:p>
           <a:p>
@@ -13345,7 +13599,7 @@
                   <a:schemeClr val="bg1"/>
                 </a:solidFill>
               </a:rPr>
-              <a:t>300 DWUs SQL Data Warehouse = $900.24</a:t>
+              <a:t>300 DWUs SQL Data Warehouse = $2700.05</a:t>
             </a:r>
           </a:p>
           <a:p>
@@ -13405,23 +13659,7 @@
                   <a:schemeClr val="bg1"/>
                 </a:solidFill>
               </a:rPr>
-              <a:t>Total : U</a:t>
-            </a:r>
-            <a:r>
-              <a:rPr lang="en-US" sz="1200" b="1">
-                <a:solidFill>
-                  <a:schemeClr val="bg1"/>
-                </a:solidFill>
-              </a:rPr>
-              <a:t>$ 48,815.64 </a:t>
-            </a:r>
-            <a:r>
-              <a:rPr lang="en-US" sz="1200" b="1" dirty="0">
-                <a:solidFill>
-                  <a:schemeClr val="bg1"/>
-                </a:solidFill>
-              </a:rPr>
-              <a:t>/ Year</a:t>
+              <a:t>Total : U$53,397.48 / Year</a:t>
             </a:r>
             <a:endParaRPr lang="en-US" sz="1200" b="1" dirty="0">
               <a:solidFill>
@@ -14423,7 +14661,7 @@
         </p:blipFill>
         <p:spPr>
           <a:xfrm>
-            <a:off x="9947217" y="2623614"/>
+            <a:off x="10112520" y="2509056"/>
             <a:ext cx="519392" cy="635305"/>
           </a:xfrm>
           <a:prstGeom prst="rect">
@@ -14447,7 +14685,7 @@
         </p:blipFill>
         <p:spPr>
           <a:xfrm>
-            <a:off x="9965649" y="1922151"/>
+            <a:off x="9152607" y="1771493"/>
             <a:ext cx="452394" cy="357240"/>
           </a:xfrm>
           <a:prstGeom prst="rect">
@@ -14471,7 +14709,7 @@
         </p:blipFill>
         <p:spPr>
           <a:xfrm>
-            <a:off x="9205917" y="1866032"/>
+            <a:off x="9618279" y="1738710"/>
             <a:ext cx="494241" cy="493178"/>
           </a:xfrm>
           <a:prstGeom prst="rect">
@@ -14487,8 +14725,8 @@
         </p:nvSpPr>
         <p:spPr>
           <a:xfrm>
-            <a:off x="9867825" y="2309413"/>
-            <a:ext cx="980055" cy="230832"/>
+            <a:off x="9019276" y="2224631"/>
+            <a:ext cx="1437656" cy="369332"/>
           </a:xfrm>
           <a:prstGeom prst="rect">
             <a:avLst/>
@@ -14502,21 +14740,20 @@
           <a:lstStyle/>
           <a:p>
             <a:r>
-              <a:rPr lang="en-US" sz="900" dirty="0">
-                <a:solidFill>
-                  <a:schemeClr val="accent1"/>
-                </a:solidFill>
-              </a:rPr>
-              <a:t>Data Lake </a:t>
-            </a:r>
-            <a:r>
-              <a:rPr lang="en-US" altLang="zh-CN" sz="900" dirty="0">
-                <a:solidFill>
-                  <a:schemeClr val="accent1"/>
-                </a:solidFill>
-              </a:rPr>
-              <a:t>Store</a:t>
-            </a:r>
+              <a:rPr lang="en-US" sz="900" dirty="0"/>
+              <a:t>Azure Data Lake </a:t>
+            </a:r>
+            <a:r>
+              <a:rPr lang="en-US" altLang="zh-CN" sz="900" dirty="0"/>
+              <a:t>Storage</a:t>
+            </a:r>
+          </a:p>
+          <a:p>
+            <a:r>
+              <a:rPr lang="en-US" altLang="zh-CN" sz="900" dirty="0"/>
+              <a:t>Azure Data Lake Analytics</a:t>
+            </a:r>
+            <a:endParaRPr lang="en-US" sz="900" dirty="0"/>
           </a:p>
         </p:txBody>
       </p:sp>
@@ -14559,7 +14796,7 @@
         </p:nvCxnSpPr>
         <p:spPr>
           <a:xfrm flipV="1">
-            <a:off x="9803050" y="3258919"/>
+            <a:off x="9968353" y="3144361"/>
             <a:ext cx="403863" cy="240862"/>
           </a:xfrm>
           <a:prstGeom prst="curvedConnector2">
@@ -14590,14 +14827,14 @@
           <p:cNvPr id="16" name="Curved Connector 15"/>
           <p:cNvCxnSpPr>
             <a:stCxn id="8" idx="0"/>
-            <a:endCxn id="9" idx="2"/>
+            <a:endCxn id="10" idx="2"/>
           </p:cNvCxnSpPr>
           <p:nvPr/>
         </p:nvCxnSpPr>
         <p:spPr>
           <a:xfrm rot="16200000" flipV="1">
-            <a:off x="10027269" y="2443969"/>
-            <a:ext cx="344223" cy="15067"/>
+            <a:off x="9980224" y="2117064"/>
+            <a:ext cx="277168" cy="506816"/>
           </a:xfrm>
           <a:prstGeom prst="curvedConnector3">
             <a:avLst>
@@ -14628,20 +14865,18 @@
         <p:nvCxnSpPr>
           <p:cNvPr id="20" name="Curved Connector 19"/>
           <p:cNvCxnSpPr>
-            <a:stCxn id="10" idx="3"/>
-            <a:endCxn id="9" idx="1"/>
+            <a:stCxn id="9" idx="2"/>
+            <a:endCxn id="8" idx="1"/>
           </p:cNvCxnSpPr>
           <p:nvPr/>
         </p:nvCxnSpPr>
         <p:spPr>
-          <a:xfrm flipV="1">
-            <a:off x="9700158" y="2100771"/>
-            <a:ext cx="265491" cy="11850"/>
-          </a:xfrm>
-          <a:prstGeom prst="curvedConnector3">
-            <a:avLst>
-              <a:gd name="adj1" fmla="val 50000"/>
-            </a:avLst>
+          <a:xfrm rot="16200000" flipH="1">
+            <a:off x="9396674" y="2110863"/>
+            <a:ext cx="697976" cy="733716"/>
+          </a:xfrm>
+          <a:prstGeom prst="curvedConnector2">
+            <a:avLst/>
           </a:prstGeom>
           <a:ln>
             <a:prstDash val="sysDash"/>
@@ -14734,20 +14969,12 @@
           <a:lstStyle/>
           <a:p>
             <a:r>
-              <a:rPr lang="en-US" sz="900" dirty="0">
-                <a:solidFill>
-                  <a:schemeClr val="accent1"/>
-                </a:solidFill>
-              </a:rPr>
+              <a:rPr lang="en-US" sz="900" dirty="0"/>
               <a:t>Data Lake </a:t>
             </a:r>
             <a:r>
-              <a:rPr lang="en-US" altLang="zh-CN" sz="900" dirty="0">
-                <a:solidFill>
-                  <a:schemeClr val="accent1"/>
-                </a:solidFill>
-              </a:rPr>
-              <a:t>Store</a:t>
+              <a:rPr lang="en-US" altLang="zh-CN" sz="900" dirty="0"/>
+              <a:t>Storage</a:t>
             </a:r>
           </a:p>
         </p:txBody>
@@ -14756,14 +14983,15 @@
         <p:nvCxnSpPr>
           <p:cNvPr id="30" name="Curved Connector 29"/>
           <p:cNvCxnSpPr>
-            <a:stCxn id="9" idx="3"/>
+            <a:stCxn id="8" idx="3"/>
+            <a:endCxn id="24" idx="1"/>
           </p:cNvCxnSpPr>
           <p:nvPr/>
         </p:nvCxnSpPr>
         <p:spPr>
           <a:xfrm flipV="1">
-            <a:off x="10418043" y="1889434"/>
-            <a:ext cx="412751" cy="211337"/>
+            <a:off x="10631912" y="2069310"/>
+            <a:ext cx="198882" cy="757399"/>
           </a:xfrm>
           <a:prstGeom prst="curvedConnector3">
             <a:avLst>
@@ -14806,7 +15034,7 @@
         </p:blipFill>
         <p:spPr>
           <a:xfrm>
-            <a:off x="10730084" y="3105460"/>
+            <a:off x="10631912" y="3282353"/>
             <a:ext cx="419058" cy="424956"/>
           </a:xfrm>
           <a:prstGeom prst="rect">
@@ -14822,7 +15050,7 @@
         </p:nvSpPr>
         <p:spPr>
           <a:xfrm>
-            <a:off x="10710823" y="3554863"/>
+            <a:off x="10534268" y="3696026"/>
             <a:ext cx="1176130" cy="230832"/>
           </a:xfrm>
           <a:prstGeom prst="rect">
@@ -14859,7 +15087,7 @@
         </p:blipFill>
         <p:spPr>
           <a:xfrm>
-            <a:off x="11298888" y="2640925"/>
+            <a:off x="11296890" y="2709001"/>
             <a:ext cx="324839" cy="294111"/>
           </a:xfrm>
           <a:prstGeom prst="rect">
@@ -14875,7 +15103,7 @@
         </p:nvSpPr>
         <p:spPr>
           <a:xfrm>
-            <a:off x="11058052" y="2905481"/>
+            <a:off x="11021476" y="2963009"/>
             <a:ext cx="1079074" cy="230832"/>
           </a:xfrm>
           <a:prstGeom prst="rect">
@@ -14890,11 +15118,7 @@
           <a:lstStyle/>
           <a:p>
             <a:r>
-              <a:rPr lang="en-US" sz="900" dirty="0">
-                <a:solidFill>
-                  <a:schemeClr val="accent1"/>
-                </a:solidFill>
-              </a:rPr>
+              <a:rPr lang="en-US" sz="900" dirty="0"/>
               <a:t>Power BI Desktop</a:t>
             </a:r>
           </a:p>
@@ -14904,15 +15128,14 @@
         <p:nvCxnSpPr>
           <p:cNvPr id="43" name="Curved Connector 42"/>
           <p:cNvCxnSpPr>
-            <a:stCxn id="24" idx="2"/>
             <a:endCxn id="40" idx="0"/>
           </p:cNvCxnSpPr>
           <p:nvPr/>
         </p:nvCxnSpPr>
         <p:spPr>
           <a:xfrm rot="5400000">
-            <a:off x="10673019" y="2666505"/>
-            <a:ext cx="705550" cy="172361"/>
+            <a:off x="10541781" y="2722463"/>
+            <a:ext cx="859551" cy="260229"/>
           </a:xfrm>
           <a:prstGeom prst="curvedConnector3">
             <a:avLst/>
@@ -14947,7 +15170,7 @@
         </p:nvCxnSpPr>
         <p:spPr>
           <a:xfrm rot="16200000" flipH="1">
-            <a:off x="11249529" y="2429145"/>
+            <a:off x="11247531" y="2497221"/>
             <a:ext cx="261139" cy="162420"/>
           </a:xfrm>
           <a:prstGeom prst="curvedConnector3">
@@ -14984,8 +15207,8 @@
         </p:nvCxnSpPr>
         <p:spPr>
           <a:xfrm rot="5400000">
-            <a:off x="11282554" y="3002902"/>
-            <a:ext cx="181625" cy="448447"/>
+            <a:off x="11155497" y="3089315"/>
+            <a:ext cx="300990" cy="510043"/>
           </a:xfrm>
           <a:prstGeom prst="curvedConnector2">
             <a:avLst/>
@@ -15058,141 +15281,6 @@
           </a:prstGeom>
         </p:spPr>
       </p:pic>
-      <p:sp>
-        <p:nvSpPr>
-          <p:cNvPr id="45" name="Title 1"/>
-          <p:cNvSpPr>
-            <a:spLocks noGrp="1"/>
-          </p:cNvSpPr>
-          <p:nvPr>
-            <p:ph type="title"/>
-          </p:nvPr>
-        </p:nvSpPr>
-        <p:spPr>
-          <a:xfrm>
-            <a:off x="0" y="4763"/>
-            <a:ext cx="12308114" cy="744537"/>
-          </a:xfrm>
-        </p:spPr>
-        <p:txBody>
-          <a:bodyPr anchor="t">
-            <a:noAutofit/>
-          </a:bodyPr>
-          <a:lstStyle/>
-          <a:p>
-            <a:pPr>
-              <a:lnSpc>
-                <a:spcPts val="3000"/>
-              </a:lnSpc>
-            </a:pPr>
-            <a:r>
-              <a:rPr lang="en-US" sz="2800" dirty="0">
-                <a:solidFill>
-                  <a:srgbClr val="0072C6"/>
-                </a:solidFill>
-              </a:rPr>
-              <a:t>Starter Kit: Intelligent App(Data Factory, Data Lake, Machine Learning)</a:t>
-            </a:r>
-            <a:br>
-              <a:rPr lang="EN-US" sz="2800" dirty="0">
-                <a:solidFill>
-                  <a:srgbClr val="0072C6"/>
-                </a:solidFill>
-              </a:rPr>
-            </a:br>
-            <a:r>
-              <a:rPr lang="en-US" sz="1800" dirty="0">
-                <a:solidFill>
-                  <a:schemeClr val="accent3"/>
-                </a:solidFill>
-              </a:rPr>
-              <a:t>Call Center Sentiment Analysis with Cortana Intelligence Suite</a:t>
-            </a:r>
-            <a:endParaRPr lang="EN-US" sz="2800" dirty="0">
-              <a:solidFill>
-                <a:srgbClr val="0072C6"/>
-              </a:solidFill>
-            </a:endParaRPr>
-          </a:p>
-        </p:txBody>
-      </p:sp>
-      <p:sp>
-        <p:nvSpPr>
-          <p:cNvPr id="61" name="TextBox 60"/>
-          <p:cNvSpPr txBox="1"/>
-          <p:nvPr/>
-        </p:nvSpPr>
-        <p:spPr>
-          <a:xfrm>
-            <a:off x="8912993" y="2318539"/>
-            <a:ext cx="1437656" cy="230832"/>
-          </a:xfrm>
-          <a:prstGeom prst="rect">
-            <a:avLst/>
-          </a:prstGeom>
-          <a:noFill/>
-        </p:spPr>
-        <p:txBody>
-          <a:bodyPr wrap="square" rtlCol="0">
-            <a:spAutoFit/>
-          </a:bodyPr>
-          <a:lstStyle/>
-          <a:p>
-            <a:r>
-              <a:rPr lang="en-US" altLang="zh-CN" sz="900" dirty="0">
-                <a:solidFill>
-                  <a:schemeClr val="accent1"/>
-                </a:solidFill>
-              </a:rPr>
-              <a:t>Data Lake Analytics</a:t>
-            </a:r>
-            <a:endParaRPr lang="en-US" sz="900" dirty="0">
-              <a:solidFill>
-                <a:schemeClr val="accent1"/>
-              </a:solidFill>
-            </a:endParaRPr>
-          </a:p>
-        </p:txBody>
-      </p:sp>
-      <p:cxnSp>
-        <p:nvCxnSpPr>
-          <p:cNvPr id="69" name="Curved Connector 68"/>
-          <p:cNvCxnSpPr>
-            <a:stCxn id="9" idx="0"/>
-            <a:endCxn id="10" idx="0"/>
-          </p:cNvCxnSpPr>
-          <p:nvPr/>
-        </p:nvCxnSpPr>
-        <p:spPr>
-          <a:xfrm rot="16200000" flipV="1">
-            <a:off x="9794383" y="1524688"/>
-            <a:ext cx="56119" cy="738808"/>
-          </a:xfrm>
-          <a:prstGeom prst="curvedConnector3">
-            <a:avLst>
-              <a:gd name="adj1" fmla="val 253219"/>
-            </a:avLst>
-          </a:prstGeom>
-          <a:ln>
-            <a:prstDash val="sysDash"/>
-            <a:tailEnd type="triangle"/>
-          </a:ln>
-        </p:spPr>
-        <p:style>
-          <a:lnRef idx="1">
-            <a:schemeClr val="accent1"/>
-          </a:lnRef>
-          <a:fillRef idx="0">
-            <a:schemeClr val="accent1"/>
-          </a:fillRef>
-          <a:effectRef idx="0">
-            <a:schemeClr val="accent1"/>
-          </a:effectRef>
-          <a:fontRef idx="minor">
-            <a:schemeClr val="tx1"/>
-          </a:fontRef>
-        </p:style>
-      </p:cxnSp>
     </p:spTree>
     <p:extLst>
       <p:ext uri="{BB962C8B-B14F-4D97-AF65-F5344CB8AC3E}">
@@ -16132,12 +16220,9 @@
 </file>
 
 <file path=customXml/item1.xml><?xml version="1.0" encoding="utf-8"?>
-<?mso-contentType ?>
-<FormTemplates xmlns="http://schemas.microsoft.com/sharepoint/v3/contenttype/forms">
-  <Display>DocumentLibraryForm</Display>
-  <Edit>DocumentLibraryForm</Edit>
-  <New>DocumentLibraryForm</New>
-</FormTemplates>
+<p:properties xmlns:p="http://schemas.microsoft.com/office/2006/metadata/properties" xmlns:xsi="http://www.w3.org/2001/XMLSchema-instance" xmlns:pc="http://schemas.microsoft.com/office/infopath/2007/PartnerControls">
+  <documentManagement/>
+</p:properties>
 </file>
 
 <file path=customXml/item2.xml><?xml version="1.0" encoding="utf-8"?>
@@ -16255,15 +16340,25 @@
 </file>
 
 <file path=customXml/item3.xml><?xml version="1.0" encoding="utf-8"?>
-<p:properties xmlns:p="http://schemas.microsoft.com/office/2006/metadata/properties" xmlns:xsi="http://www.w3.org/2001/XMLSchema-instance" xmlns:pc="http://schemas.microsoft.com/office/infopath/2007/PartnerControls">
-  <documentManagement/>
-</p:properties>
+<?mso-contentType ?>
+<FormTemplates xmlns="http://schemas.microsoft.com/sharepoint/v3/contenttype/forms">
+  <Display>DocumentLibraryForm</Display>
+  <Edit>DocumentLibraryForm</Edit>
+  <New>DocumentLibraryForm</New>
+</FormTemplates>
 </file>
 
 <file path=customXml/itemProps1.xml><?xml version="1.0" encoding="utf-8"?>
-<ds:datastoreItem xmlns:ds="http://schemas.openxmlformats.org/officeDocument/2006/customXml" ds:itemID="{1547E796-3336-4CA3-A039-C51122E80770}">
+<ds:datastoreItem xmlns:ds="http://schemas.openxmlformats.org/officeDocument/2006/customXml" ds:itemID="{2A7D4CEE-4A6E-444C-9F48-154C694282ED}">
   <ds:schemaRefs>
-    <ds:schemaRef ds:uri="http://schemas.microsoft.com/sharepoint/v3/contenttype/forms"/>
+    <ds:schemaRef ds:uri="http://purl.org/dc/elements/1.1/"/>
+    <ds:schemaRef ds:uri="http://schemas.microsoft.com/office/2006/metadata/properties"/>
+    <ds:schemaRef ds:uri="http://purl.org/dc/terms/"/>
+    <ds:schemaRef ds:uri="http://schemas.openxmlformats.org/package/2006/metadata/core-properties"/>
+    <ds:schemaRef ds:uri="http://schemas.microsoft.com/office/2006/documentManagement/types"/>
+    <ds:schemaRef ds:uri="http://purl.org/dc/dcmitype/"/>
+    <ds:schemaRef ds:uri="http://schemas.microsoft.com/office/infopath/2007/PartnerControls"/>
+    <ds:schemaRef ds:uri="http://www.w3.org/XML/1998/namespace"/>
   </ds:schemaRefs>
 </ds:datastoreItem>
 </file>
@@ -16285,16 +16380,9 @@
 </file>
 
 <file path=customXml/itemProps3.xml><?xml version="1.0" encoding="utf-8"?>
-<ds:datastoreItem xmlns:ds="http://schemas.openxmlformats.org/officeDocument/2006/customXml" ds:itemID="{2A7D4CEE-4A6E-444C-9F48-154C694282ED}">
+<ds:datastoreItem xmlns:ds="http://schemas.openxmlformats.org/officeDocument/2006/customXml" ds:itemID="{1547E796-3336-4CA3-A039-C51122E80770}">
   <ds:schemaRefs>
-    <ds:schemaRef ds:uri="http://purl.org/dc/dcmitype/"/>
-    <ds:schemaRef ds:uri="http://schemas.microsoft.com/office/infopath/2007/PartnerControls"/>
-    <ds:schemaRef ds:uri="http://purl.org/dc/elements/1.1/"/>
-    <ds:schemaRef ds:uri="http://schemas.microsoft.com/office/2006/metadata/properties"/>
-    <ds:schemaRef ds:uri="http://purl.org/dc/terms/"/>
-    <ds:schemaRef ds:uri="http://schemas.microsoft.com/office/2006/documentManagement/types"/>
-    <ds:schemaRef ds:uri="http://schemas.openxmlformats.org/package/2006/metadata/core-properties"/>
-    <ds:schemaRef ds:uri="http://www.w3.org/XML/1998/namespace"/>
+    <ds:schemaRef ds:uri="http://schemas.microsoft.com/sharepoint/v3/contenttype/forms"/>
   </ds:schemaRefs>
 </ds:datastoreItem>
 </file>
</xml_diff>

<commit_message>
Modification based on Eumar's comments
</commit_message>
<xml_diff>
--- a/Content/Starter Kit - Intelligent Apps & Analytics/0 - Starter Kit - Intelligent Apps & Analytics.pptx
+++ b/Content/Starter Kit - Intelligent Apps & Analytics/0 - Starter Kit - Intelligent Apps & Analytics.pptx
@@ -129,7 +129,7 @@
       </p:ext>
     </p:extLst>
   </p:cmAuthor>
-  <p:cmAuthor id="2" name="Eumar Assis" initials="EA" lastIdx="10" clrIdx="1">
+  <p:cmAuthor id="2" name="Eumar Assis" initials="EA" lastIdx="21" clrIdx="1">
     <p:extLst>
       <p:ext uri="{19B8F6BF-5375-455C-9EA6-DF929625EA0E}">
         <p15:presenceInfo xmlns:p15="http://schemas.microsoft.com/office/powerpoint/2012/main" userId="S-1-5-21-124525095-708259637-1543119021-1495550" providerId="AD"/>
@@ -141,10 +141,10 @@
 
 <file path=ppt/comments/comment1.xml><?xml version="1.0" encoding="utf-8"?>
 <p:cmLst xmlns:a="http://schemas.openxmlformats.org/drawingml/2006/main" xmlns:r="http://schemas.openxmlformats.org/officeDocument/2006/relationships" xmlns:p="http://schemas.openxmlformats.org/presentationml/2006/main">
-  <p:cm authorId="2" dt="2016-08-23T11:55:25.527" idx="1">
-    <p:pos x="1789" y="1360"/>
+  <p:cm authorId="2" dt="2016-08-23T11:55:25.527" idx="14">
+    <p:pos x="2541" y="1378"/>
     <p:text>Mention Power BI and AZURE (e.g. Azure SQL Data warehouse)</p:text>
-    <p:extLst>
+    <p:extLst mod="1">
       <p:ext uri="{C676402C-5697-4E1C-873F-D02D1690AC5C}">
         <p15:threadingInfo xmlns:p15="http://schemas.microsoft.com/office/powerpoint/2012/main" timeZoneBias="240"/>
       </p:ext>
@@ -159,7 +159,7 @@
       </p:ext>
     </p:extLst>
   </p:cm>
-  <p:cm authorId="2" dt="2016-08-23T11:57:25.117" idx="3">
+  <p:cm authorId="2" dt="2016-08-23T11:57:25.117" idx="13">
     <p:pos x="5271" y="1587"/>
     <p:text>Is this correct? Is 1Tb enough?</p:text>
     <p:extLst>
@@ -182,7 +182,7 @@
 
 <file path=ppt/comments/comment2.xml><?xml version="1.0" encoding="utf-8"?>
 <p:cmLst xmlns:a="http://schemas.openxmlformats.org/drawingml/2006/main" xmlns:r="http://schemas.openxmlformats.org/officeDocument/2006/relationships" xmlns:p="http://schemas.openxmlformats.org/presentationml/2006/main">
-  <p:cm authorId="2" dt="2016-08-23T11:58:59.542" idx="4">
+  <p:cm authorId="2" dt="2016-08-23T11:58:59.542" idx="17">
     <p:pos x="5362" y="392"/>
     <p:text>Why do we need HDInsight in this scenario?</p:text>
     <p:extLst>
@@ -191,14 +191,14 @@
       </p:ext>
     </p:extLst>
   </p:cm>
-  <p:cm authorId="2" dt="2016-08-23T12:00:16.339" idx="5">
+  <p:cm authorId="2" dt="2016-08-23T12:00:16.339" idx="18">
     <p:pos x="5362" y="488"/>
     <p:text>My suggestions: Option 1: Power BI with Enterprise Connector
 Option 2: Azure Data Factory with Connector + Azure SQl Datawarehouse + Power BI Direct Query</p:text>
     <p:extLst>
       <p:ext uri="{C676402C-5697-4E1C-873F-D02D1690AC5C}">
         <p15:threadingInfo xmlns:p15="http://schemas.microsoft.com/office/powerpoint/2012/main" timeZoneBias="240">
-          <p15:parentCm authorId="2" idx="4"/>
+          <p15:parentCm authorId="2" idx="17"/>
         </p15:threadingInfo>
       </p:ext>
     </p:extLst>
@@ -334,7 +334,7 @@
           <a:p>
             <a:fld id="{386A5666-4B6A-423A-AB1B-8D7E7E0D4931}" type="datetimeFigureOut">
               <a:rPr lang="en-US" smtClean="0"/>
-              <a:t>23-Aug-16</a:t>
+              <a:t>8/26/2016</a:t>
             </a:fld>
             <a:endParaRPr lang="en-US"/>
           </a:p>
@@ -1894,7 +1894,7 @@
           <a:p>
             <a:fld id="{DD6EF947-8D9F-492B-9CF5-9DCF2EF799ED}" type="datetimeFigureOut">
               <a:rPr lang="en-US" smtClean="0"/>
-              <a:t>23-Aug-16</a:t>
+              <a:t>8/26/2016</a:t>
             </a:fld>
             <a:endParaRPr lang="en-US"/>
           </a:p>
@@ -2062,7 +2062,7 @@
           <a:p>
             <a:fld id="{DD6EF947-8D9F-492B-9CF5-9DCF2EF799ED}" type="datetimeFigureOut">
               <a:rPr lang="en-US" smtClean="0"/>
-              <a:t>23-Aug-16</a:t>
+              <a:t>8/26/2016</a:t>
             </a:fld>
             <a:endParaRPr lang="en-US"/>
           </a:p>
@@ -2240,7 +2240,7 @@
           <a:p>
             <a:fld id="{DD6EF947-8D9F-492B-9CF5-9DCF2EF799ED}" type="datetimeFigureOut">
               <a:rPr lang="en-US" smtClean="0"/>
-              <a:t>23-Aug-16</a:t>
+              <a:t>8/26/2016</a:t>
             </a:fld>
             <a:endParaRPr lang="en-US"/>
           </a:p>
@@ -2592,7 +2592,7 @@
           <a:p>
             <a:fld id="{DD6EF947-8D9F-492B-9CF5-9DCF2EF799ED}" type="datetimeFigureOut">
               <a:rPr lang="en-US" smtClean="0"/>
-              <a:t>23-Aug-16</a:t>
+              <a:t>8/26/2016</a:t>
             </a:fld>
             <a:endParaRPr lang="en-US"/>
           </a:p>
@@ -2837,7 +2837,7 @@
           <a:p>
             <a:fld id="{DD6EF947-8D9F-492B-9CF5-9DCF2EF799ED}" type="datetimeFigureOut">
               <a:rPr lang="en-US" smtClean="0"/>
-              <a:t>23-Aug-16</a:t>
+              <a:t>8/26/2016</a:t>
             </a:fld>
             <a:endParaRPr lang="en-US"/>
           </a:p>
@@ -3066,7 +3066,7 @@
           <a:p>
             <a:fld id="{DD6EF947-8D9F-492B-9CF5-9DCF2EF799ED}" type="datetimeFigureOut">
               <a:rPr lang="en-US" smtClean="0"/>
-              <a:t>23-Aug-16</a:t>
+              <a:t>8/26/2016</a:t>
             </a:fld>
             <a:endParaRPr lang="en-US"/>
           </a:p>
@@ -3430,7 +3430,7 @@
           <a:p>
             <a:fld id="{DD6EF947-8D9F-492B-9CF5-9DCF2EF799ED}" type="datetimeFigureOut">
               <a:rPr lang="en-US" smtClean="0"/>
-              <a:t>23-Aug-16</a:t>
+              <a:t>8/26/2016</a:t>
             </a:fld>
             <a:endParaRPr lang="en-US"/>
           </a:p>
@@ -3547,7 +3547,7 @@
           <a:p>
             <a:fld id="{DD6EF947-8D9F-492B-9CF5-9DCF2EF799ED}" type="datetimeFigureOut">
               <a:rPr lang="en-US" smtClean="0"/>
-              <a:t>23-Aug-16</a:t>
+              <a:t>8/26/2016</a:t>
             </a:fld>
             <a:endParaRPr lang="en-US"/>
           </a:p>
@@ -3642,7 +3642,7 @@
           <a:p>
             <a:fld id="{DD6EF947-8D9F-492B-9CF5-9DCF2EF799ED}" type="datetimeFigureOut">
               <a:rPr lang="en-US" smtClean="0"/>
-              <a:t>23-Aug-16</a:t>
+              <a:t>8/26/2016</a:t>
             </a:fld>
             <a:endParaRPr lang="en-US"/>
           </a:p>
@@ -3917,7 +3917,7 @@
           <a:p>
             <a:fld id="{DD6EF947-8D9F-492B-9CF5-9DCF2EF799ED}" type="datetimeFigureOut">
               <a:rPr lang="en-US" smtClean="0"/>
-              <a:t>23-Aug-16</a:t>
+              <a:t>8/26/2016</a:t>
             </a:fld>
             <a:endParaRPr lang="en-US"/>
           </a:p>
@@ -4169,7 +4169,7 @@
           <a:p>
             <a:fld id="{DD6EF947-8D9F-492B-9CF5-9DCF2EF799ED}" type="datetimeFigureOut">
               <a:rPr lang="en-US" smtClean="0"/>
-              <a:t>23-Aug-16</a:t>
+              <a:t>8/26/2016</a:t>
             </a:fld>
             <a:endParaRPr lang="en-US"/>
           </a:p>
@@ -4380,7 +4380,7 @@
           <a:p>
             <a:fld id="{DD6EF947-8D9F-492B-9CF5-9DCF2EF799ED}" type="datetimeFigureOut">
               <a:rPr lang="en-US" smtClean="0"/>
-              <a:t>23-Aug-16</a:t>
+              <a:t>8/26/2016</a:t>
             </a:fld>
             <a:endParaRPr lang="en-US"/>
           </a:p>
@@ -5014,39 +5014,6 @@
       </p:sp>
       <p:sp>
         <p:nvSpPr>
-          <p:cNvPr id="2" name="Title 1"/>
-          <p:cNvSpPr>
-            <a:spLocks noGrp="1"/>
-          </p:cNvSpPr>
-          <p:nvPr>
-            <p:ph type="title"/>
-          </p:nvPr>
-        </p:nvSpPr>
-        <p:spPr>
-          <a:xfrm>
-            <a:off x="0" y="16794"/>
-            <a:ext cx="12087225" cy="744033"/>
-          </a:xfrm>
-        </p:spPr>
-        <p:txBody>
-          <a:bodyPr>
-            <a:noAutofit/>
-          </a:bodyPr>
-          <a:lstStyle/>
-          <a:p>
-            <a:r>
-              <a:rPr lang="EN-US" sz="2800" dirty="0">
-                <a:solidFill>
-                  <a:srgbClr val="0072C6"/>
-                </a:solidFill>
-              </a:rPr>
-              <a:t>Starter Kit: Advanced Analytics(SQL Azure DW with Power BI)</a:t>
-            </a:r>
-          </a:p>
-        </p:txBody>
-      </p:sp>
-      <p:sp>
-        <p:nvSpPr>
           <p:cNvPr id="32" name="TextBox 31"/>
           <p:cNvSpPr txBox="1"/>
           <p:nvPr/>
@@ -5472,7 +5439,7 @@
         <p:spPr>
           <a:xfrm>
             <a:off x="5825481" y="942678"/>
-            <a:ext cx="2789996" cy="3461295"/>
+            <a:ext cx="2789996" cy="3156596"/>
           </a:xfrm>
           <a:prstGeom prst="rect">
             <a:avLst/>
@@ -5535,50 +5502,14 @@
                   <a:schemeClr val="bg1"/>
                 </a:solidFill>
               </a:rPr>
-              <a:t>Scenario: Power BI with SQL Azure DW</a:t>
-            </a:r>
-          </a:p>
-          <a:p>
-            <a:pPr marL="285750" indent="-285750">
+              <a:t>Scenario: Power BI with SQL Azure Data Warehouse</a:t>
+            </a:r>
+          </a:p>
+          <a:p>
+            <a:pPr>
               <a:lnSpc>
                 <a:spcPct val="90000"/>
               </a:lnSpc>
-              <a:buFont typeface="Arial" panose="020B0604020202020204" pitchFamily="34" charset="0"/>
-              <a:buChar char="•"/>
-            </a:pPr>
-            <a:r>
-              <a:rPr lang="en-US" sz="1100" i="1" dirty="0">
-                <a:solidFill>
-                  <a:schemeClr val="bg1"/>
-                </a:solidFill>
-              </a:rPr>
-              <a:t>Analytics:</a:t>
-            </a:r>
-          </a:p>
-          <a:p>
-            <a:pPr marL="742950" lvl="1" indent="-285750">
-              <a:lnSpc>
-                <a:spcPct val="90000"/>
-              </a:lnSpc>
-              <a:buFont typeface="Arial" panose="020B0604020202020204" pitchFamily="34" charset="0"/>
-              <a:buChar char="•"/>
-            </a:pPr>
-            <a:r>
-              <a:rPr lang="en-US" sz="1100" i="1" dirty="0">
-                <a:solidFill>
-                  <a:schemeClr val="bg1"/>
-                </a:solidFill>
-              </a:rPr>
-              <a:t>HDInsight A4 Windows= $476.16</a:t>
-            </a:r>
-          </a:p>
-          <a:p>
-            <a:pPr marL="285750" indent="-285750">
-              <a:lnSpc>
-                <a:spcPct val="90000"/>
-              </a:lnSpc>
-              <a:buFont typeface="Arial" panose="020B0604020202020204" pitchFamily="34" charset="0"/>
-              <a:buChar char="•"/>
             </a:pPr>
             <a:endParaRPr lang="en-US" sz="1100" i="1" dirty="0">
               <a:solidFill>
@@ -5634,7 +5565,7 @@
                   <a:schemeClr val="bg1"/>
                 </a:solidFill>
               </a:rPr>
-              <a:t>1TB Block Blob Locally Redundant = $24.58</a:t>
+              <a:t>50TB Block Blob Locally Redundant = $1208.73</a:t>
             </a:r>
           </a:p>
           <a:p>
@@ -5651,7 +5582,7 @@
                   <a:schemeClr val="bg1"/>
                 </a:solidFill>
               </a:rPr>
-              <a:t>300 DWUs SQL Data Warehouse = $2700.05</a:t>
+              <a:t>300 DWUs SQL Data Warehouse = $900.24</a:t>
             </a:r>
           </a:p>
           <a:p>
@@ -5711,7 +5642,7 @@
                   <a:schemeClr val="bg1"/>
                 </a:solidFill>
               </a:rPr>
-              <a:t>Total : U$43,073.28 / Year</a:t>
+              <a:t>Total : U$ 29,971.44/ Year</a:t>
             </a:r>
             <a:endParaRPr lang="en-US" sz="1200" b="1" dirty="0">
               <a:solidFill>
@@ -6608,7 +6539,11 @@
           <a:lstStyle/>
           <a:p>
             <a:r>
-              <a:rPr lang="en-US" sz="900" dirty="0"/>
+              <a:rPr lang="en-US" sz="900" dirty="0">
+                <a:solidFill>
+                  <a:schemeClr val="accent1"/>
+                </a:solidFill>
+              </a:rPr>
               <a:t>Power BI Desktop</a:t>
             </a:r>
           </a:p>
@@ -6630,7 +6565,7 @@
         </p:blipFill>
         <p:spPr>
           <a:xfrm>
-            <a:off x="9090628" y="3093117"/>
+            <a:off x="9534889" y="3289149"/>
             <a:ext cx="607502" cy="606195"/>
           </a:xfrm>
           <a:prstGeom prst="rect">
@@ -6702,7 +6637,7 @@
         </p:blipFill>
         <p:spPr>
           <a:xfrm>
-            <a:off x="9797378" y="3408137"/>
+            <a:off x="10664923" y="3272121"/>
             <a:ext cx="640828" cy="461100"/>
           </a:xfrm>
           <a:prstGeom prst="rect">
@@ -6710,134 +6645,6 @@
           </a:prstGeom>
         </p:spPr>
       </p:pic>
-      <p:pic>
-        <p:nvPicPr>
-          <p:cNvPr id="21" name="Picture 20"/>
-          <p:cNvPicPr>
-            <a:picLocks noChangeAspect="1"/>
-          </p:cNvPicPr>
-          <p:nvPr/>
-        </p:nvPicPr>
-        <p:blipFill>
-          <a:blip r:embed="rId13"/>
-          <a:stretch>
-            <a:fillRect/>
-          </a:stretch>
-        </p:blipFill>
-        <p:spPr>
-          <a:xfrm>
-            <a:off x="10560599" y="3386308"/>
-            <a:ext cx="745453" cy="474150"/>
-          </a:xfrm>
-          <a:prstGeom prst="rect">
-            <a:avLst/>
-          </a:prstGeom>
-        </p:spPr>
-      </p:pic>
-      <p:pic>
-        <p:nvPicPr>
-          <p:cNvPr id="22" name="Picture 21"/>
-          <p:cNvPicPr>
-            <a:picLocks noChangeAspect="1"/>
-          </p:cNvPicPr>
-          <p:nvPr/>
-        </p:nvPicPr>
-        <p:blipFill>
-          <a:blip r:embed="rId14"/>
-          <a:stretch>
-            <a:fillRect/>
-          </a:stretch>
-        </p:blipFill>
-        <p:spPr>
-          <a:xfrm>
-            <a:off x="10819217" y="2820856"/>
-            <a:ext cx="566719" cy="421950"/>
-          </a:xfrm>
-          <a:prstGeom prst="rect">
-            <a:avLst/>
-          </a:prstGeom>
-        </p:spPr>
-      </p:pic>
-      <p:cxnSp>
-        <p:nvCxnSpPr>
-          <p:cNvPr id="24" name="Straight Arrow Connector 23"/>
-          <p:cNvCxnSpPr>
-            <a:stCxn id="22" idx="1"/>
-            <a:endCxn id="21" idx="0"/>
-          </p:cNvCxnSpPr>
-          <p:nvPr/>
-        </p:nvCxnSpPr>
-        <p:spPr>
-          <a:xfrm rot="10800000" flipH="1" flipV="1">
-            <a:off x="10819216" y="3031830"/>
-            <a:ext cx="114109" cy="354477"/>
-          </a:xfrm>
-          <a:prstGeom prst="curvedConnector4">
-            <a:avLst>
-              <a:gd name="adj1" fmla="val -200335"/>
-              <a:gd name="adj2" fmla="val 79759"/>
-            </a:avLst>
-          </a:prstGeom>
-          <a:ln>
-            <a:solidFill>
-              <a:schemeClr val="accent1"/>
-            </a:solidFill>
-            <a:prstDash val="sysDash"/>
-            <a:tailEnd type="triangle"/>
-          </a:ln>
-        </p:spPr>
-        <p:style>
-          <a:lnRef idx="1">
-            <a:schemeClr val="accent1"/>
-          </a:lnRef>
-          <a:fillRef idx="0">
-            <a:schemeClr val="accent1"/>
-          </a:fillRef>
-          <a:effectRef idx="0">
-            <a:schemeClr val="accent1"/>
-          </a:effectRef>
-          <a:fontRef idx="minor">
-            <a:schemeClr val="tx1"/>
-          </a:fontRef>
-        </p:style>
-      </p:cxnSp>
-      <p:cxnSp>
-        <p:nvCxnSpPr>
-          <p:cNvPr id="30" name="Curved Connector 29"/>
-          <p:cNvCxnSpPr>
-            <a:stCxn id="21" idx="1"/>
-            <a:endCxn id="20" idx="3"/>
-          </p:cNvCxnSpPr>
-          <p:nvPr/>
-        </p:nvCxnSpPr>
-        <p:spPr>
-          <a:xfrm rot="10800000" flipV="1">
-            <a:off x="10438207" y="3623383"/>
-            <a:ext cx="122393" cy="15304"/>
-          </a:xfrm>
-          <a:prstGeom prst="curvedConnector3">
-            <a:avLst/>
-          </a:prstGeom>
-          <a:ln>
-            <a:prstDash val="sysDash"/>
-            <a:tailEnd type="triangle"/>
-          </a:ln>
-        </p:spPr>
-        <p:style>
-          <a:lnRef idx="1">
-            <a:schemeClr val="accent1"/>
-          </a:lnRef>
-          <a:fillRef idx="0">
-            <a:schemeClr val="accent1"/>
-          </a:fillRef>
-          <a:effectRef idx="0">
-            <a:schemeClr val="accent1"/>
-          </a:effectRef>
-          <a:fontRef idx="minor">
-            <a:schemeClr val="tx1"/>
-          </a:fontRef>
-        </p:style>
-      </p:cxnSp>
       <p:cxnSp>
         <p:nvCxnSpPr>
           <p:cNvPr id="34" name="Curved Connector 33"/>
@@ -6848,9 +6655,9 @@
           <p:nvPr/>
         </p:nvCxnSpPr>
         <p:spPr>
-          <a:xfrm rot="10800000">
-            <a:off x="9698130" y="3396215"/>
-            <a:ext cx="99248" cy="242472"/>
+          <a:xfrm rot="10800000" flipV="1">
+            <a:off x="10142391" y="3502671"/>
+            <a:ext cx="522532" cy="89576"/>
           </a:xfrm>
           <a:prstGeom prst="curvedConnector3">
             <a:avLst/>
@@ -6886,12 +6693,12 @@
         </p:nvCxnSpPr>
         <p:spPr>
           <a:xfrm rot="5400000" flipH="1" flipV="1">
-            <a:off x="9775166" y="2679046"/>
-            <a:ext cx="33284" cy="794858"/>
+            <a:off x="9899280" y="2999193"/>
+            <a:ext cx="229316" cy="350597"/>
           </a:xfrm>
           <a:prstGeom prst="curvedConnector3">
             <a:avLst>
-              <a:gd name="adj1" fmla="val -149396"/>
+              <a:gd name="adj1" fmla="val 50000"/>
             </a:avLst>
           </a:prstGeom>
           <a:ln>
@@ -6923,7 +6730,7 @@
           <p:nvPr/>
         </p:nvPicPr>
         <p:blipFill>
-          <a:blip r:embed="rId15"/>
+          <a:blip r:embed="rId13"/>
           <a:stretch>
             <a:fillRect/>
           </a:stretch>
@@ -6947,7 +6754,7 @@
           <p:nvPr/>
         </p:nvPicPr>
         <p:blipFill>
-          <a:blip r:embed="rId16"/>
+          <a:blip r:embed="rId14"/>
           <a:stretch>
             <a:fillRect/>
           </a:stretch>
@@ -6971,7 +6778,7 @@
           <p:nvPr/>
         </p:nvPicPr>
         <p:blipFill>
-          <a:blip r:embed="rId17"/>
+          <a:blip r:embed="rId15"/>
           <a:stretch>
             <a:fillRect/>
           </a:stretch>
@@ -7009,7 +6816,11 @@
           <a:lstStyle/>
           <a:p>
             <a:r>
-              <a:rPr lang="en-US" sz="900" dirty="0"/>
+              <a:rPr lang="en-US" sz="900" dirty="0">
+                <a:solidFill>
+                  <a:schemeClr val="accent1"/>
+                </a:solidFill>
+              </a:rPr>
               <a:t>Power BI Mobile App</a:t>
             </a:r>
           </a:p>
@@ -7118,6 +6929,64 @@
           </a:fontRef>
         </p:style>
       </p:cxnSp>
+      <p:sp>
+        <p:nvSpPr>
+          <p:cNvPr id="41" name="Title 1"/>
+          <p:cNvSpPr>
+            <a:spLocks noGrp="1"/>
+          </p:cNvSpPr>
+          <p:nvPr>
+            <p:ph type="title"/>
+          </p:nvPr>
+        </p:nvSpPr>
+        <p:spPr>
+          <a:xfrm>
+            <a:off x="-2440" y="-12644"/>
+            <a:ext cx="12194439" cy="744138"/>
+          </a:xfrm>
+        </p:spPr>
+        <p:txBody>
+          <a:bodyPr anchor="t">
+            <a:noAutofit/>
+          </a:bodyPr>
+          <a:lstStyle/>
+          <a:p>
+            <a:pPr>
+              <a:lnSpc>
+                <a:spcPts val="3000"/>
+              </a:lnSpc>
+            </a:pPr>
+            <a:r>
+              <a:rPr lang="en-US" sz="2800" dirty="0">
+                <a:solidFill>
+                  <a:srgbClr val="0072C6"/>
+                </a:solidFill>
+              </a:rPr>
+              <a:t>Starter Kit: Advanced Analytics(SQL Azure Data Warehouse with Power BI)</a:t>
+            </a:r>
+            <a:br>
+              <a:rPr lang="EN-US" sz="2800" dirty="0">
+                <a:solidFill>
+                  <a:srgbClr val="0072C6"/>
+                </a:solidFill>
+              </a:rPr>
+            </a:br>
+            <a:r>
+              <a:rPr lang="en-US" sz="1800" dirty="0">
+                <a:solidFill>
+                  <a:schemeClr val="accent3"/>
+                </a:solidFill>
+              </a:rPr>
+              <a:t>Twitter Sentiment Analysis AZURE DW and Power BI</a:t>
+            </a:r>
+            <a:endParaRPr lang="EN-US" sz="2800" dirty="0">
+              <a:solidFill>
+                <a:srgbClr val="0072C6"/>
+              </a:solidFill>
+            </a:endParaRPr>
+          </a:p>
+        </p:txBody>
+      </p:sp>
     </p:spTree>
     <p:extLst>
       <p:ext uri="{BB962C8B-B14F-4D97-AF65-F5344CB8AC3E}">
@@ -7440,44 +7309,6 @@
       </p:sp>
       <p:sp>
         <p:nvSpPr>
-          <p:cNvPr id="2" name="Title 1"/>
-          <p:cNvSpPr>
-            <a:spLocks noGrp="1"/>
-          </p:cNvSpPr>
-          <p:nvPr>
-            <p:ph type="title"/>
-          </p:nvPr>
-        </p:nvSpPr>
-        <p:spPr>
-          <a:xfrm>
-            <a:off x="49821" y="49954"/>
-            <a:ext cx="11536084" cy="744033"/>
-          </a:xfrm>
-        </p:spPr>
-        <p:txBody>
-          <a:bodyPr>
-            <a:noAutofit/>
-          </a:bodyPr>
-          <a:lstStyle/>
-          <a:p>
-            <a:r>
-              <a:rPr lang="EN-US" sz="2800" dirty="0">
-                <a:solidFill>
-                  <a:srgbClr val="0072C6"/>
-                </a:solidFill>
-              </a:rPr>
-              <a:t>Starter Kit: Advanced Analytics (On-Premises Data Sources)</a:t>
-            </a:r>
-            <a:endParaRPr lang="EN-US" sz="2800" dirty="0">
-              <a:solidFill>
-                <a:schemeClr val="tx2"/>
-              </a:solidFill>
-            </a:endParaRPr>
-          </a:p>
-        </p:txBody>
-      </p:sp>
-      <p:sp>
-        <p:nvSpPr>
           <p:cNvPr id="32" name="TextBox 31"/>
           <p:cNvSpPr txBox="1"/>
           <p:nvPr/>
@@ -7807,7 +7638,7 @@
         <p:spPr>
           <a:xfrm>
             <a:off x="3107639" y="850884"/>
-            <a:ext cx="2579950" cy="5372587"/>
+            <a:ext cx="2579950" cy="5995835"/>
           </a:xfrm>
           <a:prstGeom prst="rect">
             <a:avLst/>
@@ -7868,7 +7699,7 @@
                   <a:schemeClr val="bg1"/>
                 </a:solidFill>
               </a:rPr>
-              <a:t>Microsoft provide Power BI service to quickly create self-service online reports. You pay for what you use and no more:</a:t>
+              <a:t>Microsoft provide Power BI service to quickly create self-service online reports. Also, Azure Data Factory is a  globally deployed data movement service in the cloud. Use it to ingest data from multiple on-premises and cloud sources easily. You pay for what you use and no more:</a:t>
             </a:r>
           </a:p>
           <a:p>
@@ -7957,57 +7788,12 @@
               </a:rPr>
               <a:t>refreshed </a:t>
             </a:r>
-          </a:p>
-          <a:p>
-            <a:pPr marL="285750" lvl="0" indent="-285750">
-              <a:lnSpc>
-                <a:spcPct val="90000"/>
-              </a:lnSpc>
-              <a:buFont typeface="Arial" panose="020B0604020202020204" pitchFamily="34" charset="0"/>
-              <a:buChar char="•"/>
-            </a:pPr>
-            <a:r>
-              <a:rPr lang="en-US" sz="1400" dirty="0">
-                <a:solidFill>
-                  <a:schemeClr val="bg1"/>
-                </a:solidFill>
-              </a:rPr>
-              <a:t> </a:t>
-            </a:r>
-          </a:p>
-          <a:p>
-            <a:pPr marL="285750" lvl="0" indent="-285750">
-              <a:lnSpc>
-                <a:spcPct val="90000"/>
-              </a:lnSpc>
-              <a:buFont typeface="Arial" panose="020B0604020202020204" pitchFamily="34" charset="0"/>
-              <a:buChar char="•"/>
-            </a:pPr>
             <a:endParaRPr lang="en-US" sz="1300" b="1" dirty="0">
               <a:solidFill>
                 <a:schemeClr val="bg1"/>
               </a:solidFill>
             </a:endParaRPr>
           </a:p>
-          <a:p>
-            <a:pPr>
-              <a:lnSpc>
-                <a:spcPct val="90000"/>
-              </a:lnSpc>
-            </a:pPr>
-            <a:br>
-              <a:rPr lang="en-US" sz="1300" b="1" dirty="0">
-                <a:solidFill>
-                  <a:schemeClr val="bg1"/>
-                </a:solidFill>
-              </a:rPr>
-            </a:br>
-            <a:endParaRPr lang="en-US" sz="1300" b="1" dirty="0">
-              <a:solidFill>
-                <a:schemeClr val="bg1"/>
-              </a:solidFill>
-            </a:endParaRPr>
-          </a:p>
         </p:txBody>
       </p:sp>
       <p:sp>
@@ -8019,7 +7805,7 @@
         <p:spPr>
           <a:xfrm>
             <a:off x="5817863" y="845996"/>
-            <a:ext cx="2818824" cy="3295095"/>
+            <a:ext cx="2818824" cy="2685698"/>
           </a:xfrm>
           <a:prstGeom prst="rect">
             <a:avLst/>
@@ -8084,49 +7870,6 @@
               </a:rPr>
               <a:t>Scenario: Power BI with On-premises Data Sources</a:t>
             </a:r>
-          </a:p>
-          <a:p>
-            <a:pPr marL="285750" indent="-285750">
-              <a:lnSpc>
-                <a:spcPct val="90000"/>
-              </a:lnSpc>
-              <a:buFont typeface="Arial" panose="020B0604020202020204" pitchFamily="34" charset="0"/>
-              <a:buChar char="•"/>
-            </a:pPr>
-            <a:r>
-              <a:rPr lang="en-US" sz="1100" i="1" dirty="0">
-                <a:solidFill>
-                  <a:schemeClr val="bg1"/>
-                </a:solidFill>
-              </a:rPr>
-              <a:t>Analytics:</a:t>
-            </a:r>
-          </a:p>
-          <a:p>
-            <a:pPr marL="742950" lvl="1" indent="-285750">
-              <a:lnSpc>
-                <a:spcPct val="90000"/>
-              </a:lnSpc>
-              <a:buFont typeface="Arial" panose="020B0604020202020204" pitchFamily="34" charset="0"/>
-              <a:buChar char="•"/>
-            </a:pPr>
-            <a:r>
-              <a:rPr lang="en-US" sz="1100" i="1" dirty="0">
-                <a:solidFill>
-                  <a:schemeClr val="bg1"/>
-                </a:solidFill>
-              </a:rPr>
-              <a:t>HDInsight A2 Windows= $238.08</a:t>
-            </a:r>
-          </a:p>
-          <a:p>
-            <a:pPr marL="285750" indent="-285750">
-              <a:lnSpc>
-                <a:spcPct val="90000"/>
-              </a:lnSpc>
-              <a:buFont typeface="Arial" panose="020B0604020202020204" pitchFamily="34" charset="0"/>
-              <a:buChar char="•"/>
-            </a:pPr>
             <a:endParaRPr lang="en-US" sz="1100" i="1" dirty="0">
               <a:solidFill>
                 <a:schemeClr val="bg1"/>
@@ -8181,7 +7924,7 @@
                   <a:schemeClr val="bg1"/>
                 </a:solidFill>
               </a:rPr>
-              <a:t>1TB Block Blob Locally Redundant = $24.58</a:t>
+              <a:t>50TB Block Blob Locally Redundant = $1208.73</a:t>
             </a:r>
           </a:p>
           <a:p>
@@ -8243,7 +7986,7 @@
                   <a:prstClr val="white"/>
                 </a:solidFill>
               </a:rPr>
-              <a:t>Total : U$7815.72/ Year</a:t>
+              <a:t>Total : U$ 19,168.56/ Year</a:t>
             </a:r>
             <a:endParaRPr lang="en-US" sz="1200" b="1" dirty="0">
               <a:solidFill>
@@ -9173,7 +8916,7 @@
         </p:nvSpPr>
         <p:spPr>
           <a:xfrm>
-            <a:off x="8692272" y="1293990"/>
+            <a:off x="8671227" y="1293990"/>
             <a:ext cx="3224749" cy="3122294"/>
           </a:xfrm>
           <a:prstGeom prst="cloud">
@@ -9283,7 +9026,11 @@
           <a:lstStyle/>
           <a:p>
             <a:r>
-              <a:rPr lang="en-US" sz="900" dirty="0"/>
+              <a:rPr lang="en-US" sz="900" dirty="0">
+                <a:solidFill>
+                  <a:schemeClr val="accent1"/>
+                </a:solidFill>
+              </a:rPr>
               <a:t>Power BI Desktop</a:t>
             </a:r>
           </a:p>
@@ -9353,7 +9100,7 @@
         </p:blipFill>
         <p:spPr>
           <a:xfrm>
-            <a:off x="9786047" y="3408137"/>
+            <a:off x="10639275" y="3296163"/>
             <a:ext cx="640828" cy="461100"/>
           </a:xfrm>
           <a:prstGeom prst="rect">
@@ -9361,146 +9108,19 @@
           </a:prstGeom>
         </p:spPr>
       </p:pic>
-      <p:pic>
-        <p:nvPicPr>
-          <p:cNvPr id="33" name="Picture 32"/>
-          <p:cNvPicPr>
-            <a:picLocks noChangeAspect="1"/>
-          </p:cNvPicPr>
-          <p:nvPr/>
-        </p:nvPicPr>
-        <p:blipFill>
-          <a:blip r:embed="rId12"/>
-          <a:stretch>
-            <a:fillRect/>
-          </a:stretch>
-        </p:blipFill>
-        <p:spPr>
-          <a:xfrm>
-            <a:off x="10549268" y="3386308"/>
-            <a:ext cx="745453" cy="474150"/>
-          </a:xfrm>
-          <a:prstGeom prst="rect">
-            <a:avLst/>
-          </a:prstGeom>
-        </p:spPr>
-      </p:pic>
-      <p:pic>
-        <p:nvPicPr>
-          <p:cNvPr id="34" name="Picture 33"/>
-          <p:cNvPicPr>
-            <a:picLocks noChangeAspect="1"/>
-          </p:cNvPicPr>
-          <p:nvPr/>
-        </p:nvPicPr>
-        <p:blipFill>
-          <a:blip r:embed="rId13"/>
-          <a:stretch>
-            <a:fillRect/>
-          </a:stretch>
-        </p:blipFill>
-        <p:spPr>
-          <a:xfrm>
-            <a:off x="10807886" y="2820856"/>
-            <a:ext cx="566719" cy="421950"/>
-          </a:xfrm>
-          <a:prstGeom prst="rect">
-            <a:avLst/>
-          </a:prstGeom>
-        </p:spPr>
-      </p:pic>
-      <p:cxnSp>
-        <p:nvCxnSpPr>
-          <p:cNvPr id="37" name="Straight Arrow Connector 23"/>
-          <p:cNvCxnSpPr>
-            <a:stCxn id="34" idx="1"/>
-            <a:endCxn id="33" idx="0"/>
-          </p:cNvCxnSpPr>
-          <p:nvPr/>
-        </p:nvCxnSpPr>
-        <p:spPr>
-          <a:xfrm rot="10800000" flipH="1" flipV="1">
-            <a:off x="10807885" y="3031830"/>
-            <a:ext cx="114109" cy="354477"/>
-          </a:xfrm>
-          <a:prstGeom prst="curvedConnector4">
-            <a:avLst>
-              <a:gd name="adj1" fmla="val -200335"/>
-              <a:gd name="adj2" fmla="val 79759"/>
-            </a:avLst>
-          </a:prstGeom>
-          <a:ln>
-            <a:solidFill>
-              <a:schemeClr val="accent1"/>
-            </a:solidFill>
-            <a:prstDash val="sysDash"/>
-            <a:tailEnd type="triangle"/>
-          </a:ln>
-        </p:spPr>
-        <p:style>
-          <a:lnRef idx="1">
-            <a:schemeClr val="accent1"/>
-          </a:lnRef>
-          <a:fillRef idx="0">
-            <a:schemeClr val="accent1"/>
-          </a:fillRef>
-          <a:effectRef idx="0">
-            <a:schemeClr val="accent1"/>
-          </a:effectRef>
-          <a:fontRef idx="minor">
-            <a:schemeClr val="tx1"/>
-          </a:fontRef>
-        </p:style>
-      </p:cxnSp>
-      <p:cxnSp>
-        <p:nvCxnSpPr>
-          <p:cNvPr id="38" name="Curved Connector 37"/>
-          <p:cNvCxnSpPr>
-            <a:stCxn id="33" idx="1"/>
-            <a:endCxn id="30" idx="3"/>
-          </p:cNvCxnSpPr>
-          <p:nvPr/>
-        </p:nvCxnSpPr>
-        <p:spPr>
-          <a:xfrm rot="10800000" flipV="1">
-            <a:off x="10426876" y="3623383"/>
-            <a:ext cx="122393" cy="15304"/>
-          </a:xfrm>
-          <a:prstGeom prst="curvedConnector3">
-            <a:avLst/>
-          </a:prstGeom>
-          <a:ln>
-            <a:prstDash val="sysDash"/>
-            <a:tailEnd type="triangle"/>
-          </a:ln>
-        </p:spPr>
-        <p:style>
-          <a:lnRef idx="1">
-            <a:schemeClr val="accent1"/>
-          </a:lnRef>
-          <a:fillRef idx="0">
-            <a:schemeClr val="accent1"/>
-          </a:fillRef>
-          <a:effectRef idx="0">
-            <a:schemeClr val="accent1"/>
-          </a:effectRef>
-          <a:fontRef idx="minor">
-            <a:schemeClr val="tx1"/>
-          </a:fontRef>
-        </p:style>
-      </p:cxnSp>
       <p:cxnSp>
         <p:nvCxnSpPr>
           <p:cNvPr id="40" name="Curved Connector 39"/>
           <p:cNvCxnSpPr>
             <a:stCxn id="30" idx="1"/>
+            <a:endCxn id="3" idx="3"/>
           </p:cNvCxnSpPr>
           <p:nvPr/>
         </p:nvCxnSpPr>
         <p:spPr>
           <a:xfrm rot="10800000">
-            <a:off x="9686799" y="3396215"/>
-            <a:ext cx="99248" cy="242472"/>
+            <a:off x="9925751" y="3516643"/>
+            <a:ext cx="713524" cy="10071"/>
           </a:xfrm>
           <a:prstGeom prst="curvedConnector3">
             <a:avLst/>
@@ -9536,8 +9156,8 @@
         </p:nvCxnSpPr>
         <p:spPr>
           <a:xfrm rot="5400000" flipH="1" flipV="1">
-            <a:off x="9763365" y="2775503"/>
-            <a:ext cx="130210" cy="698871"/>
+            <a:off x="9626467" y="2829311"/>
+            <a:ext cx="320917" cy="781962"/>
           </a:xfrm>
           <a:prstGeom prst="curvedConnector3">
             <a:avLst>
@@ -9573,6 +9193,54 @@
           <p:nvPr/>
         </p:nvPicPr>
         <p:blipFill>
+          <a:blip r:embed="rId12"/>
+          <a:stretch>
+            <a:fillRect/>
+          </a:stretch>
+        </p:blipFill>
+        <p:spPr>
+          <a:xfrm>
+            <a:off x="10334619" y="1789981"/>
+            <a:ext cx="537093" cy="483828"/>
+          </a:xfrm>
+          <a:prstGeom prst="rect">
+            <a:avLst/>
+          </a:prstGeom>
+        </p:spPr>
+      </p:pic>
+      <p:pic>
+        <p:nvPicPr>
+          <p:cNvPr id="43" name="Picture 42"/>
+          <p:cNvPicPr>
+            <a:picLocks noChangeAspect="1"/>
+          </p:cNvPicPr>
+          <p:nvPr/>
+        </p:nvPicPr>
+        <p:blipFill>
+          <a:blip r:embed="rId13"/>
+          <a:stretch>
+            <a:fillRect/>
+          </a:stretch>
+        </p:blipFill>
+        <p:spPr>
+          <a:xfrm>
+            <a:off x="10866119" y="1732067"/>
+            <a:ext cx="374906" cy="639450"/>
+          </a:xfrm>
+          <a:prstGeom prst="rect">
+            <a:avLst/>
+          </a:prstGeom>
+        </p:spPr>
+      </p:pic>
+      <p:pic>
+        <p:nvPicPr>
+          <p:cNvPr id="45" name="Picture 44"/>
+          <p:cNvPicPr>
+            <a:picLocks noChangeAspect="1"/>
+          </p:cNvPicPr>
+          <p:nvPr/>
+        </p:nvPicPr>
+        <p:blipFill>
           <a:blip r:embed="rId14"/>
           <a:stretch>
             <a:fillRect/>
@@ -9580,17 +9248,79 @@
         </p:blipFill>
         <p:spPr>
           <a:xfrm>
-            <a:off x="10334619" y="1789981"/>
-            <a:ext cx="537093" cy="483828"/>
+            <a:off x="11280103" y="1769761"/>
+            <a:ext cx="357469" cy="513300"/>
           </a:xfrm>
           <a:prstGeom prst="rect">
             <a:avLst/>
           </a:prstGeom>
         </p:spPr>
       </p:pic>
+      <p:sp>
+        <p:nvSpPr>
+          <p:cNvPr id="46" name="TextBox 45"/>
+          <p:cNvSpPr txBox="1"/>
+          <p:nvPr/>
+        </p:nvSpPr>
+        <p:spPr>
+          <a:xfrm>
+            <a:off x="10523930" y="2304124"/>
+            <a:ext cx="1168351" cy="230832"/>
+          </a:xfrm>
+          <a:prstGeom prst="rect">
+            <a:avLst/>
+          </a:prstGeom>
+          <a:noFill/>
+        </p:spPr>
+        <p:txBody>
+          <a:bodyPr wrap="square" rtlCol="0">
+            <a:spAutoFit/>
+          </a:bodyPr>
+          <a:lstStyle/>
+          <a:p>
+            <a:r>
+              <a:rPr lang="en-US" sz="900" dirty="0">
+                <a:solidFill>
+                  <a:schemeClr val="accent1"/>
+                </a:solidFill>
+              </a:rPr>
+              <a:t>Power BI Mobile App</a:t>
+            </a:r>
+          </a:p>
+        </p:txBody>
+      </p:sp>
+      <p:sp>
+        <p:nvSpPr>
+          <p:cNvPr id="47" name="TextBox 46"/>
+          <p:cNvSpPr txBox="1"/>
+          <p:nvPr/>
+        </p:nvSpPr>
+        <p:spPr>
+          <a:xfrm>
+            <a:off x="10365030" y="2650144"/>
+            <a:ext cx="1176130" cy="230832"/>
+          </a:xfrm>
+          <a:prstGeom prst="rect">
+            <a:avLst/>
+          </a:prstGeom>
+          <a:noFill/>
+        </p:spPr>
+        <p:txBody>
+          <a:bodyPr wrap="square" rtlCol="0">
+            <a:spAutoFit/>
+          </a:bodyPr>
+          <a:lstStyle/>
+          <a:p>
+            <a:r>
+              <a:rPr lang="en-US" sz="900" b="1" dirty="0"/>
+              <a:t>Power BI</a:t>
+            </a:r>
+          </a:p>
+        </p:txBody>
+      </p:sp>
       <p:pic>
         <p:nvPicPr>
-          <p:cNvPr id="43" name="Picture 42"/>
+          <p:cNvPr id="3" name="Picture 2"/>
           <p:cNvPicPr>
             <a:picLocks noChangeAspect="1"/>
           </p:cNvPicPr>
@@ -9604,113 +9334,7 @@
         </p:blipFill>
         <p:spPr>
           <a:xfrm>
-            <a:off x="10866119" y="1732067"/>
-            <a:ext cx="374906" cy="639450"/>
-          </a:xfrm>
-          <a:prstGeom prst="rect">
-            <a:avLst/>
-          </a:prstGeom>
-        </p:spPr>
-      </p:pic>
-      <p:pic>
-        <p:nvPicPr>
-          <p:cNvPr id="45" name="Picture 44"/>
-          <p:cNvPicPr>
-            <a:picLocks noChangeAspect="1"/>
-          </p:cNvPicPr>
-          <p:nvPr/>
-        </p:nvPicPr>
-        <p:blipFill>
-          <a:blip r:embed="rId16"/>
-          <a:stretch>
-            <a:fillRect/>
-          </a:stretch>
-        </p:blipFill>
-        <p:spPr>
-          <a:xfrm>
-            <a:off x="11280103" y="1769761"/>
-            <a:ext cx="357469" cy="513300"/>
-          </a:xfrm>
-          <a:prstGeom prst="rect">
-            <a:avLst/>
-          </a:prstGeom>
-        </p:spPr>
-      </p:pic>
-      <p:sp>
-        <p:nvSpPr>
-          <p:cNvPr id="46" name="TextBox 45"/>
-          <p:cNvSpPr txBox="1"/>
-          <p:nvPr/>
-        </p:nvSpPr>
-        <p:spPr>
-          <a:xfrm>
-            <a:off x="10523930" y="2304124"/>
-            <a:ext cx="1168351" cy="230832"/>
-          </a:xfrm>
-          <a:prstGeom prst="rect">
-            <a:avLst/>
-          </a:prstGeom>
-          <a:noFill/>
-        </p:spPr>
-        <p:txBody>
-          <a:bodyPr wrap="square" rtlCol="0">
-            <a:spAutoFit/>
-          </a:bodyPr>
-          <a:lstStyle/>
-          <a:p>
-            <a:r>
-              <a:rPr lang="en-US" sz="900" dirty="0"/>
-              <a:t>Power BI Mobile App</a:t>
-            </a:r>
-          </a:p>
-        </p:txBody>
-      </p:sp>
-      <p:sp>
-        <p:nvSpPr>
-          <p:cNvPr id="47" name="TextBox 46"/>
-          <p:cNvSpPr txBox="1"/>
-          <p:nvPr/>
-        </p:nvSpPr>
-        <p:spPr>
-          <a:xfrm>
-            <a:off x="10365030" y="2650144"/>
-            <a:ext cx="1176130" cy="230832"/>
-          </a:xfrm>
-          <a:prstGeom prst="rect">
-            <a:avLst/>
-          </a:prstGeom>
-          <a:noFill/>
-        </p:spPr>
-        <p:txBody>
-          <a:bodyPr wrap="square" rtlCol="0">
-            <a:spAutoFit/>
-          </a:bodyPr>
-          <a:lstStyle/>
-          <a:p>
-            <a:r>
-              <a:rPr lang="en-US" sz="900" b="1" dirty="0"/>
-              <a:t>Power BI</a:t>
-            </a:r>
-          </a:p>
-        </p:txBody>
-      </p:sp>
-      <p:pic>
-        <p:nvPicPr>
-          <p:cNvPr id="3" name="Picture 2"/>
-          <p:cNvPicPr>
-            <a:picLocks noChangeAspect="1"/>
-          </p:cNvPicPr>
-          <p:nvPr/>
-        </p:nvPicPr>
-        <p:blipFill>
-          <a:blip r:embed="rId17"/>
-          <a:stretch>
-            <a:fillRect/>
-          </a:stretch>
-        </p:blipFill>
-        <p:spPr>
-          <a:xfrm>
-            <a:off x="8949228" y="3190043"/>
+            <a:off x="8866137" y="3380750"/>
             <a:ext cx="1059614" cy="271784"/>
           </a:xfrm>
           <a:prstGeom prst="rect">
@@ -9799,7 +9423,7 @@
         </p:nvSpPr>
         <p:spPr>
           <a:xfrm>
-            <a:off x="9277632" y="3490623"/>
+            <a:off x="9950913" y="3526588"/>
             <a:ext cx="1079074" cy="200055"/>
           </a:xfrm>
           <a:prstGeom prst="rect">
@@ -9814,12 +9438,96 @@
           <a:lstStyle/>
           <a:p>
             <a:r>
-              <a:rPr lang="en-US" altLang="zh-CN" sz="700" dirty="0" err="1"/>
-              <a:t>Polybase</a:t>
-            </a:r>
-            <a:r>
               <a:rPr lang="en-US" altLang="zh-CN" sz="700" dirty="0"/>
-              <a:t> access</a:t>
+              <a:t>Polybase Access</a:t>
+            </a:r>
+            <a:endParaRPr lang="en-US" sz="700" dirty="0"/>
+          </a:p>
+        </p:txBody>
+      </p:sp>
+      <p:sp>
+        <p:nvSpPr>
+          <p:cNvPr id="51" name="Title 1"/>
+          <p:cNvSpPr>
+            <a:spLocks noGrp="1"/>
+          </p:cNvSpPr>
+          <p:nvPr>
+            <p:ph type="title"/>
+          </p:nvPr>
+        </p:nvSpPr>
+        <p:spPr>
+          <a:xfrm>
+            <a:off x="0" y="4763"/>
+            <a:ext cx="11655425" cy="744537"/>
+          </a:xfrm>
+        </p:spPr>
+        <p:txBody>
+          <a:bodyPr anchor="t">
+            <a:noAutofit/>
+          </a:bodyPr>
+          <a:lstStyle/>
+          <a:p>
+            <a:pPr>
+              <a:lnSpc>
+                <a:spcPts val="3000"/>
+              </a:lnSpc>
+            </a:pPr>
+            <a:r>
+              <a:rPr lang="en-US" sz="2800" dirty="0">
+                <a:solidFill>
+                  <a:srgbClr val="0072C6"/>
+                </a:solidFill>
+              </a:rPr>
+              <a:t>Starter Kit: Advanced Analytics (On-Premises Data Sources)</a:t>
+            </a:r>
+            <a:br>
+              <a:rPr lang="EN-US" sz="2800" dirty="0">
+                <a:solidFill>
+                  <a:srgbClr val="0072C6"/>
+                </a:solidFill>
+              </a:rPr>
+            </a:br>
+            <a:r>
+              <a:rPr lang="en-US" sz="1800" dirty="0">
+                <a:solidFill>
+                  <a:schemeClr val="accent3"/>
+                </a:solidFill>
+              </a:rPr>
+              <a:t>Cloud Big Data for  Customer Churn Analysis with On-Premises Data</a:t>
+            </a:r>
+            <a:endParaRPr lang="EN-US" sz="2800" dirty="0">
+              <a:solidFill>
+                <a:srgbClr val="0072C6"/>
+              </a:solidFill>
+            </a:endParaRPr>
+          </a:p>
+        </p:txBody>
+      </p:sp>
+      <p:sp>
+        <p:nvSpPr>
+          <p:cNvPr id="49" name="TextBox 48"/>
+          <p:cNvSpPr txBox="1"/>
+          <p:nvPr/>
+        </p:nvSpPr>
+        <p:spPr>
+          <a:xfrm>
+            <a:off x="9549582" y="3160176"/>
+            <a:ext cx="1079074" cy="200055"/>
+          </a:xfrm>
+          <a:prstGeom prst="rect">
+            <a:avLst/>
+          </a:prstGeom>
+          <a:noFill/>
+        </p:spPr>
+        <p:txBody>
+          <a:bodyPr wrap="square" rtlCol="0">
+            <a:spAutoFit/>
+          </a:bodyPr>
+          <a:lstStyle/>
+          <a:p>
+            <a:r>
+              <a:rPr lang="en-US" altLang="zh-CN" sz="700" dirty="0"/>
+              <a:t>On-Premises Gateway</a:t>
             </a:r>
             <a:endParaRPr lang="en-US" sz="700" dirty="0"/>
           </a:p>
@@ -10094,45 +9802,6 @@
       </p:sp>
       <p:sp>
         <p:nvSpPr>
-          <p:cNvPr id="2" name="Title 1"/>
-          <p:cNvSpPr>
-            <a:spLocks noGrp="1"/>
-          </p:cNvSpPr>
-          <p:nvPr>
-            <p:ph type="title"/>
-          </p:nvPr>
-        </p:nvSpPr>
-        <p:spPr>
-          <a:xfrm>
-            <a:off x="0" y="5987"/>
-            <a:ext cx="12087225" cy="744033"/>
-          </a:xfrm>
-        </p:spPr>
-        <p:txBody>
-          <a:bodyPr>
-            <a:noAutofit/>
-          </a:bodyPr>
-          <a:lstStyle/>
-          <a:p>
-            <a:r>
-              <a:rPr lang="EN-US" sz="2800" dirty="0">
-                <a:solidFill>
-                  <a:srgbClr val="0072C6"/>
-                </a:solidFill>
-              </a:rPr>
-              <a:t>Starter Kit: Intelligent App(Azure Event Hub, ASA and Machine Learning)</a:t>
-            </a:r>
-            <a:endParaRPr lang="EN-US" sz="2800" dirty="0">
-              <a:solidFill>
-                <a:srgbClr val="0072C6"/>
-              </a:solidFill>
-              <a:latin typeface="Segoe UI Semibold"/>
-            </a:endParaRPr>
-          </a:p>
-        </p:txBody>
-      </p:sp>
-      <p:sp>
-        <p:nvSpPr>
           <p:cNvPr id="32" name="TextBox 31"/>
           <p:cNvSpPr txBox="1"/>
           <p:nvPr/>
@@ -10650,7 +10319,7 @@
         <p:spPr>
           <a:xfrm>
             <a:off x="5782624" y="845769"/>
-            <a:ext cx="2893111" cy="4056842"/>
+            <a:ext cx="2893111" cy="3752144"/>
           </a:xfrm>
           <a:prstGeom prst="rect">
             <a:avLst/>
@@ -10747,23 +10416,6 @@
                   <a:schemeClr val="bg1"/>
                 </a:solidFill>
               </a:rPr>
-              <a:t>HDInsight A3 Windows = $476.16</a:t>
-            </a:r>
-          </a:p>
-          <a:p>
-            <a:pPr marL="742950" lvl="1" indent="-285750">
-              <a:lnSpc>
-                <a:spcPct val="90000"/>
-              </a:lnSpc>
-              <a:buFont typeface="Arial" panose="020B0604020202020204" pitchFamily="34" charset="0"/>
-              <a:buChar char="•"/>
-            </a:pPr>
-            <a:r>
-              <a:rPr lang="en-US" sz="1100" i="1" dirty="0">
-                <a:solidFill>
-                  <a:schemeClr val="bg1"/>
-                </a:solidFill>
-              </a:rPr>
               <a:t>Data Factory = $105</a:t>
             </a:r>
           </a:p>
@@ -10880,7 +10532,7 @@
                   <a:schemeClr val="bg1"/>
                 </a:solidFill>
               </a:rPr>
-              <a:t>1TB Block and Page Blob Locally Redundant = $75.78</a:t>
+              <a:t>50TB Block Blob Locally Redundant = $1208.73</a:t>
             </a:r>
           </a:p>
           <a:p>
@@ -10897,7 +10549,7 @@
                   <a:schemeClr val="bg1"/>
                 </a:solidFill>
               </a:rPr>
-              <a:t>S1 SQL Database = $31.02</a:t>
+              <a:t>S3 SQL Database = $149.99</a:t>
             </a:r>
           </a:p>
           <a:p>
@@ -10957,7 +10609,7 @@
                   <a:schemeClr val="bg1"/>
                 </a:solidFill>
               </a:rPr>
-              <a:t>Total : U$17,799.50 / Year</a:t>
+              <a:t>Total : U$  27,108.48/ Year</a:t>
             </a:r>
             <a:endParaRPr lang="en-US" sz="1200" b="1" dirty="0">
               <a:solidFill>
@@ -11900,7 +11552,7 @@
         <p:spPr>
           <a:xfrm>
             <a:off x="9098921" y="1774263"/>
-            <a:ext cx="1079074" cy="230832"/>
+            <a:ext cx="1079074" cy="246221"/>
           </a:xfrm>
           <a:prstGeom prst="rect">
             <a:avLst/>
@@ -11914,12 +11566,12 @@
           <a:lstStyle/>
           <a:p>
             <a:r>
-              <a:rPr lang="en-US" sz="900" dirty="0" err="1"/>
-              <a:t>IoT</a:t>
-            </a:r>
-            <a:r>
-              <a:rPr lang="en-US" sz="900" dirty="0"/>
-              <a:t> Sensors</a:t>
+              <a:rPr lang="en-US" sz="1000" dirty="0">
+                <a:solidFill>
+                  <a:schemeClr val="accent1"/>
+                </a:solidFill>
+              </a:rPr>
+              <a:t>IoT Sensors</a:t>
             </a:r>
           </a:p>
         </p:txBody>
@@ -12019,7 +11671,11 @@
           <a:lstStyle/>
           <a:p>
             <a:r>
-              <a:rPr lang="en-US" sz="900" dirty="0"/>
+              <a:rPr lang="en-US" sz="900" dirty="0">
+                <a:solidFill>
+                  <a:schemeClr val="accent1"/>
+                </a:solidFill>
+              </a:rPr>
               <a:t>Power BI Mobile App</a:t>
             </a:r>
           </a:p>
@@ -12173,7 +11829,11 @@
           <a:lstStyle/>
           <a:p>
             <a:r>
-              <a:rPr lang="en-US" sz="900" dirty="0"/>
+              <a:rPr lang="en-US" sz="900" dirty="0">
+                <a:solidFill>
+                  <a:schemeClr val="accent1"/>
+                </a:solidFill>
+              </a:rPr>
               <a:t>Azure Event Hub</a:t>
             </a:r>
           </a:p>
@@ -12432,6 +12092,125 @@
           </a:fontRef>
         </p:style>
       </p:cxnSp>
+      <p:pic>
+        <p:nvPicPr>
+          <p:cNvPr id="5" name="Picture 3"/>
+          <p:cNvPicPr>
+            <a:picLocks noChangeAspect="1"/>
+          </p:cNvPicPr>
+          <p:nvPr/>
+        </p:nvPicPr>
+        <p:blipFill>
+          <a:blip r:embed="rId18"/>
+          <a:stretch>
+            <a:fillRect/>
+          </a:stretch>
+        </p:blipFill>
+        <p:spPr>
+          <a:xfrm>
+            <a:off x="10246380" y="3738310"/>
+            <a:ext cx="368116" cy="372749"/>
+          </a:xfrm>
+          <a:prstGeom prst="rect">
+            <a:avLst/>
+          </a:prstGeom>
+        </p:spPr>
+      </p:pic>
+      <p:cxnSp>
+        <p:nvCxnSpPr>
+          <p:cNvPr id="7" name="Curved Connector 5"/>
+          <p:cNvCxnSpPr>
+            <a:stCxn id="15" idx="2"/>
+            <a:endCxn id="5" idx="3"/>
+          </p:cNvCxnSpPr>
+          <p:nvPr/>
+        </p:nvCxnSpPr>
+        <p:spPr>
+          <a:xfrm rot="5400000">
+            <a:off x="10563069" y="3721251"/>
+            <a:ext cx="254861" cy="152006"/>
+          </a:xfrm>
+          <a:prstGeom prst="curvedConnector2">
+            <a:avLst/>
+          </a:prstGeom>
+          <a:ln>
+            <a:prstDash val="sysDash"/>
+            <a:tailEnd type="triangle"/>
+          </a:ln>
+        </p:spPr>
+        <p:style>
+          <a:lnRef idx="1">
+            <a:schemeClr val="accent1"/>
+          </a:lnRef>
+          <a:fillRef idx="0">
+            <a:schemeClr val="accent1"/>
+          </a:fillRef>
+          <a:effectRef idx="0">
+            <a:schemeClr val="accent1"/>
+          </a:effectRef>
+          <a:fontRef idx="minor">
+            <a:schemeClr val="tx1"/>
+          </a:fontRef>
+        </p:style>
+      </p:cxnSp>
+      <p:sp>
+        <p:nvSpPr>
+          <p:cNvPr id="42" name="Title 1"/>
+          <p:cNvSpPr>
+            <a:spLocks noGrp="1"/>
+          </p:cNvSpPr>
+          <p:nvPr>
+            <p:ph type="title"/>
+          </p:nvPr>
+        </p:nvSpPr>
+        <p:spPr>
+          <a:xfrm>
+            <a:off x="0" y="6350"/>
+            <a:ext cx="12279313" cy="795338"/>
+          </a:xfrm>
+        </p:spPr>
+        <p:txBody>
+          <a:bodyPr anchor="t">
+            <a:noAutofit/>
+          </a:bodyPr>
+          <a:lstStyle/>
+          <a:p>
+            <a:pPr>
+              <a:lnSpc>
+                <a:spcPts val="3000"/>
+              </a:lnSpc>
+            </a:pPr>
+            <a:r>
+              <a:rPr lang="en-US" sz="2800" dirty="0">
+                <a:solidFill>
+                  <a:srgbClr val="0072C6"/>
+                </a:solidFill>
+              </a:rPr>
+              <a:t>Starter Kit: Intelligent App(Event Hub with Stream Analytics and Power BI)</a:t>
+            </a:r>
+            <a:br>
+              <a:rPr lang="EN-US" sz="2800" dirty="0">
+                <a:solidFill>
+                  <a:srgbClr val="0072C6"/>
+                </a:solidFill>
+              </a:rPr>
+            </a:br>
+            <a:r>
+              <a:rPr lang="en-US" sz="1800" dirty="0">
+                <a:solidFill>
+                  <a:schemeClr val="accent3"/>
+                </a:solidFill>
+              </a:rPr>
+              <a:t>Monitoring Elevator for Predictive Maintenance</a:t>
+            </a:r>
+            <a:endParaRPr lang="EN-US" sz="2800" dirty="0">
+              <a:solidFill>
+                <a:srgbClr val="0072C6"/>
+              </a:solidFill>
+            </a:endParaRPr>
+          </a:p>
+        </p:txBody>
+      </p:sp>
     </p:spTree>
     <p:extLst>
       <p:ext uri="{BB962C8B-B14F-4D97-AF65-F5344CB8AC3E}">
@@ -12444,7 +12223,7 @@
   </p:clrMapOvr>
   <mc:AlternateContent xmlns:mc="http://schemas.openxmlformats.org/markup-compatibility/2006" xmlns:p14="http://schemas.microsoft.com/office/powerpoint/2010/main">
     <mc:Choice Requires="p14">
-      <p:transition p14:dur="0"/>
+      <p:transition p14:dur="10"/>
     </mc:Choice>
     <mc:Fallback xmlns="">
       <p:transition/>
@@ -12754,39 +12533,6 @@
       </p:sp>
       <p:sp>
         <p:nvSpPr>
-          <p:cNvPr id="2" name="Title 1"/>
-          <p:cNvSpPr>
-            <a:spLocks noGrp="1"/>
-          </p:cNvSpPr>
-          <p:nvPr>
-            <p:ph type="title"/>
-          </p:nvPr>
-        </p:nvSpPr>
-        <p:spPr>
-          <a:xfrm>
-            <a:off x="0" y="-8008"/>
-            <a:ext cx="11917021" cy="744033"/>
-          </a:xfrm>
-        </p:spPr>
-        <p:txBody>
-          <a:bodyPr>
-            <a:noAutofit/>
-          </a:bodyPr>
-          <a:lstStyle/>
-          <a:p>
-            <a:r>
-              <a:rPr lang="EN-US" sz="2800" dirty="0">
-                <a:solidFill>
-                  <a:srgbClr val="0072C6"/>
-                </a:solidFill>
-              </a:rPr>
-              <a:t>Starter Kit: Intelligent App(Data Factory, Data Lake, Machine Learning)</a:t>
-            </a:r>
-          </a:p>
-        </p:txBody>
-      </p:sp>
-      <p:sp>
-        <p:nvSpPr>
           <p:cNvPr id="32" name="TextBox 31"/>
           <p:cNvSpPr txBox="1"/>
           <p:nvPr/>
@@ -13335,7 +13081,7 @@
         <p:spPr>
           <a:xfrm>
             <a:off x="5846993" y="845995"/>
-            <a:ext cx="2856453" cy="4084542"/>
+            <a:ext cx="2856453" cy="4236892"/>
           </a:xfrm>
           <a:prstGeom prst="rect">
             <a:avLst/>
@@ -13517,7 +13263,7 @@
                   <a:schemeClr val="bg1"/>
                 </a:solidFill>
               </a:rPr>
-              <a:t>1T Data Lake Storage = $40.96</a:t>
+              <a:t>5T Data Lake Storage = $274.8</a:t>
             </a:r>
           </a:p>
           <a:p>
@@ -13582,7 +13328,7 @@
                   <a:schemeClr val="bg1"/>
                 </a:solidFill>
               </a:rPr>
-              <a:t>1TB Block Blob Locally Redundant = $24.58</a:t>
+              <a:t>50TB Block Blob Locally Redundant = $1208.73</a:t>
             </a:r>
           </a:p>
           <a:p>
@@ -13599,7 +13345,7 @@
                   <a:schemeClr val="bg1"/>
                 </a:solidFill>
               </a:rPr>
-              <a:t>300 DWUs SQL Data Warehouse = $2700.05</a:t>
+              <a:t>300 DWUs SQL Data Warehouse = $900.24</a:t>
             </a:r>
           </a:p>
           <a:p>
@@ -13659,7 +13405,23 @@
                   <a:schemeClr val="bg1"/>
                 </a:solidFill>
               </a:rPr>
-              <a:t>Total : U$53,397.48 / Year</a:t>
+              <a:t>Total : U</a:t>
+            </a:r>
+            <a:r>
+              <a:rPr lang="en-US" sz="1200" b="1">
+                <a:solidFill>
+                  <a:schemeClr val="bg1"/>
+                </a:solidFill>
+              </a:rPr>
+              <a:t>$ 48,815.64 </a:t>
+            </a:r>
+            <a:r>
+              <a:rPr lang="en-US" sz="1200" b="1" dirty="0">
+                <a:solidFill>
+                  <a:schemeClr val="bg1"/>
+                </a:solidFill>
+              </a:rPr>
+              <a:t>/ Year</a:t>
             </a:r>
             <a:endParaRPr lang="en-US" sz="1200" b="1" dirty="0">
               <a:solidFill>
@@ -14661,7 +14423,7 @@
         </p:blipFill>
         <p:spPr>
           <a:xfrm>
-            <a:off x="10112520" y="2509056"/>
+            <a:off x="9947217" y="2623614"/>
             <a:ext cx="519392" cy="635305"/>
           </a:xfrm>
           <a:prstGeom prst="rect">
@@ -14685,7 +14447,7 @@
         </p:blipFill>
         <p:spPr>
           <a:xfrm>
-            <a:off x="9152607" y="1771493"/>
+            <a:off x="9965649" y="1922151"/>
             <a:ext cx="452394" cy="357240"/>
           </a:xfrm>
           <a:prstGeom prst="rect">
@@ -14709,7 +14471,7 @@
         </p:blipFill>
         <p:spPr>
           <a:xfrm>
-            <a:off x="9618279" y="1738710"/>
+            <a:off x="9205917" y="1866032"/>
             <a:ext cx="494241" cy="493178"/>
           </a:xfrm>
           <a:prstGeom prst="rect">
@@ -14725,8 +14487,8 @@
         </p:nvSpPr>
         <p:spPr>
           <a:xfrm>
-            <a:off x="9019276" y="2224631"/>
-            <a:ext cx="1437656" cy="369332"/>
+            <a:off x="9867825" y="2309413"/>
+            <a:ext cx="980055" cy="230832"/>
           </a:xfrm>
           <a:prstGeom prst="rect">
             <a:avLst/>
@@ -14740,20 +14502,21 @@
           <a:lstStyle/>
           <a:p>
             <a:r>
-              <a:rPr lang="en-US" sz="900" dirty="0"/>
-              <a:t>Azure Data Lake </a:t>
-            </a:r>
-            <a:r>
-              <a:rPr lang="en-US" altLang="zh-CN" sz="900" dirty="0"/>
-              <a:t>Storage</a:t>
-            </a:r>
-          </a:p>
-          <a:p>
-            <a:r>
-              <a:rPr lang="en-US" altLang="zh-CN" sz="900" dirty="0"/>
-              <a:t>Azure Data Lake Analytics</a:t>
-            </a:r>
-            <a:endParaRPr lang="en-US" sz="900" dirty="0"/>
+              <a:rPr lang="en-US" sz="900" dirty="0">
+                <a:solidFill>
+                  <a:schemeClr val="accent1"/>
+                </a:solidFill>
+              </a:rPr>
+              <a:t>Data Lake </a:t>
+            </a:r>
+            <a:r>
+              <a:rPr lang="en-US" altLang="zh-CN" sz="900" dirty="0">
+                <a:solidFill>
+                  <a:schemeClr val="accent1"/>
+                </a:solidFill>
+              </a:rPr>
+              <a:t>Store</a:t>
+            </a:r>
           </a:p>
         </p:txBody>
       </p:sp>
@@ -14796,7 +14559,7 @@
         </p:nvCxnSpPr>
         <p:spPr>
           <a:xfrm flipV="1">
-            <a:off x="9968353" y="3144361"/>
+            <a:off x="9803050" y="3258919"/>
             <a:ext cx="403863" cy="240862"/>
           </a:xfrm>
           <a:prstGeom prst="curvedConnector2">
@@ -14827,14 +14590,14 @@
           <p:cNvPr id="16" name="Curved Connector 15"/>
           <p:cNvCxnSpPr>
             <a:stCxn id="8" idx="0"/>
-            <a:endCxn id="10" idx="2"/>
+            <a:endCxn id="9" idx="2"/>
           </p:cNvCxnSpPr>
           <p:nvPr/>
         </p:nvCxnSpPr>
         <p:spPr>
           <a:xfrm rot="16200000" flipV="1">
-            <a:off x="9980224" y="2117064"/>
-            <a:ext cx="277168" cy="506816"/>
+            <a:off x="10027269" y="2443969"/>
+            <a:ext cx="344223" cy="15067"/>
           </a:xfrm>
           <a:prstGeom prst="curvedConnector3">
             <a:avLst>
@@ -14865,18 +14628,20 @@
         <p:nvCxnSpPr>
           <p:cNvPr id="20" name="Curved Connector 19"/>
           <p:cNvCxnSpPr>
-            <a:stCxn id="9" idx="2"/>
-            <a:endCxn id="8" idx="1"/>
+            <a:stCxn id="10" idx="3"/>
+            <a:endCxn id="9" idx="1"/>
           </p:cNvCxnSpPr>
           <p:nvPr/>
         </p:nvCxnSpPr>
         <p:spPr>
-          <a:xfrm rot="16200000" flipH="1">
-            <a:off x="9396674" y="2110863"/>
-            <a:ext cx="697976" cy="733716"/>
-          </a:xfrm>
-          <a:prstGeom prst="curvedConnector2">
-            <a:avLst/>
+          <a:xfrm flipV="1">
+            <a:off x="9700158" y="2100771"/>
+            <a:ext cx="265491" cy="11850"/>
+          </a:xfrm>
+          <a:prstGeom prst="curvedConnector3">
+            <a:avLst>
+              <a:gd name="adj1" fmla="val 50000"/>
+            </a:avLst>
           </a:prstGeom>
           <a:ln>
             <a:prstDash val="sysDash"/>
@@ -14969,12 +14734,20 @@
           <a:lstStyle/>
           <a:p>
             <a:r>
-              <a:rPr lang="en-US" sz="900" dirty="0"/>
+              <a:rPr lang="en-US" sz="900" dirty="0">
+                <a:solidFill>
+                  <a:schemeClr val="accent1"/>
+                </a:solidFill>
+              </a:rPr>
               <a:t>Data Lake </a:t>
             </a:r>
             <a:r>
-              <a:rPr lang="en-US" altLang="zh-CN" sz="900" dirty="0"/>
-              <a:t>Storage</a:t>
+              <a:rPr lang="en-US" altLang="zh-CN" sz="900" dirty="0">
+                <a:solidFill>
+                  <a:schemeClr val="accent1"/>
+                </a:solidFill>
+              </a:rPr>
+              <a:t>Store</a:t>
             </a:r>
           </a:p>
         </p:txBody>
@@ -14983,15 +14756,14 @@
         <p:nvCxnSpPr>
           <p:cNvPr id="30" name="Curved Connector 29"/>
           <p:cNvCxnSpPr>
-            <a:stCxn id="8" idx="3"/>
-            <a:endCxn id="24" idx="1"/>
+            <a:stCxn id="9" idx="3"/>
           </p:cNvCxnSpPr>
           <p:nvPr/>
         </p:nvCxnSpPr>
         <p:spPr>
           <a:xfrm flipV="1">
-            <a:off x="10631912" y="2069310"/>
-            <a:ext cx="198882" cy="757399"/>
+            <a:off x="10418043" y="1889434"/>
+            <a:ext cx="412751" cy="211337"/>
           </a:xfrm>
           <a:prstGeom prst="curvedConnector3">
             <a:avLst>
@@ -15034,7 +14806,7 @@
         </p:blipFill>
         <p:spPr>
           <a:xfrm>
-            <a:off x="10631912" y="3282353"/>
+            <a:off x="10730084" y="3105460"/>
             <a:ext cx="419058" cy="424956"/>
           </a:xfrm>
           <a:prstGeom prst="rect">
@@ -15050,7 +14822,7 @@
         </p:nvSpPr>
         <p:spPr>
           <a:xfrm>
-            <a:off x="10534268" y="3696026"/>
+            <a:off x="10710823" y="3554863"/>
             <a:ext cx="1176130" cy="230832"/>
           </a:xfrm>
           <a:prstGeom prst="rect">
@@ -15087,7 +14859,7 @@
         </p:blipFill>
         <p:spPr>
           <a:xfrm>
-            <a:off x="11296890" y="2709001"/>
+            <a:off x="11298888" y="2640925"/>
             <a:ext cx="324839" cy="294111"/>
           </a:xfrm>
           <a:prstGeom prst="rect">
@@ -15103,7 +14875,7 @@
         </p:nvSpPr>
         <p:spPr>
           <a:xfrm>
-            <a:off x="11021476" y="2963009"/>
+            <a:off x="11058052" y="2905481"/>
             <a:ext cx="1079074" cy="230832"/>
           </a:xfrm>
           <a:prstGeom prst="rect">
@@ -15118,7 +14890,11 @@
           <a:lstStyle/>
           <a:p>
             <a:r>
-              <a:rPr lang="en-US" sz="900" dirty="0"/>
+              <a:rPr lang="en-US" sz="900" dirty="0">
+                <a:solidFill>
+                  <a:schemeClr val="accent1"/>
+                </a:solidFill>
+              </a:rPr>
               <a:t>Power BI Desktop</a:t>
             </a:r>
           </a:p>
@@ -15128,14 +14904,15 @@
         <p:nvCxnSpPr>
           <p:cNvPr id="43" name="Curved Connector 42"/>
           <p:cNvCxnSpPr>
+            <a:stCxn id="24" idx="2"/>
             <a:endCxn id="40" idx="0"/>
           </p:cNvCxnSpPr>
           <p:nvPr/>
         </p:nvCxnSpPr>
         <p:spPr>
           <a:xfrm rot="5400000">
-            <a:off x="10541781" y="2722463"/>
-            <a:ext cx="859551" cy="260229"/>
+            <a:off x="10673019" y="2666505"/>
+            <a:ext cx="705550" cy="172361"/>
           </a:xfrm>
           <a:prstGeom prst="curvedConnector3">
             <a:avLst/>
@@ -15170,7 +14947,7 @@
         </p:nvCxnSpPr>
         <p:spPr>
           <a:xfrm rot="16200000" flipH="1">
-            <a:off x="11247531" y="2497221"/>
+            <a:off x="11249529" y="2429145"/>
             <a:ext cx="261139" cy="162420"/>
           </a:xfrm>
           <a:prstGeom prst="curvedConnector3">
@@ -15207,8 +14984,8 @@
         </p:nvCxnSpPr>
         <p:spPr>
           <a:xfrm rot="5400000">
-            <a:off x="11155497" y="3089315"/>
-            <a:ext cx="300990" cy="510043"/>
+            <a:off x="11282554" y="3002902"/>
+            <a:ext cx="181625" cy="448447"/>
           </a:xfrm>
           <a:prstGeom prst="curvedConnector2">
             <a:avLst/>
@@ -15281,6 +15058,141 @@
           </a:prstGeom>
         </p:spPr>
       </p:pic>
+      <p:sp>
+        <p:nvSpPr>
+          <p:cNvPr id="45" name="Title 1"/>
+          <p:cNvSpPr>
+            <a:spLocks noGrp="1"/>
+          </p:cNvSpPr>
+          <p:nvPr>
+            <p:ph type="title"/>
+          </p:nvPr>
+        </p:nvSpPr>
+        <p:spPr>
+          <a:xfrm>
+            <a:off x="0" y="4763"/>
+            <a:ext cx="12308114" cy="744537"/>
+          </a:xfrm>
+        </p:spPr>
+        <p:txBody>
+          <a:bodyPr anchor="t">
+            <a:noAutofit/>
+          </a:bodyPr>
+          <a:lstStyle/>
+          <a:p>
+            <a:pPr>
+              <a:lnSpc>
+                <a:spcPts val="3000"/>
+              </a:lnSpc>
+            </a:pPr>
+            <a:r>
+              <a:rPr lang="en-US" sz="2800" dirty="0">
+                <a:solidFill>
+                  <a:srgbClr val="0072C6"/>
+                </a:solidFill>
+              </a:rPr>
+              <a:t>Starter Kit: Intelligent App(Data Factory, Data Lake, Machine Learning)</a:t>
+            </a:r>
+            <a:br>
+              <a:rPr lang="EN-US" sz="2800" dirty="0">
+                <a:solidFill>
+                  <a:srgbClr val="0072C6"/>
+                </a:solidFill>
+              </a:rPr>
+            </a:br>
+            <a:r>
+              <a:rPr lang="en-US" sz="1800" dirty="0">
+                <a:solidFill>
+                  <a:schemeClr val="accent3"/>
+                </a:solidFill>
+              </a:rPr>
+              <a:t>Call Center Sentiment Analysis with Cortana Intelligence Suite</a:t>
+            </a:r>
+            <a:endParaRPr lang="EN-US" sz="2800" dirty="0">
+              <a:solidFill>
+                <a:srgbClr val="0072C6"/>
+              </a:solidFill>
+            </a:endParaRPr>
+          </a:p>
+        </p:txBody>
+      </p:sp>
+      <p:sp>
+        <p:nvSpPr>
+          <p:cNvPr id="61" name="TextBox 60"/>
+          <p:cNvSpPr txBox="1"/>
+          <p:nvPr/>
+        </p:nvSpPr>
+        <p:spPr>
+          <a:xfrm>
+            <a:off x="8912993" y="2318539"/>
+            <a:ext cx="1437656" cy="230832"/>
+          </a:xfrm>
+          <a:prstGeom prst="rect">
+            <a:avLst/>
+          </a:prstGeom>
+          <a:noFill/>
+        </p:spPr>
+        <p:txBody>
+          <a:bodyPr wrap="square" rtlCol="0">
+            <a:spAutoFit/>
+          </a:bodyPr>
+          <a:lstStyle/>
+          <a:p>
+            <a:r>
+              <a:rPr lang="en-US" altLang="zh-CN" sz="900" dirty="0">
+                <a:solidFill>
+                  <a:schemeClr val="accent1"/>
+                </a:solidFill>
+              </a:rPr>
+              <a:t>Data Lake Analytics</a:t>
+            </a:r>
+            <a:endParaRPr lang="en-US" sz="900" dirty="0">
+              <a:solidFill>
+                <a:schemeClr val="accent1"/>
+              </a:solidFill>
+            </a:endParaRPr>
+          </a:p>
+        </p:txBody>
+      </p:sp>
+      <p:cxnSp>
+        <p:nvCxnSpPr>
+          <p:cNvPr id="69" name="Curved Connector 68"/>
+          <p:cNvCxnSpPr>
+            <a:stCxn id="9" idx="0"/>
+            <a:endCxn id="10" idx="0"/>
+          </p:cNvCxnSpPr>
+          <p:nvPr/>
+        </p:nvCxnSpPr>
+        <p:spPr>
+          <a:xfrm rot="16200000" flipV="1">
+            <a:off x="9794383" y="1524688"/>
+            <a:ext cx="56119" cy="738808"/>
+          </a:xfrm>
+          <a:prstGeom prst="curvedConnector3">
+            <a:avLst>
+              <a:gd name="adj1" fmla="val 253219"/>
+            </a:avLst>
+          </a:prstGeom>
+          <a:ln>
+            <a:prstDash val="sysDash"/>
+            <a:tailEnd type="triangle"/>
+          </a:ln>
+        </p:spPr>
+        <p:style>
+          <a:lnRef idx="1">
+            <a:schemeClr val="accent1"/>
+          </a:lnRef>
+          <a:fillRef idx="0">
+            <a:schemeClr val="accent1"/>
+          </a:fillRef>
+          <a:effectRef idx="0">
+            <a:schemeClr val="accent1"/>
+          </a:effectRef>
+          <a:fontRef idx="minor">
+            <a:schemeClr val="tx1"/>
+          </a:fontRef>
+        </p:style>
+      </p:cxnSp>
     </p:spTree>
     <p:extLst>
       <p:ext uri="{BB962C8B-B14F-4D97-AF65-F5344CB8AC3E}">
@@ -16220,9 +16132,12 @@
 </file>
 
 <file path=customXml/item1.xml><?xml version="1.0" encoding="utf-8"?>
-<p:properties xmlns:p="http://schemas.microsoft.com/office/2006/metadata/properties" xmlns:xsi="http://www.w3.org/2001/XMLSchema-instance" xmlns:pc="http://schemas.microsoft.com/office/infopath/2007/PartnerControls">
-  <documentManagement/>
-</p:properties>
+<?mso-contentType ?>
+<FormTemplates xmlns="http://schemas.microsoft.com/sharepoint/v3/contenttype/forms">
+  <Display>DocumentLibraryForm</Display>
+  <Edit>DocumentLibraryForm</Edit>
+  <New>DocumentLibraryForm</New>
+</FormTemplates>
 </file>
 
 <file path=customXml/item2.xml><?xml version="1.0" encoding="utf-8"?>
@@ -16340,25 +16255,15 @@
 </file>
 
 <file path=customXml/item3.xml><?xml version="1.0" encoding="utf-8"?>
-<?mso-contentType ?>
-<FormTemplates xmlns="http://schemas.microsoft.com/sharepoint/v3/contenttype/forms">
-  <Display>DocumentLibraryForm</Display>
-  <Edit>DocumentLibraryForm</Edit>
-  <New>DocumentLibraryForm</New>
-</FormTemplates>
+<p:properties xmlns:p="http://schemas.microsoft.com/office/2006/metadata/properties" xmlns:xsi="http://www.w3.org/2001/XMLSchema-instance" xmlns:pc="http://schemas.microsoft.com/office/infopath/2007/PartnerControls">
+  <documentManagement/>
+</p:properties>
 </file>
 
 <file path=customXml/itemProps1.xml><?xml version="1.0" encoding="utf-8"?>
-<ds:datastoreItem xmlns:ds="http://schemas.openxmlformats.org/officeDocument/2006/customXml" ds:itemID="{2A7D4CEE-4A6E-444C-9F48-154C694282ED}">
+<ds:datastoreItem xmlns:ds="http://schemas.openxmlformats.org/officeDocument/2006/customXml" ds:itemID="{1547E796-3336-4CA3-A039-C51122E80770}">
   <ds:schemaRefs>
-    <ds:schemaRef ds:uri="http://purl.org/dc/elements/1.1/"/>
-    <ds:schemaRef ds:uri="http://schemas.microsoft.com/office/2006/metadata/properties"/>
-    <ds:schemaRef ds:uri="http://purl.org/dc/terms/"/>
-    <ds:schemaRef ds:uri="http://schemas.openxmlformats.org/package/2006/metadata/core-properties"/>
-    <ds:schemaRef ds:uri="http://schemas.microsoft.com/office/2006/documentManagement/types"/>
-    <ds:schemaRef ds:uri="http://purl.org/dc/dcmitype/"/>
-    <ds:schemaRef ds:uri="http://schemas.microsoft.com/office/infopath/2007/PartnerControls"/>
-    <ds:schemaRef ds:uri="http://www.w3.org/XML/1998/namespace"/>
+    <ds:schemaRef ds:uri="http://schemas.microsoft.com/sharepoint/v3/contenttype/forms"/>
   </ds:schemaRefs>
 </ds:datastoreItem>
 </file>
@@ -16380,9 +16285,16 @@
 </file>
 
 <file path=customXml/itemProps3.xml><?xml version="1.0" encoding="utf-8"?>
-<ds:datastoreItem xmlns:ds="http://schemas.openxmlformats.org/officeDocument/2006/customXml" ds:itemID="{1547E796-3336-4CA3-A039-C51122E80770}">
+<ds:datastoreItem xmlns:ds="http://schemas.openxmlformats.org/officeDocument/2006/customXml" ds:itemID="{2A7D4CEE-4A6E-444C-9F48-154C694282ED}">
   <ds:schemaRefs>
-    <ds:schemaRef ds:uri="http://schemas.microsoft.com/sharepoint/v3/contenttype/forms"/>
+    <ds:schemaRef ds:uri="http://purl.org/dc/dcmitype/"/>
+    <ds:schemaRef ds:uri="http://schemas.microsoft.com/office/infopath/2007/PartnerControls"/>
+    <ds:schemaRef ds:uri="http://purl.org/dc/elements/1.1/"/>
+    <ds:schemaRef ds:uri="http://schemas.microsoft.com/office/2006/metadata/properties"/>
+    <ds:schemaRef ds:uri="http://purl.org/dc/terms/"/>
+    <ds:schemaRef ds:uri="http://schemas.microsoft.com/office/2006/documentManagement/types"/>
+    <ds:schemaRef ds:uri="http://schemas.openxmlformats.org/package/2006/metadata/core-properties"/>
+    <ds:schemaRef ds:uri="http://www.w3.org/XML/1998/namespace"/>
   </ds:schemaRefs>
 </ds:datastoreItem>
 </file>
</xml_diff>

<commit_message>
Final review comments by Eumar
Final review comments by Eumar
</commit_message>
<xml_diff>
--- a/Content/Starter Kit - Intelligent Apps & Analytics/0 - Starter Kit - Intelligent Apps & Analytics.pptx
+++ b/Content/Starter Kit - Intelligent Apps & Analytics/0 - Starter Kit - Intelligent Apps & Analytics.pptx
@@ -129,7 +129,7 @@
       </p:ext>
     </p:extLst>
   </p:cmAuthor>
-  <p:cmAuthor id="2" name="Eumar Assis" initials="EA" lastIdx="21" clrIdx="1">
+  <p:cmAuthor id="2" name="Eumar Assis" initials="EA" lastIdx="28" clrIdx="1">
     <p:extLst>
       <p:ext uri="{19B8F6BF-5375-455C-9EA6-DF929625EA0E}">
         <p15:presenceInfo xmlns:p15="http://schemas.microsoft.com/office/powerpoint/2012/main" userId="S-1-5-21-124525095-708259637-1543119021-1495550" providerId="AD"/>
@@ -148,36 +148,27 @@
 
 <file path=ppt/comments/comment1.xml><?xml version="1.0" encoding="utf-8"?>
 <p:cmLst xmlns:a="http://schemas.openxmlformats.org/drawingml/2006/main" xmlns:r="http://schemas.openxmlformats.org/officeDocument/2006/relationships" xmlns:p="http://schemas.openxmlformats.org/presentationml/2006/main">
-  <p:cm authorId="2" dt="2016-08-23T11:55:25.527" idx="14">
-    <p:pos x="2541" y="1378"/>
-    <p:text>Mention Power BI and AZURE (e.g. Azure SQL Data warehouse)</p:text>
-    <p:extLst mod="1">
-      <p:ext uri="{C676402C-5697-4E1C-873F-D02D1690AC5C}">
-        <p15:threadingInfo xmlns:p15="http://schemas.microsoft.com/office/powerpoint/2012/main" timeZoneBias="240"/>
-      </p:ext>
-    </p:extLst>
-  </p:cm>
-  <p:cm authorId="2" dt="2016-08-23T11:57:01.334" idx="2">
-    <p:pos x="5124" y="1212"/>
-    <p:text>Is this correct? Include  How Many HD Insight Nodes.</p:text>
+  <p:cm authorId="2" dt="2016-08-31T21:51:42.774" idx="22">
+    <p:pos x="4717" y="1872"/>
+    <p:text>Please, include Price for Power Bi or Power BI Embedded</p:text>
     <p:extLst>
       <p:ext uri="{C676402C-5697-4E1C-873F-D02D1690AC5C}">
         <p15:threadingInfo xmlns:p15="http://schemas.microsoft.com/office/powerpoint/2012/main" timeZoneBias="240"/>
       </p:ext>
     </p:extLst>
   </p:cm>
-  <p:cm authorId="2" dt="2016-08-23T11:57:25.117" idx="13">
-    <p:pos x="5271" y="1587"/>
-    <p:text>Is this correct? Is 1Tb enough?</p:text>
+  <p:cm authorId="2" dt="2016-08-31T21:52:03.285" idx="23">
+    <p:pos x="7514" y="836"/>
+    <p:text>Please, include in the High level Architecture what is used to load data into SQL Azure DW). E.g. On-Premises SSIS or Data Factory with Connector</p:text>
     <p:extLst>
       <p:ext uri="{C676402C-5697-4E1C-873F-D02D1690AC5C}">
         <p15:threadingInfo xmlns:p15="http://schemas.microsoft.com/office/powerpoint/2012/main" timeZoneBias="240"/>
       </p:ext>
     </p:extLst>
   </p:cm>
-  <p:cm authorId="2" dt="2016-08-23T12:02:49.666" idx="7">
-    <p:pos x="2237" y="248"/>
-    <p:text>Can we add a sub title to reflect the business scenario we are helping to solve or example? E.g. Twitter Sentiment Analysis with  AZURE SQL DW and Power BI</p:text>
+  <p:cm authorId="2" dt="2016-08-31T21:53:19.974" idx="24">
+    <p:pos x="973" y="1025"/>
+    <p:text>Nice to have: refine 'The problem' to cover more data growth focused on different sources. E.g. Social Network, Device Explosion</p:text>
     <p:extLst>
       <p:ext uri="{C676402C-5697-4E1C-873F-D02D1690AC5C}">
         <p15:threadingInfo xmlns:p15="http://schemas.microsoft.com/office/powerpoint/2012/main" timeZoneBias="240"/>
@@ -189,60 +180,21 @@
 
 <file path=ppt/comments/comment2.xml><?xml version="1.0" encoding="utf-8"?>
 <p:cmLst xmlns:a="http://schemas.openxmlformats.org/drawingml/2006/main" xmlns:r="http://schemas.openxmlformats.org/officeDocument/2006/relationships" xmlns:p="http://schemas.openxmlformats.org/presentationml/2006/main">
-  <p:cm authorId="2" dt="2016-08-23T11:58:59.542" idx="17">
-    <p:pos x="5362" y="392"/>
-    <p:text>Why do we need HDInsight in this scenario?</p:text>
+  <p:cm authorId="2" dt="2016-08-31T21:54:37.213" idx="25">
+    <p:pos x="10" y="10"/>
+    <p:text>Okay, we have added the scenario 'Churn Analysis', but which services delivers the Churn Analysis it? Are we going to add Machine Learning Here?</p:text>
     <p:extLst>
       <p:ext uri="{C676402C-5697-4E1C-873F-D02D1690AC5C}">
         <p15:threadingInfo xmlns:p15="http://schemas.microsoft.com/office/powerpoint/2012/main" timeZoneBias="240"/>
       </p:ext>
     </p:extLst>
   </p:cm>
-  <p:cm authorId="2" dt="2016-08-23T12:00:16.339" idx="18">
-    <p:pos x="5362" y="488"/>
-    <p:text>My suggestions: Option 1: Power BI with Enterprise Connector
-Option 2: Azure Data Factory with Connector + Azure SQl Datawarehouse + Power BI Direct Query</p:text>
-    <p:extLst>
-      <p:ext uri="{C676402C-5697-4E1C-873F-D02D1690AC5C}">
-        <p15:threadingInfo xmlns:p15="http://schemas.microsoft.com/office/powerpoint/2012/main" timeZoneBias="240">
-          <p15:parentCm authorId="2" idx="17"/>
-        </p15:threadingInfo>
-      </p:ext>
-    </p:extLst>
-  </p:cm>
-  <p:cm authorId="2" dt="2016-08-23T12:00:40.213" idx="6">
-    <p:pos x="2873" y="1159"/>
-    <p:text>Recommend mentioning the benefits of Data factory</p:text>
+  <p:cm authorId="2" dt="2016-08-31T21:55:29.013" idx="26">
+    <p:pos x="106" y="106"/>
+    <p:text>Please, include Price for Power Bi or Power BI Embedded</p:text>
     <p:extLst>
       <p:ext uri="{C676402C-5697-4E1C-873F-D02D1690AC5C}">
         <p15:threadingInfo xmlns:p15="http://schemas.microsoft.com/office/powerpoint/2012/main" timeZoneBias="240"/>
-      </p:ext>
-    </p:extLst>
-  </p:cm>
-  <p:cm authorId="2" dt="2016-08-23T12:19:03.669" idx="8">
-    <p:pos x="2947" y="60"/>
-    <p:text>Can we add a sub title to reflect the business scenario we are helping to solve or example? E.g. Cloud Big Data for  Customer Churn Analysis with On-Premises Data</p:text>
-    <p:extLst>
-      <p:ext uri="{C676402C-5697-4E1C-873F-D02D1690AC5C}">
-        <p15:threadingInfo xmlns:p15="http://schemas.microsoft.com/office/powerpoint/2012/main" timeZoneBias="240"/>
-      </p:ext>
-    </p:extLst>
-  </p:cm>
-  <p:cm authorId="3" dt="2016-08-26T15:22:54.677" idx="1">
-    <p:pos x="936" y="1272"/>
-    <p:text>Consider revision. Ex - "Today most organizations strongly need to present on-premises source data and publish reports to organization users. This leads to higher costs for data retrieval and report processing."</p:text>
-    <p:extLst>
-      <p:ext uri="{C676402C-5697-4E1C-873F-D02D1690AC5C}">
-        <p15:threadingInfo xmlns:p15="http://schemas.microsoft.com/office/powerpoint/2012/main" timeZoneBias="300"/>
-      </p:ext>
-    </p:extLst>
-  </p:cm>
-  <p:cm authorId="3" dt="2016-08-26T15:25:54.484" idx="2">
-    <p:pos x="2164" y="913"/>
-    <p:text>Consider revision. Ex. - "Microsoft provides the Power BI service to quickly create self-service online reports. Also, Azure Data Factory is a globally deployed data movement service in the cloud. Use it to easily ingest data from multiple on-premises and cloud-based sources. You pay for what you use and no more:"</p:text>
-    <p:extLst mod="1">
-      <p:ext uri="{C676402C-5697-4E1C-873F-D02D1690AC5C}">
-        <p15:threadingInfo xmlns:p15="http://schemas.microsoft.com/office/powerpoint/2012/main" timeZoneBias="300"/>
       </p:ext>
     </p:extLst>
   </p:cm>
@@ -251,39 +203,12 @@
 
 <file path=ppt/comments/comment3.xml><?xml version="1.0" encoding="utf-8"?>
 <p:cmLst xmlns:a="http://schemas.openxmlformats.org/drawingml/2006/main" xmlns:r="http://schemas.openxmlformats.org/officeDocument/2006/relationships" xmlns:p="http://schemas.openxmlformats.org/presentationml/2006/main">
-  <p:cm authorId="2" dt="2016-08-23T12:21:33.070" idx="9">
-    <p:pos x="2786" y="33"/>
-    <p:text>Can we add a sub title to reflect the business scenario we are helping to solve or mention a practical example? E.g. Monitoring Elevator for Predictive Maintanence</p:text>
+  <p:cm authorId="2" dt="2016-08-31T21:56:28.310" idx="27">
+    <p:pos x="10" y="10"/>
+    <p:text>Please, include Price for Power Bi or Power BI Embedded</p:text>
     <p:extLst>
       <p:ext uri="{C676402C-5697-4E1C-873F-D02D1690AC5C}">
         <p15:threadingInfo xmlns:p15="http://schemas.microsoft.com/office/powerpoint/2012/main" timeZoneBias="240"/>
-      </p:ext>
-    </p:extLst>
-  </p:cm>
-  <p:cm authorId="3" dt="2016-08-26T15:30:31.372" idx="3">
-    <p:pos x="864" y="1656"/>
-    <p:text>Consider revision. Ex. - "Today, data is coming from an ever increasing number of sources at a higher velocity. Business Intelligence tools have been  increasing the demand for analyzing and reporting real-time data. Most organizations significantly over estimate or underestimate the amount of resources they need to run their applications. This leads to a higher cost for their infrastructure and delivery.</p:text>
-    <p:extLst mod="1">
-      <p:ext uri="{C676402C-5697-4E1C-873F-D02D1690AC5C}">
-        <p15:threadingInfo xmlns:p15="http://schemas.microsoft.com/office/powerpoint/2012/main" timeZoneBias="300"/>
-      </p:ext>
-    </p:extLst>
-  </p:cm>
-  <p:cm authorId="3" dt="2016-08-26T15:35:27.579" idx="4">
-    <p:pos x="704" y="3096"/>
-    <p:text>Consider revision. Ex. - "Insufficient infrastructure capacity leading to poor customer experience."</p:text>
-    <p:extLst>
-      <p:ext uri="{C676402C-5697-4E1C-873F-D02D1690AC5C}">
-        <p15:threadingInfo xmlns:p15="http://schemas.microsoft.com/office/powerpoint/2012/main" timeZoneBias="300"/>
-      </p:ext>
-    </p:extLst>
-  </p:cm>
-  <p:cm authorId="3" dt="2016-08-26T15:37:03.148" idx="5">
-    <p:pos x="2776" y="1520"/>
-    <p:text>Consider revision. Ex. - "Azure Stream Analytics is a fully managed, cost effective, real-time event processing engine that helps to unlock deep insights from data. The newly released Power BI connector, that allows putting stream data directly into Power BI, can provide real-time insights for incoming data. With Azure Stream Analytics and Power BI, it can dramatically improve efficiencies:"</p:text>
-    <p:extLst>
-      <p:ext uri="{C676402C-5697-4E1C-873F-D02D1690AC5C}">
-        <p15:threadingInfo xmlns:p15="http://schemas.microsoft.com/office/powerpoint/2012/main" timeZoneBias="300"/>
       </p:ext>
     </p:extLst>
   </p:cm>
@@ -292,39 +217,12 @@
 
 <file path=ppt/comments/comment4.xml><?xml version="1.0" encoding="utf-8"?>
 <p:cmLst xmlns:a="http://schemas.openxmlformats.org/drawingml/2006/main" xmlns:r="http://schemas.openxmlformats.org/officeDocument/2006/relationships" xmlns:p="http://schemas.openxmlformats.org/presentationml/2006/main">
-  <p:cm authorId="2" dt="2016-08-23T12:22:25.434" idx="10">
-    <p:pos x="3865" y="20"/>
-    <p:text>Can we add a sub title to reflect the business scenario we are helping to solve or mention a practical example? E.g. Call Center Sentiment Analysis with Cortana Intelligence Suite</p:text>
+  <p:cm authorId="2" dt="2016-08-31T21:57:19.999" idx="28">
+    <p:pos x="10" y="10"/>
+    <p:text>Please, include Price for Power Bi or Power BI Embedded</p:text>
     <p:extLst>
       <p:ext uri="{C676402C-5697-4E1C-873F-D02D1690AC5C}">
         <p15:threadingInfo xmlns:p15="http://schemas.microsoft.com/office/powerpoint/2012/main" timeZoneBias="240"/>
-      </p:ext>
-    </p:extLst>
-  </p:cm>
-  <p:cm authorId="3" dt="2016-08-26T15:43:35.963" idx="6">
-    <p:pos x="912" y="1272"/>
-    <p:text>Consider revision. Ex. - "Today most organizations significantly over estimate or underestimate the amount of resources they need to develop and maintain their ETL process, which leads to higher costs for their infrastructure and the delivery of their applications."</p:text>
-    <p:extLst>
-      <p:ext uri="{C676402C-5697-4E1C-873F-D02D1690AC5C}">
-        <p15:threadingInfo xmlns:p15="http://schemas.microsoft.com/office/powerpoint/2012/main" timeZoneBias="300"/>
-      </p:ext>
-    </p:extLst>
-  </p:cm>
-  <p:cm authorId="3" dt="2016-08-26T15:45:44.605" idx="7">
-    <p:pos x="912" y="2480"/>
-    <p:text>Consider revision. Ex. - "Insufficient infrastructure capacity leading to poor customer experience."</p:text>
-    <p:extLst>
-      <p:ext uri="{C676402C-5697-4E1C-873F-D02D1690AC5C}">
-        <p15:threadingInfo xmlns:p15="http://schemas.microsoft.com/office/powerpoint/2012/main" timeZoneBias="300"/>
-      </p:ext>
-    </p:extLst>
-  </p:cm>
-  <p:cm authorId="3" dt="2016-08-26T15:46:40.222" idx="8">
-    <p:pos x="3456" y="920"/>
-    <p:text>Consider revision. Ex. - "Azure Data Factory, built from the ground up for scale and performance, is a globally deployed data movement service that resides in the cloud and can be used to easily ingest data from multiple on-premises and cloud-based sources."</p:text>
-    <p:extLst mod="1">
-      <p:ext uri="{C676402C-5697-4E1C-873F-D02D1690AC5C}">
-        <p15:threadingInfo xmlns:p15="http://schemas.microsoft.com/office/powerpoint/2012/main" timeZoneBias="300"/>
       </p:ext>
     </p:extLst>
   </p:cm>
@@ -413,7 +311,7 @@
           <a:p>
             <a:fld id="{386A5666-4B6A-423A-AB1B-8D7E7E0D4931}" type="datetimeFigureOut">
               <a:rPr lang="en-US" smtClean="0"/>
-              <a:t>8/31/2016</a:t>
+              <a:t>31-Aug-16</a:t>
             </a:fld>
             <a:endParaRPr lang="en-US"/>
           </a:p>
@@ -1973,7 +1871,7 @@
           <a:p>
             <a:fld id="{DD6EF947-8D9F-492B-9CF5-9DCF2EF799ED}" type="datetimeFigureOut">
               <a:rPr lang="en-US" smtClean="0"/>
-              <a:t>8/31/2016</a:t>
+              <a:t>31-Aug-16</a:t>
             </a:fld>
             <a:endParaRPr lang="en-US"/>
           </a:p>
@@ -2141,7 +2039,7 @@
           <a:p>
             <a:fld id="{DD6EF947-8D9F-492B-9CF5-9DCF2EF799ED}" type="datetimeFigureOut">
               <a:rPr lang="en-US" smtClean="0"/>
-              <a:t>8/31/2016</a:t>
+              <a:t>31-Aug-16</a:t>
             </a:fld>
             <a:endParaRPr lang="en-US"/>
           </a:p>
@@ -2319,7 +2217,7 @@
           <a:p>
             <a:fld id="{DD6EF947-8D9F-492B-9CF5-9DCF2EF799ED}" type="datetimeFigureOut">
               <a:rPr lang="en-US" smtClean="0"/>
-              <a:t>8/31/2016</a:t>
+              <a:t>31-Aug-16</a:t>
             </a:fld>
             <a:endParaRPr lang="en-US"/>
           </a:p>
@@ -2671,7 +2569,7 @@
           <a:p>
             <a:fld id="{DD6EF947-8D9F-492B-9CF5-9DCF2EF799ED}" type="datetimeFigureOut">
               <a:rPr lang="en-US" smtClean="0"/>
-              <a:t>8/31/2016</a:t>
+              <a:t>31-Aug-16</a:t>
             </a:fld>
             <a:endParaRPr lang="en-US"/>
           </a:p>
@@ -2916,7 +2814,7 @@
           <a:p>
             <a:fld id="{DD6EF947-8D9F-492B-9CF5-9DCF2EF799ED}" type="datetimeFigureOut">
               <a:rPr lang="en-US" smtClean="0"/>
-              <a:t>8/31/2016</a:t>
+              <a:t>31-Aug-16</a:t>
             </a:fld>
             <a:endParaRPr lang="en-US"/>
           </a:p>
@@ -3145,7 +3043,7 @@
           <a:p>
             <a:fld id="{DD6EF947-8D9F-492B-9CF5-9DCF2EF799ED}" type="datetimeFigureOut">
               <a:rPr lang="en-US" smtClean="0"/>
-              <a:t>8/31/2016</a:t>
+              <a:t>31-Aug-16</a:t>
             </a:fld>
             <a:endParaRPr lang="en-US"/>
           </a:p>
@@ -3509,7 +3407,7 @@
           <a:p>
             <a:fld id="{DD6EF947-8D9F-492B-9CF5-9DCF2EF799ED}" type="datetimeFigureOut">
               <a:rPr lang="en-US" smtClean="0"/>
-              <a:t>8/31/2016</a:t>
+              <a:t>31-Aug-16</a:t>
             </a:fld>
             <a:endParaRPr lang="en-US"/>
           </a:p>
@@ -3626,7 +3524,7 @@
           <a:p>
             <a:fld id="{DD6EF947-8D9F-492B-9CF5-9DCF2EF799ED}" type="datetimeFigureOut">
               <a:rPr lang="en-US" smtClean="0"/>
-              <a:t>8/31/2016</a:t>
+              <a:t>31-Aug-16</a:t>
             </a:fld>
             <a:endParaRPr lang="en-US"/>
           </a:p>
@@ -3721,7 +3619,7 @@
           <a:p>
             <a:fld id="{DD6EF947-8D9F-492B-9CF5-9DCF2EF799ED}" type="datetimeFigureOut">
               <a:rPr lang="en-US" smtClean="0"/>
-              <a:t>8/31/2016</a:t>
+              <a:t>31-Aug-16</a:t>
             </a:fld>
             <a:endParaRPr lang="en-US"/>
           </a:p>
@@ -3996,7 +3894,7 @@
           <a:p>
             <a:fld id="{DD6EF947-8D9F-492B-9CF5-9DCF2EF799ED}" type="datetimeFigureOut">
               <a:rPr lang="en-US" smtClean="0"/>
-              <a:t>8/31/2016</a:t>
+              <a:t>31-Aug-16</a:t>
             </a:fld>
             <a:endParaRPr lang="en-US"/>
           </a:p>
@@ -4248,7 +4146,7 @@
           <a:p>
             <a:fld id="{DD6EF947-8D9F-492B-9CF5-9DCF2EF799ED}" type="datetimeFigureOut">
               <a:rPr lang="en-US" smtClean="0"/>
-              <a:t>8/31/2016</a:t>
+              <a:t>31-Aug-16</a:t>
             </a:fld>
             <a:endParaRPr lang="en-US"/>
           </a:p>
@@ -4459,7 +4357,7 @@
           <a:p>
             <a:fld id="{DD6EF947-8D9F-492B-9CF5-9DCF2EF799ED}" type="datetimeFigureOut">
               <a:rPr lang="en-US" smtClean="0"/>
-              <a:t>8/31/2016</a:t>
+              <a:t>31-Aug-16</a:t>
             </a:fld>
             <a:endParaRPr lang="en-US"/>
           </a:p>
@@ -4929,7 +4827,7 @@
         </p:nvSpPr>
         <p:spPr>
           <a:xfrm rot="16200000">
-            <a:off x="7996317" y="2547349"/>
+            <a:off x="7985875" y="2387811"/>
             <a:ext cx="1799303" cy="6085652"/>
           </a:xfrm>
           <a:prstGeom prst="rect">
@@ -5752,7 +5650,7 @@
         </p:nvSpPr>
         <p:spPr>
           <a:xfrm>
-            <a:off x="5761627" y="6374443"/>
+            <a:off x="5771755" y="6182603"/>
             <a:ext cx="5860102" cy="649756"/>
           </a:xfrm>
           <a:prstGeom prst="rect">
@@ -7020,7 +6918,7 @@
         </p:nvSpPr>
         <p:spPr>
           <a:xfrm>
-            <a:off x="-2440" y="-12644"/>
+            <a:off x="302657" y="-24239"/>
             <a:ext cx="12194439" cy="744138"/>
           </a:xfrm>
         </p:spPr>
@@ -7036,7 +6934,7 @@
               </a:lnSpc>
             </a:pPr>
             <a:r>
-              <a:rPr lang="en-US" sz="2800" dirty="0">
+              <a:rPr lang="en-US" sz="2600" dirty="0">
                 <a:solidFill>
                   <a:srgbClr val="0072C6"/>
                 </a:solidFill>
@@ -7056,7 +6954,7 @@
                   <a:schemeClr val="accent3"/>
                 </a:solidFill>
               </a:rPr>
-              <a:t>Twitter Sentiment Analysis AZURE DW and Power BI</a:t>
+              <a:t>E.g. Twitter Sentiment Analysis</a:t>
             </a:r>
             <a:endParaRPr lang="EN-US" sz="2800" dirty="0">
               <a:solidFill>
@@ -9536,7 +9434,7 @@
         </p:nvSpPr>
         <p:spPr>
           <a:xfrm>
-            <a:off x="0" y="4763"/>
+            <a:off x="393131" y="46611"/>
             <a:ext cx="11655425" cy="744537"/>
           </a:xfrm>
         </p:spPr>
@@ -9572,7 +9470,7 @@
                   <a:schemeClr val="accent3"/>
                 </a:solidFill>
               </a:rPr>
-              <a:t>Cloud Big Data for  Customer Churn Analysis with On-Premises Data</a:t>
+              <a:t>E.g. Cloud Big Data Solution for Customer Churn Analysis with On-Premises Data</a:t>
             </a:r>
             <a:endParaRPr lang="EN-US" sz="2800" dirty="0">
               <a:solidFill>
@@ -12217,7 +12115,7 @@
         </p:nvSpPr>
         <p:spPr>
           <a:xfrm>
-            <a:off x="0" y="6350"/>
+            <a:off x="287079" y="60219"/>
             <a:ext cx="12279313" cy="795338"/>
           </a:xfrm>
         </p:spPr>
@@ -12233,12 +12131,12 @@
               </a:lnSpc>
             </a:pPr>
             <a:r>
-              <a:rPr lang="en-US" sz="2800" dirty="0">
+              <a:rPr lang="en-US" sz="2600" dirty="0">
                 <a:solidFill>
                   <a:srgbClr val="0072C6"/>
                 </a:solidFill>
               </a:rPr>
-              <a:t>Starter Kit: Intelligent App(Event Hub with Stream Analytics and Power BI)</a:t>
+              <a:t>Starter Kit: Intelligent Apps (IoT with Event Hub, Stream Analytics &amp; Power BI)</a:t>
             </a:r>
             <a:br>
               <a:rPr lang="EN-US" sz="2800" dirty="0">
@@ -12253,7 +12151,7 @@
                   <a:schemeClr val="accent3"/>
                 </a:solidFill>
               </a:rPr>
-              <a:t>Monitoring Elevator for Predictive Maintenance</a:t>
+              <a:t>E.g. Monitoring Devices for Predictive Maintenance</a:t>
             </a:r>
             <a:endParaRPr lang="EN-US" sz="2800" dirty="0">
               <a:solidFill>
@@ -13476,7 +13374,7 @@
         </p:nvSpPr>
         <p:spPr>
           <a:xfrm>
-            <a:off x="5761627" y="6374443"/>
+            <a:off x="5763625" y="6138509"/>
             <a:ext cx="5860102" cy="649756"/>
           </a:xfrm>
           <a:prstGeom prst="rect">
@@ -13501,11 +13399,7 @@
             </a:r>
             <a:r>
               <a:rPr lang="en-US" sz="1200" i="1" dirty="0"/>
-              <a:t>More Details &amp; Components– </a:t>
-            </a:r>
-            <a:r>
-              <a:rPr lang="en-US" sz="1200" i="1"/>
-              <a:t>Review Complete Starter Kit Intelligent Apps &amp; Analytics</a:t>
+              <a:t>More Details &amp; Components– Review Complete Starter Kit Intelligent Apps &amp; Analytics</a:t>
             </a:r>
             <a:endParaRPr lang="en-US" sz="1200" i="1" dirty="0">
               <a:latin typeface="+mj-lt"/>
@@ -15142,7 +15036,7 @@
                   <a:schemeClr val="accent3"/>
                 </a:solidFill>
               </a:rPr>
-              <a:t>Call Center Sentiment Analysis with Cortana Intelligence Suite</a:t>
+              <a:t>E.g. Contact Center Sentiment Analysis with Cortana Intelligence Suite</a:t>
             </a:r>
             <a:endParaRPr lang="EN-US" sz="2800" dirty="0">
               <a:solidFill>
@@ -16168,12 +16062,9 @@
 </file>
 
 <file path=customXml/item1.xml><?xml version="1.0" encoding="utf-8"?>
-<?mso-contentType ?>
-<FormTemplates xmlns="http://schemas.microsoft.com/sharepoint/v3/contenttype/forms">
-  <Display>DocumentLibraryForm</Display>
-  <Edit>DocumentLibraryForm</Edit>
-  <New>DocumentLibraryForm</New>
-</FormTemplates>
+<p:properties xmlns:p="http://schemas.microsoft.com/office/2006/metadata/properties" xmlns:xsi="http://www.w3.org/2001/XMLSchema-instance" xmlns:pc="http://schemas.microsoft.com/office/infopath/2007/PartnerControls">
+  <documentManagement/>
+</p:properties>
 </file>
 
 <file path=customXml/item2.xml><?xml version="1.0" encoding="utf-8"?>
@@ -16291,15 +16182,25 @@
 </file>
 
 <file path=customXml/item3.xml><?xml version="1.0" encoding="utf-8"?>
-<p:properties xmlns:p="http://schemas.microsoft.com/office/2006/metadata/properties" xmlns:xsi="http://www.w3.org/2001/XMLSchema-instance" xmlns:pc="http://schemas.microsoft.com/office/infopath/2007/PartnerControls">
-  <documentManagement/>
-</p:properties>
+<?mso-contentType ?>
+<FormTemplates xmlns="http://schemas.microsoft.com/sharepoint/v3/contenttype/forms">
+  <Display>DocumentLibraryForm</Display>
+  <Edit>DocumentLibraryForm</Edit>
+  <New>DocumentLibraryForm</New>
+</FormTemplates>
 </file>
 
 <file path=customXml/itemProps1.xml><?xml version="1.0" encoding="utf-8"?>
-<ds:datastoreItem xmlns:ds="http://schemas.openxmlformats.org/officeDocument/2006/customXml" ds:itemID="{1547E796-3336-4CA3-A039-C51122E80770}">
+<ds:datastoreItem xmlns:ds="http://schemas.openxmlformats.org/officeDocument/2006/customXml" ds:itemID="{2A7D4CEE-4A6E-444C-9F48-154C694282ED}">
   <ds:schemaRefs>
-    <ds:schemaRef ds:uri="http://schemas.microsoft.com/sharepoint/v3/contenttype/forms"/>
+    <ds:schemaRef ds:uri="http://purl.org/dc/dcmitype/"/>
+    <ds:schemaRef ds:uri="http://schemas.microsoft.com/office/infopath/2007/PartnerControls"/>
+    <ds:schemaRef ds:uri="http://purl.org/dc/elements/1.1/"/>
+    <ds:schemaRef ds:uri="http://schemas.microsoft.com/office/2006/metadata/properties"/>
+    <ds:schemaRef ds:uri="http://purl.org/dc/terms/"/>
+    <ds:schemaRef ds:uri="http://schemas.microsoft.com/office/2006/documentManagement/types"/>
+    <ds:schemaRef ds:uri="http://schemas.openxmlformats.org/package/2006/metadata/core-properties"/>
+    <ds:schemaRef ds:uri="http://www.w3.org/XML/1998/namespace"/>
   </ds:schemaRefs>
 </ds:datastoreItem>
 </file>
@@ -16321,16 +16222,9 @@
 </file>
 
 <file path=customXml/itemProps3.xml><?xml version="1.0" encoding="utf-8"?>
-<ds:datastoreItem xmlns:ds="http://schemas.openxmlformats.org/officeDocument/2006/customXml" ds:itemID="{2A7D4CEE-4A6E-444C-9F48-154C694282ED}">
+<ds:datastoreItem xmlns:ds="http://schemas.openxmlformats.org/officeDocument/2006/customXml" ds:itemID="{1547E796-3336-4CA3-A039-C51122E80770}">
   <ds:schemaRefs>
-    <ds:schemaRef ds:uri="http://purl.org/dc/dcmitype/"/>
-    <ds:schemaRef ds:uri="http://schemas.microsoft.com/office/infopath/2007/PartnerControls"/>
-    <ds:schemaRef ds:uri="http://purl.org/dc/elements/1.1/"/>
-    <ds:schemaRef ds:uri="http://schemas.microsoft.com/office/2006/metadata/properties"/>
-    <ds:schemaRef ds:uri="http://purl.org/dc/terms/"/>
-    <ds:schemaRef ds:uri="http://schemas.microsoft.com/office/2006/documentManagement/types"/>
-    <ds:schemaRef ds:uri="http://schemas.openxmlformats.org/package/2006/metadata/core-properties"/>
-    <ds:schemaRef ds:uri="http://www.w3.org/XML/1998/namespace"/>
+    <ds:schemaRef ds:uri="http://schemas.microsoft.com/sharepoint/v3/contenttype/forms"/>
   </ds:schemaRefs>
 </ds:datastoreItem>
 </file>
</xml_diff>

<commit_message>
Minor changes according to Eumar's final review comments
</commit_message>
<xml_diff>
--- a/Content/Starter Kit - Intelligent Apps & Analytics/0 - Starter Kit - Intelligent Apps & Analytics.pptx
+++ b/Content/Starter Kit - Intelligent Apps & Analytics/0 - Starter Kit - Intelligent Apps & Analytics.pptx
@@ -122,7 +122,7 @@
 
 <file path=ppt/commentAuthors.xml><?xml version="1.0" encoding="utf-8"?>
 <p:cmAuthorLst xmlns:a="http://schemas.openxmlformats.org/drawingml/2006/main" xmlns:r="http://schemas.openxmlformats.org/officeDocument/2006/relationships" xmlns:p="http://schemas.openxmlformats.org/presentationml/2006/main">
-  <p:cmAuthor id="1" name="Tracy Cai" initials="TC" lastIdx="1" clrIdx="0">
+  <p:cmAuthor id="1" name="Tracy Cai" initials="TC" lastIdx="8" clrIdx="0">
     <p:extLst>
       <p:ext uri="{19B8F6BF-5375-455C-9EA6-DF929625EA0E}">
         <p15:presenceInfo xmlns:p15="http://schemas.microsoft.com/office/powerpoint/2012/main" userId="S-1-5-21-2146773085-903363285-719344707-1398442" providerId="AD"/>
@@ -157,6 +157,17 @@
       </p:ext>
     </p:extLst>
   </p:cm>
+  <p:cm authorId="1" dt="2016-09-02T11:29:35.919" idx="2">
+    <p:pos x="4717" y="1968"/>
+    <p:text>added</p:text>
+    <p:extLst>
+      <p:ext uri="{C676402C-5697-4E1C-873F-D02D1690AC5C}">
+        <p15:threadingInfo xmlns:p15="http://schemas.microsoft.com/office/powerpoint/2012/main" timeZoneBias="-480">
+          <p15:parentCm authorId="2" idx="22"/>
+        </p15:threadingInfo>
+      </p:ext>
+    </p:extLst>
+  </p:cm>
   <p:cm authorId="2" dt="2016-08-31T21:52:03.285" idx="23">
     <p:pos x="7514" y="836"/>
     <p:text>Please, include in the High level Architecture what is used to load data into SQL Azure DW). E.g. On-Premises SSIS or Data Factory with Connector</p:text>
@@ -166,12 +177,34 @@
       </p:ext>
     </p:extLst>
   </p:cm>
+  <p:cm authorId="1" dt="2016-09-02T11:40:41.038" idx="3">
+    <p:pos x="7514" y="932"/>
+    <p:text>Add Polybase access.</p:text>
+    <p:extLst>
+      <p:ext uri="{C676402C-5697-4E1C-873F-D02D1690AC5C}">
+        <p15:threadingInfo xmlns:p15="http://schemas.microsoft.com/office/powerpoint/2012/main" timeZoneBias="-480">
+          <p15:parentCm authorId="2" idx="23"/>
+        </p15:threadingInfo>
+      </p:ext>
+    </p:extLst>
+  </p:cm>
   <p:cm authorId="2" dt="2016-08-31T21:53:19.974" idx="24">
     <p:pos x="973" y="1025"/>
     <p:text>Nice to have: refine 'The problem' to cover more data growth focused on different sources. E.g. Social Network, Device Explosion</p:text>
     <p:extLst>
       <p:ext uri="{C676402C-5697-4E1C-873F-D02D1690AC5C}">
         <p15:threadingInfo xmlns:p15="http://schemas.microsoft.com/office/powerpoint/2012/main" timeZoneBias="240"/>
+      </p:ext>
+    </p:extLst>
+  </p:cm>
+  <p:cm authorId="1" dt="2016-09-02T12:55:18.139" idx="8">
+    <p:pos x="973" y="1121"/>
+    <p:text>sure</p:text>
+    <p:extLst>
+      <p:ext uri="{C676402C-5697-4E1C-873F-D02D1690AC5C}">
+        <p15:threadingInfo xmlns:p15="http://schemas.microsoft.com/office/powerpoint/2012/main" timeZoneBias="-480">
+          <p15:parentCm authorId="2" idx="24"/>
+        </p15:threadingInfo>
       </p:ext>
     </p:extLst>
   </p:cm>
@@ -189,12 +222,34 @@
       </p:ext>
     </p:extLst>
   </p:cm>
+  <p:cm authorId="1" dt="2016-09-02T11:41:23.125" idx="5">
+    <p:pos x="10" y="106"/>
+    <p:text>Azure Machine Learning is covered in scenario 3. Also, removed Azure Data Factory based on the Nithish's comments.</p:text>
+    <p:extLst>
+      <p:ext uri="{C676402C-5697-4E1C-873F-D02D1690AC5C}">
+        <p15:threadingInfo xmlns:p15="http://schemas.microsoft.com/office/powerpoint/2012/main" timeZoneBias="-480">
+          <p15:parentCm authorId="2" idx="25"/>
+        </p15:threadingInfo>
+      </p:ext>
+    </p:extLst>
+  </p:cm>
   <p:cm authorId="2" dt="2016-08-31T21:55:29.013" idx="26">
     <p:pos x="106" y="106"/>
     <p:text>Please, include Price for Power Bi or Power BI Embedded</p:text>
     <p:extLst>
       <p:ext uri="{C676402C-5697-4E1C-873F-D02D1690AC5C}">
         <p15:threadingInfo xmlns:p15="http://schemas.microsoft.com/office/powerpoint/2012/main" timeZoneBias="240"/>
+      </p:ext>
+    </p:extLst>
+  </p:cm>
+  <p:cm authorId="1" dt="2016-09-02T11:40:47.401" idx="4">
+    <p:pos x="106" y="202"/>
+    <p:text>sure</p:text>
+    <p:extLst>
+      <p:ext uri="{C676402C-5697-4E1C-873F-D02D1690AC5C}">
+        <p15:threadingInfo xmlns:p15="http://schemas.microsoft.com/office/powerpoint/2012/main" timeZoneBias="-480">
+          <p15:parentCm authorId="2" idx="26"/>
+        </p15:threadingInfo>
       </p:ext>
     </p:extLst>
   </p:cm>
@@ -212,6 +267,17 @@
       </p:ext>
     </p:extLst>
   </p:cm>
+  <p:cm authorId="1" dt="2016-09-02T11:47:36.020" idx="7">
+    <p:pos x="10" y="106"/>
+    <p:text>sure</p:text>
+    <p:extLst>
+      <p:ext uri="{C676402C-5697-4E1C-873F-D02D1690AC5C}">
+        <p15:threadingInfo xmlns:p15="http://schemas.microsoft.com/office/powerpoint/2012/main" timeZoneBias="-480">
+          <p15:parentCm authorId="2" idx="27"/>
+        </p15:threadingInfo>
+      </p:ext>
+    </p:extLst>
+  </p:cm>
 </p:cmLst>
 </file>
 
@@ -223,6 +289,17 @@
     <p:extLst>
       <p:ext uri="{C676402C-5697-4E1C-873F-D02D1690AC5C}">
         <p15:threadingInfo xmlns:p15="http://schemas.microsoft.com/office/powerpoint/2012/main" timeZoneBias="240"/>
+      </p:ext>
+    </p:extLst>
+  </p:cm>
+  <p:cm authorId="1" dt="2016-09-02T11:47:29.502" idx="6">
+    <p:pos x="10" y="106"/>
+    <p:text>sure</p:text>
+    <p:extLst>
+      <p:ext uri="{C676402C-5697-4E1C-873F-D02D1690AC5C}">
+        <p15:threadingInfo xmlns:p15="http://schemas.microsoft.com/office/powerpoint/2012/main" timeZoneBias="-480">
+          <p15:parentCm authorId="2" idx="28"/>
+        </p15:threadingInfo>
       </p:ext>
     </p:extLst>
   </p:cm>
@@ -311,7 +388,7 @@
           <a:p>
             <a:fld id="{386A5666-4B6A-423A-AB1B-8D7E7E0D4931}" type="datetimeFigureOut">
               <a:rPr lang="en-US" smtClean="0"/>
-              <a:t>31-Aug-16</a:t>
+              <a:t>9/2/2016</a:t>
             </a:fld>
             <a:endParaRPr lang="en-US"/>
           </a:p>
@@ -1871,7 +1948,7 @@
           <a:p>
             <a:fld id="{DD6EF947-8D9F-492B-9CF5-9DCF2EF799ED}" type="datetimeFigureOut">
               <a:rPr lang="en-US" smtClean="0"/>
-              <a:t>31-Aug-16</a:t>
+              <a:t>9/2/2016</a:t>
             </a:fld>
             <a:endParaRPr lang="en-US"/>
           </a:p>
@@ -2039,7 +2116,7 @@
           <a:p>
             <a:fld id="{DD6EF947-8D9F-492B-9CF5-9DCF2EF799ED}" type="datetimeFigureOut">
               <a:rPr lang="en-US" smtClean="0"/>
-              <a:t>31-Aug-16</a:t>
+              <a:t>9/2/2016</a:t>
             </a:fld>
             <a:endParaRPr lang="en-US"/>
           </a:p>
@@ -2217,7 +2294,7 @@
           <a:p>
             <a:fld id="{DD6EF947-8D9F-492B-9CF5-9DCF2EF799ED}" type="datetimeFigureOut">
               <a:rPr lang="en-US" smtClean="0"/>
-              <a:t>31-Aug-16</a:t>
+              <a:t>9/2/2016</a:t>
             </a:fld>
             <a:endParaRPr lang="en-US"/>
           </a:p>
@@ -2569,7 +2646,7 @@
           <a:p>
             <a:fld id="{DD6EF947-8D9F-492B-9CF5-9DCF2EF799ED}" type="datetimeFigureOut">
               <a:rPr lang="en-US" smtClean="0"/>
-              <a:t>31-Aug-16</a:t>
+              <a:t>9/2/2016</a:t>
             </a:fld>
             <a:endParaRPr lang="en-US"/>
           </a:p>
@@ -2814,7 +2891,7 @@
           <a:p>
             <a:fld id="{DD6EF947-8D9F-492B-9CF5-9DCF2EF799ED}" type="datetimeFigureOut">
               <a:rPr lang="en-US" smtClean="0"/>
-              <a:t>31-Aug-16</a:t>
+              <a:t>9/2/2016</a:t>
             </a:fld>
             <a:endParaRPr lang="en-US"/>
           </a:p>
@@ -3043,7 +3120,7 @@
           <a:p>
             <a:fld id="{DD6EF947-8D9F-492B-9CF5-9DCF2EF799ED}" type="datetimeFigureOut">
               <a:rPr lang="en-US" smtClean="0"/>
-              <a:t>31-Aug-16</a:t>
+              <a:t>9/2/2016</a:t>
             </a:fld>
             <a:endParaRPr lang="en-US"/>
           </a:p>
@@ -3407,7 +3484,7 @@
           <a:p>
             <a:fld id="{DD6EF947-8D9F-492B-9CF5-9DCF2EF799ED}" type="datetimeFigureOut">
               <a:rPr lang="en-US" smtClean="0"/>
-              <a:t>31-Aug-16</a:t>
+              <a:t>9/2/2016</a:t>
             </a:fld>
             <a:endParaRPr lang="en-US"/>
           </a:p>
@@ -3524,7 +3601,7 @@
           <a:p>
             <a:fld id="{DD6EF947-8D9F-492B-9CF5-9DCF2EF799ED}" type="datetimeFigureOut">
               <a:rPr lang="en-US" smtClean="0"/>
-              <a:t>31-Aug-16</a:t>
+              <a:t>9/2/2016</a:t>
             </a:fld>
             <a:endParaRPr lang="en-US"/>
           </a:p>
@@ -3619,7 +3696,7 @@
           <a:p>
             <a:fld id="{DD6EF947-8D9F-492B-9CF5-9DCF2EF799ED}" type="datetimeFigureOut">
               <a:rPr lang="en-US" smtClean="0"/>
-              <a:t>31-Aug-16</a:t>
+              <a:t>9/2/2016</a:t>
             </a:fld>
             <a:endParaRPr lang="en-US"/>
           </a:p>
@@ -3894,7 +3971,7 @@
           <a:p>
             <a:fld id="{DD6EF947-8D9F-492B-9CF5-9DCF2EF799ED}" type="datetimeFigureOut">
               <a:rPr lang="en-US" smtClean="0"/>
-              <a:t>31-Aug-16</a:t>
+              <a:t>9/2/2016</a:t>
             </a:fld>
             <a:endParaRPr lang="en-US"/>
           </a:p>
@@ -4146,7 +4223,7 @@
           <a:p>
             <a:fld id="{DD6EF947-8D9F-492B-9CF5-9DCF2EF799ED}" type="datetimeFigureOut">
               <a:rPr lang="en-US" smtClean="0"/>
-              <a:t>31-Aug-16</a:t>
+              <a:t>9/2/2016</a:t>
             </a:fld>
             <a:endParaRPr lang="en-US"/>
           </a:p>
@@ -4357,7 +4434,7 @@
           <a:p>
             <a:fld id="{DD6EF947-8D9F-492B-9CF5-9DCF2EF799ED}" type="datetimeFigureOut">
               <a:rPr lang="en-US" smtClean="0"/>
-              <a:t>31-Aug-16</a:t>
+              <a:t>9/2/2016</a:t>
             </a:fld>
             <a:endParaRPr lang="en-US"/>
           </a:p>
@@ -5173,7 +5250,7 @@
                   <a:prstClr val="white"/>
                 </a:solidFill>
               </a:rPr>
-              <a:t>Today businesses are collecting more information than ever before in their data warehousing environment. Power BI addresses common business intelligence challenges that an organization may face:</a:t>
+              <a:t>Today businesses are collecting more information than ever before in their data warehousing environment. Power BI with Azure SQL Data Warehouse addresses common business intelligence challenges that an organization may face:</a:t>
             </a:r>
           </a:p>
           <a:p>
@@ -5202,7 +5279,7 @@
                   <a:prstClr val="white"/>
                 </a:solidFill>
               </a:rPr>
-              <a:t>Not able to change the compute and storage resources based on needs. </a:t>
+              <a:t>Not able to change the compute and storage. resources based on needs. </a:t>
             </a:r>
           </a:p>
           <a:p>
@@ -5213,6 +5290,14 @@
               <a:buFont typeface="Arial" panose="020B0604020202020204" pitchFamily="34" charset="0"/>
               <a:buChar char="•"/>
             </a:pPr>
+            <a:r>
+              <a:rPr lang="en-US" altLang="zh-CN" sz="1300" dirty="0">
+                <a:solidFill>
+                  <a:prstClr val="white"/>
+                </a:solidFill>
+              </a:rPr>
+              <a:t>Data growth rapidly due to different sources such as Social Network, Device Explosion.</a:t>
+            </a:r>
             <a:endParaRPr lang="en-US" sz="1300" dirty="0">
               <a:solidFill>
                 <a:prstClr val="white"/>
@@ -5235,20 +5320,6 @@
               </a:rPr>
               <a:t>Long-running queries may take hours or even days to run, and tax the compute and storage resources of a SQL Server instance.</a:t>
             </a:r>
-          </a:p>
-          <a:p>
-            <a:pPr marL="285750" lvl="0" indent="-285750">
-              <a:lnSpc>
-                <a:spcPct val="90000"/>
-              </a:lnSpc>
-              <a:buFont typeface="Arial" panose="020B0604020202020204" pitchFamily="34" charset="0"/>
-              <a:buChar char="•"/>
-            </a:pPr>
-            <a:endParaRPr lang="en-US" sz="1300" dirty="0">
-              <a:solidFill>
-                <a:prstClr val="white"/>
-              </a:solidFill>
-            </a:endParaRPr>
           </a:p>
           <a:p>
             <a:pPr marL="285750" lvl="0" indent="-285750">
@@ -5416,7 +5487,7 @@
         <p:spPr>
           <a:xfrm>
             <a:off x="5825481" y="942678"/>
-            <a:ext cx="2789996" cy="3156596"/>
+            <a:ext cx="2789996" cy="4098392"/>
           </a:xfrm>
           <a:prstGeom prst="rect">
             <a:avLst/>
@@ -5621,11 +5692,112 @@
               </a:rPr>
               <a:t>Total : U$ 29,971.44/ Year</a:t>
             </a:r>
+          </a:p>
+          <a:p>
+            <a:pPr marL="742950" lvl="1" indent="-285750">
+              <a:lnSpc>
+                <a:spcPct val="90000"/>
+              </a:lnSpc>
+              <a:buFont typeface="Wingdings" panose="05000000000000000000" pitchFamily="2" charset="2"/>
+              <a:buChar char="ü"/>
+            </a:pPr>
             <a:endParaRPr lang="en-US" sz="1200" b="1" dirty="0">
               <a:solidFill>
                 <a:schemeClr val="bg1"/>
               </a:solidFill>
               <a:sym typeface="Wingdings" panose="05000000000000000000" pitchFamily="2" charset="2"/>
+            </a:endParaRPr>
+          </a:p>
+          <a:p>
+            <a:pPr marL="171450" indent="-171450">
+              <a:lnSpc>
+                <a:spcPct val="90000"/>
+              </a:lnSpc>
+              <a:buFont typeface="Arial" panose="020B0604020202020204" pitchFamily="34" charset="0"/>
+              <a:buChar char="•"/>
+            </a:pPr>
+            <a:r>
+              <a:rPr lang="en-US" sz="1100" i="1" dirty="0">
+                <a:solidFill>
+                  <a:schemeClr val="bg1"/>
+                </a:solidFill>
+              </a:rPr>
+              <a:t>   Power BI Pro : $9.99 /User/Month</a:t>
+            </a:r>
+          </a:p>
+          <a:p>
+            <a:pPr marL="171450" indent="-171450">
+              <a:lnSpc>
+                <a:spcPct val="90000"/>
+              </a:lnSpc>
+              <a:buFont typeface="Arial" panose="020B0604020202020204" pitchFamily="34" charset="0"/>
+              <a:buChar char="•"/>
+            </a:pPr>
+            <a:endParaRPr lang="en-US" sz="1100" i="1" dirty="0">
+              <a:solidFill>
+                <a:schemeClr val="bg1"/>
+              </a:solidFill>
+            </a:endParaRPr>
+          </a:p>
+          <a:p>
+            <a:pPr marL="742950" lvl="1" indent="-285750">
+              <a:lnSpc>
+                <a:spcPct val="90000"/>
+              </a:lnSpc>
+              <a:buFont typeface="Wingdings" panose="05000000000000000000" pitchFamily="2" charset="2"/>
+              <a:buChar char="ü"/>
+            </a:pPr>
+            <a:r>
+              <a:rPr lang="en-US" sz="1200" b="1" dirty="0">
+                <a:solidFill>
+                  <a:schemeClr val="bg1"/>
+                </a:solidFill>
+              </a:rPr>
+              <a:t>Total : $ 119.88/U</a:t>
+            </a:r>
+            <a:r>
+              <a:rPr lang="en-US" altLang="zh-CN" sz="1200" b="1" dirty="0">
+                <a:solidFill>
+                  <a:schemeClr val="bg1"/>
+                </a:solidFill>
+              </a:rPr>
+              <a:t>ser/</a:t>
+            </a:r>
+            <a:r>
+              <a:rPr lang="en-US" sz="1200" b="1" dirty="0">
+                <a:solidFill>
+                  <a:schemeClr val="bg1"/>
+                </a:solidFill>
+              </a:rPr>
+              <a:t>Year</a:t>
+            </a:r>
+          </a:p>
+          <a:p>
+            <a:pPr marL="171450" indent="-171450">
+              <a:lnSpc>
+                <a:spcPct val="90000"/>
+              </a:lnSpc>
+              <a:buFont typeface="Arial" panose="020B0604020202020204" pitchFamily="34" charset="0"/>
+              <a:buChar char="•"/>
+            </a:pPr>
+            <a:endParaRPr lang="en-US" sz="1100" i="1" dirty="0">
+              <a:solidFill>
+                <a:schemeClr val="bg1"/>
+              </a:solidFill>
+            </a:endParaRPr>
+          </a:p>
+          <a:p>
+            <a:pPr marL="171450" indent="-171450">
+              <a:lnSpc>
+                <a:spcPct val="90000"/>
+              </a:lnSpc>
+              <a:buFont typeface="Arial" panose="020B0604020202020204" pitchFamily="34" charset="0"/>
+              <a:buChar char="•"/>
+            </a:pPr>
+            <a:endParaRPr lang="en-US" sz="1100" i="1" dirty="0">
+              <a:solidFill>
+                <a:schemeClr val="bg1"/>
+              </a:solidFill>
             </a:endParaRPr>
           </a:p>
           <a:p>
@@ -6964,6 +7136,36 @@
           </a:p>
         </p:txBody>
       </p:sp>
+      <p:sp>
+        <p:nvSpPr>
+          <p:cNvPr id="37" name="TextBox 36"/>
+          <p:cNvSpPr txBox="1"/>
+          <p:nvPr/>
+        </p:nvSpPr>
+        <p:spPr>
+          <a:xfrm>
+            <a:off x="10013938" y="3352130"/>
+            <a:ext cx="1079074" cy="200055"/>
+          </a:xfrm>
+          <a:prstGeom prst="rect">
+            <a:avLst/>
+          </a:prstGeom>
+          <a:noFill/>
+        </p:spPr>
+        <p:txBody>
+          <a:bodyPr wrap="square" rtlCol="0">
+            <a:spAutoFit/>
+          </a:bodyPr>
+          <a:lstStyle/>
+          <a:p>
+            <a:r>
+              <a:rPr lang="en-US" altLang="zh-CN" sz="700" dirty="0"/>
+              <a:t>Polybase Access</a:t>
+            </a:r>
+            <a:endParaRPr lang="en-US" sz="700" dirty="0"/>
+          </a:p>
+        </p:txBody>
+      </p:sp>
     </p:spTree>
     <p:extLst>
       <p:ext uri="{BB962C8B-B14F-4D97-AF65-F5344CB8AC3E}">
@@ -7615,7 +7817,7 @@
         <p:spPr>
           <a:xfrm>
             <a:off x="3107639" y="850884"/>
-            <a:ext cx="2579950" cy="5995835"/>
+            <a:ext cx="2579950" cy="4832439"/>
           </a:xfrm>
           <a:prstGeom prst="rect">
             <a:avLst/>
@@ -7676,7 +7878,7 @@
                   <a:schemeClr val="bg1"/>
                 </a:solidFill>
               </a:rPr>
-              <a:t>Microsoft provides the Power BI service to quickly create self-service online reports. Also, Azure Data Factory is a globally deployed data movement service in the cloud. Use it to easily ingest data from multiple on-premises and cloud-based sources. You pay for what you use and no more:</a:t>
+              <a:t>Microsoft provides the Power BI service to quickly create self-service online reports. And you pay for what you use and no more:</a:t>
             </a:r>
           </a:p>
           <a:p>
@@ -7782,7 +7984,7 @@
         <p:spPr>
           <a:xfrm>
             <a:off x="5817863" y="845996"/>
-            <a:ext cx="2818824" cy="2685698"/>
+            <a:ext cx="2818824" cy="3322795"/>
           </a:xfrm>
           <a:prstGeom prst="rect">
             <a:avLst/>
@@ -7964,6 +8166,84 @@
                 </a:solidFill>
               </a:rPr>
               <a:t>Total : U$ 19,168.56/ Year</a:t>
+            </a:r>
+          </a:p>
+          <a:p>
+            <a:pPr marL="742950" lvl="1" indent="-285750">
+              <a:lnSpc>
+                <a:spcPct val="90000"/>
+              </a:lnSpc>
+              <a:buFont typeface="Wingdings" panose="05000000000000000000" pitchFamily="2" charset="2"/>
+              <a:buChar char="ü"/>
+            </a:pPr>
+            <a:endParaRPr lang="en-US" sz="1200" b="1" dirty="0">
+              <a:solidFill>
+                <a:prstClr val="white"/>
+              </a:solidFill>
+            </a:endParaRPr>
+          </a:p>
+          <a:p>
+            <a:pPr marL="171450" indent="-171450">
+              <a:lnSpc>
+                <a:spcPct val="90000"/>
+              </a:lnSpc>
+              <a:buFont typeface="Arial" panose="020B0604020202020204" pitchFamily="34" charset="0"/>
+              <a:buChar char="•"/>
+            </a:pPr>
+            <a:r>
+              <a:rPr lang="en-US" sz="1100" i="1" dirty="0">
+                <a:solidFill>
+                  <a:schemeClr val="bg1"/>
+                </a:solidFill>
+              </a:rPr>
+              <a:t> Power BI Pro : $9.99 /User/Month</a:t>
+            </a:r>
+          </a:p>
+          <a:p>
+            <a:pPr marL="171450" indent="-171450">
+              <a:lnSpc>
+                <a:spcPct val="90000"/>
+              </a:lnSpc>
+              <a:buFont typeface="Arial" panose="020B0604020202020204" pitchFamily="34" charset="0"/>
+              <a:buChar char="•"/>
+            </a:pPr>
+            <a:endParaRPr lang="en-US" sz="1100" i="1" dirty="0">
+              <a:solidFill>
+                <a:schemeClr val="bg1"/>
+              </a:solidFill>
+            </a:endParaRPr>
+          </a:p>
+          <a:p>
+            <a:pPr marL="742950" lvl="1" indent="-285750">
+              <a:lnSpc>
+                <a:spcPct val="90000"/>
+              </a:lnSpc>
+              <a:buFont typeface="Wingdings" panose="05000000000000000000" pitchFamily="2" charset="2"/>
+              <a:buChar char="ü"/>
+            </a:pPr>
+            <a:r>
+              <a:rPr lang="en-US" sz="1200" b="1" dirty="0">
+                <a:solidFill>
+                  <a:schemeClr val="bg1"/>
+                </a:solidFill>
+              </a:rPr>
+              <a:t>Total : $ 119.88/U</a:t>
+            </a:r>
+            <a:r>
+              <a:rPr lang="en-US" altLang="zh-CN" sz="1200" b="1" dirty="0">
+                <a:solidFill>
+                  <a:schemeClr val="bg1"/>
+                </a:solidFill>
+              </a:rPr>
+              <a:t>ser/</a:t>
+            </a:r>
+            <a:r>
+              <a:rPr lang="en-US" sz="1200" b="1" dirty="0">
+                <a:solidFill>
+                  <a:schemeClr val="bg1"/>
+                </a:solidFill>
+              </a:rPr>
+              <a:t>Year</a:t>
             </a:r>
             <a:endParaRPr lang="en-US" sz="1200" b="1" dirty="0">
               <a:solidFill>
@@ -9823,7 +10103,7 @@
         </p:nvSpPr>
         <p:spPr>
           <a:xfrm>
-            <a:off x="5794043" y="5001858"/>
+            <a:off x="5750054" y="5270957"/>
             <a:ext cx="3207545" cy="1259154"/>
           </a:xfrm>
           <a:prstGeom prst="rect">
@@ -10269,7 +10549,7 @@
         <p:spPr>
           <a:xfrm>
             <a:off x="5782624" y="845769"/>
-            <a:ext cx="2893111" cy="3752144"/>
+            <a:ext cx="2893111" cy="4389241"/>
           </a:xfrm>
           <a:prstGeom prst="rect">
             <a:avLst/>
@@ -10560,6 +10840,84 @@
                 </a:solidFill>
               </a:rPr>
               <a:t>Total : U$  27,108.48/ Year</a:t>
+            </a:r>
+          </a:p>
+          <a:p>
+            <a:pPr marL="742950" lvl="1" indent="-285750">
+              <a:lnSpc>
+                <a:spcPct val="90000"/>
+              </a:lnSpc>
+              <a:buFont typeface="Wingdings" panose="05000000000000000000" pitchFamily="2" charset="2"/>
+              <a:buChar char="ü"/>
+            </a:pPr>
+            <a:endParaRPr lang="en-US" sz="1200" b="1" dirty="0">
+              <a:solidFill>
+                <a:schemeClr val="bg1"/>
+              </a:solidFill>
+            </a:endParaRPr>
+          </a:p>
+          <a:p>
+            <a:pPr marL="171450" indent="-171450">
+              <a:lnSpc>
+                <a:spcPct val="90000"/>
+              </a:lnSpc>
+              <a:buFont typeface="Arial" panose="020B0604020202020204" pitchFamily="34" charset="0"/>
+              <a:buChar char="•"/>
+            </a:pPr>
+            <a:r>
+              <a:rPr lang="en-US" sz="1100" i="1" dirty="0">
+                <a:solidFill>
+                  <a:schemeClr val="bg1"/>
+                </a:solidFill>
+              </a:rPr>
+              <a:t> Power BI Pro : $9.99 /User/Month</a:t>
+            </a:r>
+          </a:p>
+          <a:p>
+            <a:pPr marL="171450" indent="-171450">
+              <a:lnSpc>
+                <a:spcPct val="90000"/>
+              </a:lnSpc>
+              <a:buFont typeface="Arial" panose="020B0604020202020204" pitchFamily="34" charset="0"/>
+              <a:buChar char="•"/>
+            </a:pPr>
+            <a:endParaRPr lang="en-US" sz="1100" i="1" dirty="0">
+              <a:solidFill>
+                <a:schemeClr val="bg1"/>
+              </a:solidFill>
+            </a:endParaRPr>
+          </a:p>
+          <a:p>
+            <a:pPr marL="742950" lvl="1" indent="-285750">
+              <a:lnSpc>
+                <a:spcPct val="90000"/>
+              </a:lnSpc>
+              <a:buFont typeface="Wingdings" panose="05000000000000000000" pitchFamily="2" charset="2"/>
+              <a:buChar char="ü"/>
+            </a:pPr>
+            <a:r>
+              <a:rPr lang="en-US" sz="1200" b="1" dirty="0">
+                <a:solidFill>
+                  <a:schemeClr val="bg1"/>
+                </a:solidFill>
+              </a:rPr>
+              <a:t>Total : $ 119.88/U</a:t>
+            </a:r>
+            <a:r>
+              <a:rPr lang="en-US" altLang="zh-CN" sz="1200" b="1" dirty="0">
+                <a:solidFill>
+                  <a:schemeClr val="bg1"/>
+                </a:solidFill>
+              </a:rPr>
+              <a:t>ser/</a:t>
+            </a:r>
+            <a:r>
+              <a:rPr lang="en-US" sz="1200" b="1" dirty="0">
+                <a:solidFill>
+                  <a:schemeClr val="bg1"/>
+                </a:solidFill>
+              </a:rPr>
+              <a:t>Year</a:t>
             </a:r>
             <a:endParaRPr lang="en-US" sz="1200" b="1" dirty="0">
               <a:solidFill>
@@ -12527,7 +12885,7 @@
         </p:nvSpPr>
         <p:spPr>
           <a:xfrm>
-            <a:off x="5811252" y="5001858"/>
+            <a:off x="5769000" y="5454365"/>
             <a:ext cx="3190336" cy="1259154"/>
           </a:xfrm>
           <a:prstGeom prst="rect">
@@ -12809,7 +13167,7 @@
         <p:spPr>
           <a:xfrm>
             <a:off x="3162839" y="850884"/>
-            <a:ext cx="2524750" cy="5234088"/>
+            <a:ext cx="2524750" cy="6203584"/>
           </a:xfrm>
           <a:prstGeom prst="rect">
             <a:avLst/>
@@ -12870,20 +13228,8 @@
                   <a:schemeClr val="bg1"/>
                 </a:solidFill>
               </a:rPr>
-              <a:t>Azure Data Factory, built from the ground up for scale and performance, is a globally deployed data movement service that resides in the cloud and can be used to easily ingest data from multiple on-premises and cloud-based sources.</a:t>
-            </a:r>
-            <a:br>
-              <a:rPr lang="en-US" sz="1400" dirty="0">
-                <a:solidFill>
-                  <a:schemeClr val="bg1"/>
-                </a:solidFill>
-              </a:rPr>
-            </a:br>
-            <a:endParaRPr lang="en-US" sz="1400" dirty="0">
-              <a:solidFill>
-                <a:schemeClr val="bg1"/>
-              </a:solidFill>
-            </a:endParaRPr>
+              <a:t>Azure Data Factory, built from the ground up for scale and performance, is a globally deployed data movement service that resides in the cloud and can be used to easily ingest data from multiple on-premises and cloud-based sources. Also, Azure Data Lake was built on Apache YARN that dynamically scales so you can focus on your business goals, not on distributed infrastructure.</a:t>
+            </a:r>
           </a:p>
           <a:p>
             <a:pPr marL="285750" lvl="0" indent="-285750">
@@ -13015,7 +13361,7 @@
         <p:spPr>
           <a:xfrm>
             <a:off x="5846993" y="845995"/>
-            <a:ext cx="2856453" cy="4236892"/>
+            <a:ext cx="2856453" cy="4721640"/>
           </a:xfrm>
           <a:prstGeom prst="rect">
             <a:avLst/>
@@ -13339,23 +13685,85 @@
                   <a:schemeClr val="bg1"/>
                 </a:solidFill>
               </a:rPr>
-              <a:t>Total : U</a:t>
-            </a:r>
-            <a:r>
-              <a:rPr lang="en-US" sz="1200" b="1">
+              <a:t>Total : U$ 48,815.64 / Year</a:t>
+            </a:r>
+          </a:p>
+          <a:p>
+            <a:pPr marL="742950" lvl="1" indent="-285750">
+              <a:lnSpc>
+                <a:spcPct val="90000"/>
+              </a:lnSpc>
+              <a:buFont typeface="Wingdings" panose="05000000000000000000" pitchFamily="2" charset="2"/>
+              <a:buChar char="ü"/>
+            </a:pPr>
+            <a:endParaRPr lang="en-US" sz="1200" b="1" dirty="0">
+              <a:solidFill>
+                <a:schemeClr val="bg1"/>
+              </a:solidFill>
+            </a:endParaRPr>
+          </a:p>
+          <a:p>
+            <a:pPr marL="171450" indent="-171450">
+              <a:lnSpc>
+                <a:spcPct val="90000"/>
+              </a:lnSpc>
+              <a:buFont typeface="Arial" panose="020B0604020202020204" pitchFamily="34" charset="0"/>
+              <a:buChar char="•"/>
+            </a:pPr>
+            <a:r>
+              <a:rPr lang="en-US" sz="1100" i="1" dirty="0">
                 <a:solidFill>
                   <a:schemeClr val="bg1"/>
                 </a:solidFill>
               </a:rPr>
-              <a:t>$ 48,815.64 </a:t>
-            </a:r>
+              <a:t> Power BI Pro : $9.99 /User/Month</a:t>
+            </a:r>
+          </a:p>
+          <a:p>
+            <a:pPr marL="171450" indent="-171450">
+              <a:lnSpc>
+                <a:spcPct val="90000"/>
+              </a:lnSpc>
+              <a:buFont typeface="Arial" panose="020B0604020202020204" pitchFamily="34" charset="0"/>
+              <a:buChar char="•"/>
+            </a:pPr>
+            <a:endParaRPr lang="en-US" sz="1100" i="1" dirty="0">
+              <a:solidFill>
+                <a:schemeClr val="bg1"/>
+              </a:solidFill>
+            </a:endParaRPr>
+          </a:p>
+          <a:p>
+            <a:pPr marL="742950" lvl="1" indent="-285750">
+              <a:lnSpc>
+                <a:spcPct val="90000"/>
+              </a:lnSpc>
+              <a:buFont typeface="Wingdings" panose="05000000000000000000" pitchFamily="2" charset="2"/>
+              <a:buChar char="ü"/>
+            </a:pPr>
             <a:r>
               <a:rPr lang="en-US" sz="1200" b="1" dirty="0">
                 <a:solidFill>
                   <a:schemeClr val="bg1"/>
                 </a:solidFill>
               </a:rPr>
-              <a:t>/ Year</a:t>
+              <a:t>Total : $ 119.88/U</a:t>
+            </a:r>
+            <a:r>
+              <a:rPr lang="en-US" altLang="zh-CN" sz="1200" b="1" dirty="0">
+                <a:solidFill>
+                  <a:schemeClr val="bg1"/>
+                </a:solidFill>
+              </a:rPr>
+              <a:t>ser/</a:t>
+            </a:r>
+            <a:r>
+              <a:rPr lang="en-US" sz="1200" b="1" dirty="0">
+                <a:solidFill>
+                  <a:schemeClr val="bg1"/>
+                </a:solidFill>
+              </a:rPr>
+              <a:t>Year</a:t>
             </a:r>
             <a:endParaRPr lang="en-US" sz="1200" b="1" dirty="0">
               <a:solidFill>
@@ -13374,8 +13782,8 @@
         </p:nvSpPr>
         <p:spPr>
           <a:xfrm>
-            <a:off x="5763625" y="6138509"/>
-            <a:ext cx="5860102" cy="649756"/>
+            <a:off x="5660787" y="6442264"/>
+            <a:ext cx="6504411" cy="483557"/>
           </a:xfrm>
           <a:prstGeom prst="rect">
             <a:avLst/>
@@ -14090,7 +14498,7 @@
         </p:blipFill>
         <p:spPr>
           <a:xfrm>
-            <a:off x="3726313" y="5741397"/>
+            <a:off x="4668091" y="6023660"/>
             <a:ext cx="1485966" cy="949760"/>
           </a:xfrm>
           <a:prstGeom prst="rect">
@@ -16068,18 +16476,66 @@
 </file>
 
 <file path=customXml/item2.xml><?xml version="1.0" encoding="utf-8"?>
-<ct:contentTypeSchema xmlns:ct="http://schemas.microsoft.com/office/2006/metadata/contentType" xmlns:ma="http://schemas.microsoft.com/office/2006/metadata/properties/metaAttributes" ct:_="" ma:_="" ma:contentTypeName="Document" ma:contentTypeID="0x0101003734BFCAE61E284A9DB5E8B22C2518DA" ma:contentTypeVersion="0" ma:contentTypeDescription="Create a new document." ma:contentTypeScope="" ma:versionID="2a73f378ed23ae964c71fe05cea029d6">
-  <xsd:schema xmlns:xsd="http://www.w3.org/2001/XMLSchema" xmlns:xs="http://www.w3.org/2001/XMLSchema" xmlns:p="http://schemas.microsoft.com/office/2006/metadata/properties" targetNamespace="http://schemas.microsoft.com/office/2006/metadata/properties" ma:root="true" ma:fieldsID="abc59ee2edf01cfb808cadb27e045d28">
+<ct:contentTypeSchema xmlns:ct="http://schemas.microsoft.com/office/2006/metadata/contentType" xmlns:ma="http://schemas.microsoft.com/office/2006/metadata/properties/metaAttributes" ct:_="" ma:_="" ma:contentTypeName="Document" ma:contentTypeID="0x0101003734BFCAE61E284A9DB5E8B22C2518DA" ma:contentTypeVersion="4" ma:contentTypeDescription="Create a new document." ma:contentTypeScope="" ma:versionID="cf4c2a3dedd653c99ed12de59803d56f">
+  <xsd:schema xmlns:xsd="http://www.w3.org/2001/XMLSchema" xmlns:xs="http://www.w3.org/2001/XMLSchema" xmlns:p="http://schemas.microsoft.com/office/2006/metadata/properties" xmlns:ns2="2236beb2-6ab0-47c5-924d-6a813a677bfd" targetNamespace="http://schemas.microsoft.com/office/2006/metadata/properties" ma:root="true" ma:fieldsID="aa7890fd1e16f294e6b0dd7b5be04cef" ns2:_="">
+    <xsd:import namespace="2236beb2-6ab0-47c5-924d-6a813a677bfd"/>
     <xsd:element name="properties">
       <xsd:complexType>
         <xsd:sequence>
           <xsd:element name="documentManagement">
             <xsd:complexType>
-              <xsd:all/>
+              <xsd:all>
+                <xsd:element ref="ns2:SharedWithUsers" minOccurs="0"/>
+                <xsd:element ref="ns2:SharedWithDetails" minOccurs="0"/>
+                <xsd:element ref="ns2:LastSharedByUser" minOccurs="0"/>
+                <xsd:element ref="ns2:LastSharedByTime" minOccurs="0"/>
+              </xsd:all>
             </xsd:complexType>
           </xsd:element>
         </xsd:sequence>
       </xsd:complexType>
+    </xsd:element>
+  </xsd:schema>
+  <xsd:schema xmlns:xsd="http://www.w3.org/2001/XMLSchema" xmlns:xs="http://www.w3.org/2001/XMLSchema" xmlns:dms="http://schemas.microsoft.com/office/2006/documentManagement/types" xmlns:pc="http://schemas.microsoft.com/office/infopath/2007/PartnerControls" targetNamespace="2236beb2-6ab0-47c5-924d-6a813a677bfd" elementFormDefault="qualified">
+    <xsd:import namespace="http://schemas.microsoft.com/office/2006/documentManagement/types"/>
+    <xsd:import namespace="http://schemas.microsoft.com/office/infopath/2007/PartnerControls"/>
+    <xsd:element name="SharedWithUsers" ma:index="8" nillable="true" ma:displayName="Shared With" ma:description="" ma:internalName="SharedWithUsers" ma:readOnly="true">
+      <xsd:complexType>
+        <xsd:complexContent>
+          <xsd:extension base="dms:UserMulti">
+            <xsd:sequence>
+              <xsd:element name="UserInfo" minOccurs="0" maxOccurs="unbounded">
+                <xsd:complexType>
+                  <xsd:sequence>
+                    <xsd:element name="DisplayName" type="xsd:string" minOccurs="0"/>
+                    <xsd:element name="AccountId" type="dms:UserId" minOccurs="0" nillable="true"/>
+                    <xsd:element name="AccountType" type="xsd:string" minOccurs="0"/>
+                  </xsd:sequence>
+                </xsd:complexType>
+              </xsd:element>
+            </xsd:sequence>
+          </xsd:extension>
+        </xsd:complexContent>
+      </xsd:complexType>
+    </xsd:element>
+    <xsd:element name="SharedWithDetails" ma:index="9" nillable="true" ma:displayName="Shared With Details" ma:description="" ma:internalName="SharedWithDetails" ma:readOnly="true">
+      <xsd:simpleType>
+        <xsd:restriction base="dms:Note">
+          <xsd:maxLength value="255"/>
+        </xsd:restriction>
+      </xsd:simpleType>
+    </xsd:element>
+    <xsd:element name="LastSharedByUser" ma:index="10" nillable="true" ma:displayName="Last Shared By User" ma:description="" ma:internalName="LastSharedByUser" ma:readOnly="true">
+      <xsd:simpleType>
+        <xsd:restriction base="dms:Note">
+          <xsd:maxLength value="255"/>
+        </xsd:restriction>
+      </xsd:simpleType>
+    </xsd:element>
+    <xsd:element name="LastSharedByTime" ma:index="11" nillable="true" ma:displayName="Last Shared By Time" ma:description="" ma:internalName="LastSharedByTime" ma:readOnly="true">
+      <xsd:simpleType>
+        <xsd:restriction base="dms:DateTime"/>
+      </xsd:simpleType>
     </xsd:element>
   </xsd:schema>
   <xsd:schema xmlns="http://schemas.openxmlformats.org/package/2006/metadata/core-properties" xmlns:xsd="http://www.w3.org/2001/XMLSchema" xmlns:xsi="http://www.w3.org/2001/XMLSchema-instance" xmlns:dc="http://purl.org/dc/elements/1.1/" xmlns:dcterms="http://purl.org/dc/terms/" xmlns:odoc="http://schemas.microsoft.com/internal/obd" targetNamespace="http://schemas.openxmlformats.org/package/2006/metadata/core-properties" elementFormDefault="qualified" attributeFormDefault="unqualified" blockDefault="#all">
@@ -16193,30 +16649,33 @@
 <file path=customXml/itemProps1.xml><?xml version="1.0" encoding="utf-8"?>
 <ds:datastoreItem xmlns:ds="http://schemas.openxmlformats.org/officeDocument/2006/customXml" ds:itemID="{2A7D4CEE-4A6E-444C-9F48-154C694282ED}">
   <ds:schemaRefs>
+    <ds:schemaRef ds:uri="http://purl.org/dc/terms/"/>
+    <ds:schemaRef ds:uri="http://schemas.openxmlformats.org/package/2006/metadata/core-properties"/>
     <ds:schemaRef ds:uri="http://purl.org/dc/dcmitype/"/>
     <ds:schemaRef ds:uri="http://schemas.microsoft.com/office/infopath/2007/PartnerControls"/>
+    <ds:schemaRef ds:uri="http://schemas.microsoft.com/office/2006/documentManagement/types"/>
     <ds:schemaRef ds:uri="http://purl.org/dc/elements/1.1/"/>
     <ds:schemaRef ds:uri="http://schemas.microsoft.com/office/2006/metadata/properties"/>
-    <ds:schemaRef ds:uri="http://purl.org/dc/terms/"/>
-    <ds:schemaRef ds:uri="http://schemas.microsoft.com/office/2006/documentManagement/types"/>
-    <ds:schemaRef ds:uri="http://schemas.openxmlformats.org/package/2006/metadata/core-properties"/>
+    <ds:schemaRef ds:uri="2236beb2-6ab0-47c5-924d-6a813a677bfd"/>
     <ds:schemaRef ds:uri="http://www.w3.org/XML/1998/namespace"/>
   </ds:schemaRefs>
 </ds:datastoreItem>
 </file>
 
 <file path=customXml/itemProps2.xml><?xml version="1.0" encoding="utf-8"?>
-<ds:datastoreItem xmlns:ds="http://schemas.openxmlformats.org/officeDocument/2006/customXml" ds:itemID="{558DF6DB-6AE9-4D8D-9456-5AC6F2208EE5}">
+<ds:datastoreItem xmlns:ds="http://schemas.openxmlformats.org/officeDocument/2006/customXml" ds:itemID="{2561C2B9-3D73-4BBE-BD13-630C9E249679}">
   <ds:schemaRefs>
     <ds:schemaRef ds:uri="http://schemas.microsoft.com/office/2006/metadata/contentType"/>
     <ds:schemaRef ds:uri="http://schemas.microsoft.com/office/2006/metadata/properties/metaAttributes"/>
     <ds:schemaRef ds:uri="http://www.w3.org/2001/XMLSchema"/>
     <ds:schemaRef ds:uri="http://schemas.microsoft.com/office/2006/metadata/properties"/>
+    <ds:schemaRef ds:uri="2236beb2-6ab0-47c5-924d-6a813a677bfd"/>
+    <ds:schemaRef ds:uri="http://schemas.microsoft.com/office/2006/documentManagement/types"/>
+    <ds:schemaRef ds:uri="http://schemas.microsoft.com/office/infopath/2007/PartnerControls"/>
     <ds:schemaRef ds:uri="http://schemas.openxmlformats.org/package/2006/metadata/core-properties"/>
     <ds:schemaRef ds:uri="http://purl.org/dc/elements/1.1/"/>
     <ds:schemaRef ds:uri="http://purl.org/dc/terms/"/>
     <ds:schemaRef ds:uri="http://schemas.microsoft.com/internal/obd"/>
-    <ds:schemaRef ds:uri="http://schemas.microsoft.com/office/infopath/2007/PartnerControls"/>
   </ds:schemaRefs>
 </ds:datastoreItem>
 </file>

</xml_diff>